<commit_message>
Adding another figure in thermodynamics paper
</commit_message>
<xml_diff>
--- a/Articles/2019-Entropy/Source/images.pptx
+++ b/Articles/2019-Entropy/Source/images.pptx
@@ -5,7 +5,7 @@
     <p:sldMasterId id="2147483672" r:id="rId1"/>
   </p:sldMasterIdLst>
   <p:notesMasterIdLst>
-    <p:notesMasterId r:id="rId8"/>
+    <p:notesMasterId r:id="rId9"/>
   </p:notesMasterIdLst>
   <p:sldIdLst>
     <p:sldId id="265" r:id="rId2"/>
@@ -14,6 +14,7 @@
     <p:sldId id="307" r:id="rId5"/>
     <p:sldId id="269" r:id="rId6"/>
     <p:sldId id="309" r:id="rId7"/>
+    <p:sldId id="310" r:id="rId8"/>
   </p:sldIdLst>
   <p:sldSz cx="9144000" cy="3657600"/>
   <p:notesSz cx="6858000" cy="9144000"/>
@@ -202,7 +203,7 @@
           <a:p>
             <a:fld id="{754F72A8-F925-472B-8B77-649BE40F1BE2}" type="datetimeFigureOut">
               <a:rPr lang="en-US" smtClean="0"/>
-              <a:t>12/2/2020</a:t>
+              <a:t>1/7/2021</a:t>
             </a:fld>
             <a:endParaRPr lang="en-US"/>
           </a:p>
@@ -600,7 +601,7 @@
           <a:p>
             <a:fld id="{F1571709-B7CC-49DB-B50A-B705702D63C0}" type="datetimeFigureOut">
               <a:rPr lang="en-US" smtClean="0"/>
-              <a:t>12/2/2020</a:t>
+              <a:t>1/7/2021</a:t>
             </a:fld>
             <a:endParaRPr lang="en-US"/>
           </a:p>
@@ -770,7 +771,7 @@
           <a:p>
             <a:fld id="{F1571709-B7CC-49DB-B50A-B705702D63C0}" type="datetimeFigureOut">
               <a:rPr lang="en-US" smtClean="0"/>
-              <a:t>12/2/2020</a:t>
+              <a:t>1/7/2021</a:t>
             </a:fld>
             <a:endParaRPr lang="en-US"/>
           </a:p>
@@ -950,7 +951,7 @@
           <a:p>
             <a:fld id="{F1571709-B7CC-49DB-B50A-B705702D63C0}" type="datetimeFigureOut">
               <a:rPr lang="en-US" smtClean="0"/>
-              <a:t>12/2/2020</a:t>
+              <a:t>1/7/2021</a:t>
             </a:fld>
             <a:endParaRPr lang="en-US"/>
           </a:p>
@@ -1120,7 +1121,7 @@
           <a:p>
             <a:fld id="{F1571709-B7CC-49DB-B50A-B705702D63C0}" type="datetimeFigureOut">
               <a:rPr lang="en-US" smtClean="0"/>
-              <a:t>12/2/2020</a:t>
+              <a:t>1/7/2021</a:t>
             </a:fld>
             <a:endParaRPr lang="en-US"/>
           </a:p>
@@ -1366,7 +1367,7 @@
           <a:p>
             <a:fld id="{F1571709-B7CC-49DB-B50A-B705702D63C0}" type="datetimeFigureOut">
               <a:rPr lang="en-US" smtClean="0"/>
-              <a:t>12/2/2020</a:t>
+              <a:t>1/7/2021</a:t>
             </a:fld>
             <a:endParaRPr lang="en-US"/>
           </a:p>
@@ -1598,7 +1599,7 @@
           <a:p>
             <a:fld id="{F1571709-B7CC-49DB-B50A-B705702D63C0}" type="datetimeFigureOut">
               <a:rPr lang="en-US" smtClean="0"/>
-              <a:t>12/2/2020</a:t>
+              <a:t>1/7/2021</a:t>
             </a:fld>
             <a:endParaRPr lang="en-US"/>
           </a:p>
@@ -1965,7 +1966,7 @@
           <a:p>
             <a:fld id="{F1571709-B7CC-49DB-B50A-B705702D63C0}" type="datetimeFigureOut">
               <a:rPr lang="en-US" smtClean="0"/>
-              <a:t>12/2/2020</a:t>
+              <a:t>1/7/2021</a:t>
             </a:fld>
             <a:endParaRPr lang="en-US"/>
           </a:p>
@@ -2083,7 +2084,7 @@
           <a:p>
             <a:fld id="{F1571709-B7CC-49DB-B50A-B705702D63C0}" type="datetimeFigureOut">
               <a:rPr lang="en-US" smtClean="0"/>
-              <a:t>12/2/2020</a:t>
+              <a:t>1/7/2021</a:t>
             </a:fld>
             <a:endParaRPr lang="en-US"/>
           </a:p>
@@ -2178,7 +2179,7 @@
           <a:p>
             <a:fld id="{F1571709-B7CC-49DB-B50A-B705702D63C0}" type="datetimeFigureOut">
               <a:rPr lang="en-US" smtClean="0"/>
-              <a:t>12/2/2020</a:t>
+              <a:t>1/7/2021</a:t>
             </a:fld>
             <a:endParaRPr lang="en-US"/>
           </a:p>
@@ -2455,7 +2456,7 @@
           <a:p>
             <a:fld id="{F1571709-B7CC-49DB-B50A-B705702D63C0}" type="datetimeFigureOut">
               <a:rPr lang="en-US" smtClean="0"/>
-              <a:t>12/2/2020</a:t>
+              <a:t>1/7/2021</a:t>
             </a:fld>
             <a:endParaRPr lang="en-US"/>
           </a:p>
@@ -2712,7 +2713,7 @@
           <a:p>
             <a:fld id="{F1571709-B7CC-49DB-B50A-B705702D63C0}" type="datetimeFigureOut">
               <a:rPr lang="en-US" smtClean="0"/>
-              <a:t>12/2/2020</a:t>
+              <a:t>1/7/2021</a:t>
             </a:fld>
             <a:endParaRPr lang="en-US"/>
           </a:p>
@@ -2925,7 +2926,7 @@
           <a:p>
             <a:fld id="{F1571709-B7CC-49DB-B50A-B705702D63C0}" type="datetimeFigureOut">
               <a:rPr lang="en-US" smtClean="0"/>
-              <a:t>12/2/2020</a:t>
+              <a:t>1/7/2021</a:t>
             </a:fld>
             <a:endParaRPr lang="en-US"/>
           </a:p>
@@ -7779,8 +7780,8 @@
             </p:sp>
           </mc:Fallback>
         </mc:AlternateContent>
-        <mc:AlternateContent xmlns:mc="http://schemas.openxmlformats.org/markup-compatibility/2006">
-          <mc:Choice xmlns:a14="http://schemas.microsoft.com/office/drawing/2010/main" Requires="a14">
+        <mc:AlternateContent xmlns:mc="http://schemas.openxmlformats.org/markup-compatibility/2006" xmlns:a14="http://schemas.microsoft.com/office/drawing/2010/main">
+          <mc:Choice Requires="a14">
             <p:sp>
               <p:nvSpPr>
                 <p:cNvPr id="49" name="TextBox 48">
@@ -7836,7 +7837,7 @@
               </p:txBody>
             </p:sp>
           </mc:Choice>
-          <mc:Fallback>
+          <mc:Fallback xmlns="">
             <p:sp>
               <p:nvSpPr>
                 <p:cNvPr id="49" name="TextBox 48">
@@ -7881,8 +7882,8 @@
             </p:sp>
           </mc:Fallback>
         </mc:AlternateContent>
-        <mc:AlternateContent xmlns:mc="http://schemas.openxmlformats.org/markup-compatibility/2006">
-          <mc:Choice xmlns:a14="http://schemas.microsoft.com/office/drawing/2010/main" Requires="a14">
+        <mc:AlternateContent xmlns:mc="http://schemas.openxmlformats.org/markup-compatibility/2006" xmlns:a14="http://schemas.microsoft.com/office/drawing/2010/main">
+          <mc:Choice Requires="a14">
             <p:sp>
               <p:nvSpPr>
                 <p:cNvPr id="50" name="TextBox 49">
@@ -7938,7 +7939,7 @@
               </p:txBody>
             </p:sp>
           </mc:Choice>
-          <mc:Fallback>
+          <mc:Fallback xmlns="">
             <p:sp>
               <p:nvSpPr>
                 <p:cNvPr id="50" name="TextBox 49">
@@ -17374,6 +17375,121 @@
             </a:p>
           </p:txBody>
         </p:sp>
+        <p:sp>
+          <p:nvSpPr>
+            <p:cNvPr id="42" name="Freeform: Shape 41">
+              <a:extLst>
+                <a:ext uri="{FF2B5EF4-FFF2-40B4-BE49-F238E27FC236}">
+                  <a16:creationId xmlns:a16="http://schemas.microsoft.com/office/drawing/2014/main" id="{1C2EF236-6CB0-45C8-9D5D-57A2667A377E}"/>
+                </a:ext>
+              </a:extLst>
+            </p:cNvPr>
+            <p:cNvSpPr/>
+            <p:nvPr/>
+          </p:nvSpPr>
+          <p:spPr>
+            <a:xfrm>
+              <a:off x="1251025" y="4569868"/>
+              <a:ext cx="9573221" cy="512499"/>
+            </a:xfrm>
+            <a:custGeom>
+              <a:avLst/>
+              <a:gdLst>
+                <a:gd name="connsiteX0" fmla="*/ 7049 w 9573222"/>
+                <a:gd name="connsiteY0" fmla="*/ 1964 h 482541"/>
+                <a:gd name="connsiteX1" fmla="*/ 649075 w 9573222"/>
+                <a:gd name="connsiteY1" fmla="*/ 53845 h 482541"/>
+                <a:gd name="connsiteX2" fmla="*/ 4890334 w 9573222"/>
+                <a:gd name="connsiteY2" fmla="*/ 481862 h 482541"/>
+                <a:gd name="connsiteX3" fmla="*/ 8800854 w 9573222"/>
+                <a:gd name="connsiteY3" fmla="*/ 151122 h 482541"/>
+                <a:gd name="connsiteX4" fmla="*/ 9572581 w 9573222"/>
+                <a:gd name="connsiteY4" fmla="*/ 73300 h 482541"/>
+                <a:gd name="connsiteX0" fmla="*/ 7049 w 9573222"/>
+                <a:gd name="connsiteY0" fmla="*/ 1964 h 512497"/>
+                <a:gd name="connsiteX1" fmla="*/ 649075 w 9573222"/>
+                <a:gd name="connsiteY1" fmla="*/ 53845 h 512497"/>
+                <a:gd name="connsiteX2" fmla="*/ 4890334 w 9573222"/>
+                <a:gd name="connsiteY2" fmla="*/ 481862 h 512497"/>
+                <a:gd name="connsiteX3" fmla="*/ 8800854 w 9573222"/>
+                <a:gd name="connsiteY3" fmla="*/ 151122 h 512497"/>
+                <a:gd name="connsiteX4" fmla="*/ 9572581 w 9573222"/>
+                <a:gd name="connsiteY4" fmla="*/ 73300 h 512497"/>
+              </a:gdLst>
+              <a:ahLst/>
+              <a:cxnLst>
+                <a:cxn ang="0">
+                  <a:pos x="connsiteX0" y="connsiteY0"/>
+                </a:cxn>
+                <a:cxn ang="0">
+                  <a:pos x="connsiteX1" y="connsiteY1"/>
+                </a:cxn>
+                <a:cxn ang="0">
+                  <a:pos x="connsiteX2" y="connsiteY2"/>
+                </a:cxn>
+                <a:cxn ang="0">
+                  <a:pos x="connsiteX3" y="connsiteY3"/>
+                </a:cxn>
+                <a:cxn ang="0">
+                  <a:pos x="connsiteX4" y="connsiteY4"/>
+                </a:cxn>
+              </a:cxnLst>
+              <a:rect l="l" t="t" r="r" b="b"/>
+              <a:pathLst>
+                <a:path w="9573222" h="512497">
+                  <a:moveTo>
+                    <a:pt x="7049" y="1964"/>
+                  </a:moveTo>
+                  <a:cubicBezTo>
+                    <a:pt x="-78879" y="-12087"/>
+                    <a:pt x="649075" y="53845"/>
+                    <a:pt x="649075" y="53845"/>
+                  </a:cubicBezTo>
+                  <a:cubicBezTo>
+                    <a:pt x="1462956" y="133828"/>
+                    <a:pt x="3518734" y="640747"/>
+                    <a:pt x="4890334" y="481862"/>
+                  </a:cubicBezTo>
+                  <a:cubicBezTo>
+                    <a:pt x="6261934" y="322977"/>
+                    <a:pt x="8020480" y="219216"/>
+                    <a:pt x="8800854" y="151122"/>
+                  </a:cubicBezTo>
+                  <a:cubicBezTo>
+                    <a:pt x="9581228" y="83028"/>
+                    <a:pt x="9576904" y="78164"/>
+                    <a:pt x="9572581" y="73300"/>
+                  </a:cubicBezTo>
+                </a:path>
+              </a:pathLst>
+            </a:custGeom>
+            <a:noFill/>
+          </p:spPr>
+          <p:style>
+            <a:lnRef idx="2">
+              <a:schemeClr val="accent1">
+                <a:shade val="50000"/>
+              </a:schemeClr>
+            </a:lnRef>
+            <a:fillRef idx="1">
+              <a:schemeClr val="accent1"/>
+            </a:fillRef>
+            <a:effectRef idx="0">
+              <a:schemeClr val="accent1"/>
+            </a:effectRef>
+            <a:fontRef idx="minor">
+              <a:schemeClr val="lt1"/>
+            </a:fontRef>
+          </p:style>
+          <p:txBody>
+            <a:bodyPr rtlCol="0" anchor="ctr"/>
+            <a:lstStyle/>
+            <a:p>
+              <a:pPr algn="ctr"/>
+              <a:endParaRPr lang="en-US" sz="907"/>
+            </a:p>
+          </p:txBody>
+        </p:sp>
       </p:grpSp>
     </p:spTree>
     <p:extLst>
@@ -18707,8 +18823,8 @@
           </p:txBody>
         </p:sp>
       </p:grpSp>
-      <mc:AlternateContent xmlns:mc="http://schemas.openxmlformats.org/markup-compatibility/2006">
-        <mc:Choice xmlns:a14="http://schemas.microsoft.com/office/drawing/2010/main" Requires="a14">
+      <mc:AlternateContent xmlns:mc="http://schemas.openxmlformats.org/markup-compatibility/2006" xmlns:a14="http://schemas.microsoft.com/office/drawing/2010/main">
+        <mc:Choice Requires="a14">
           <p:sp>
             <p:nvSpPr>
               <p:cNvPr id="34" name="TextBox 33">
@@ -18758,7 +18874,7 @@
             </p:txBody>
           </p:sp>
         </mc:Choice>
-        <mc:Fallback>
+        <mc:Fallback xmlns="">
           <p:sp>
             <p:nvSpPr>
               <p:cNvPr id="34" name="TextBox 33">
@@ -18803,8 +18919,8 @@
           </p:sp>
         </mc:Fallback>
       </mc:AlternateContent>
-      <mc:AlternateContent xmlns:mc="http://schemas.openxmlformats.org/markup-compatibility/2006">
-        <mc:Choice xmlns:a14="http://schemas.microsoft.com/office/drawing/2010/main" Requires="a14">
+      <mc:AlternateContent xmlns:mc="http://schemas.openxmlformats.org/markup-compatibility/2006" xmlns:a14="http://schemas.microsoft.com/office/drawing/2010/main">
+        <mc:Choice Requires="a14">
           <p:sp>
             <p:nvSpPr>
               <p:cNvPr id="35" name="TextBox 34">
@@ -18875,7 +18991,7 @@
             </p:txBody>
           </p:sp>
         </mc:Choice>
-        <mc:Fallback>
+        <mc:Fallback xmlns="">
           <p:sp>
             <p:nvSpPr>
               <p:cNvPr id="35" name="TextBox 34">
@@ -18920,8 +19036,8 @@
           </p:sp>
         </mc:Fallback>
       </mc:AlternateContent>
-      <mc:AlternateContent xmlns:mc="http://schemas.openxmlformats.org/markup-compatibility/2006">
-        <mc:Choice xmlns:a14="http://schemas.microsoft.com/office/drawing/2010/main" Requires="a14">
+      <mc:AlternateContent xmlns:mc="http://schemas.openxmlformats.org/markup-compatibility/2006" xmlns:a14="http://schemas.microsoft.com/office/drawing/2010/main">
+        <mc:Choice Requires="a14">
           <p:sp>
             <p:nvSpPr>
               <p:cNvPr id="36" name="TextBox 35">
@@ -18992,7 +19108,7 @@
             </p:txBody>
           </p:sp>
         </mc:Choice>
-        <mc:Fallback>
+        <mc:Fallback xmlns="">
           <p:sp>
             <p:nvSpPr>
               <p:cNvPr id="36" name="TextBox 35">
@@ -19910,6 +20026,3725 @@
 </p:sld>
 </file>
 
+<file path=ppt/slides/slide7.xml><?xml version="1.0" encoding="utf-8"?>
+<p:sld xmlns:a="http://schemas.openxmlformats.org/drawingml/2006/main" xmlns:r="http://schemas.openxmlformats.org/officeDocument/2006/relationships" xmlns:p="http://schemas.openxmlformats.org/presentationml/2006/main">
+  <p:cSld>
+    <p:spTree>
+      <p:nvGrpSpPr>
+        <p:cNvPr id="1" name=""/>
+        <p:cNvGrpSpPr/>
+        <p:nvPr/>
+      </p:nvGrpSpPr>
+      <p:grpSpPr>
+        <a:xfrm>
+          <a:off x="0" y="0"/>
+          <a:ext cx="0" cy="0"/>
+          <a:chOff x="0" y="0"/>
+          <a:chExt cx="0" cy="0"/>
+        </a:xfrm>
+      </p:grpSpPr>
+      <p:sp>
+        <p:nvSpPr>
+          <p:cNvPr id="51" name="Freeform: Shape 50">
+            <a:extLst>
+              <a:ext uri="{FF2B5EF4-FFF2-40B4-BE49-F238E27FC236}">
+                <a16:creationId xmlns:a16="http://schemas.microsoft.com/office/drawing/2014/main" id="{30098855-A537-4BED-A961-2FEB5A074330}"/>
+              </a:ext>
+            </a:extLst>
+          </p:cNvPr>
+          <p:cNvSpPr/>
+          <p:nvPr/>
+        </p:nvSpPr>
+        <p:spPr>
+          <a:xfrm>
+            <a:off x="1833188" y="1071197"/>
+            <a:ext cx="1109356" cy="613848"/>
+          </a:xfrm>
+          <a:custGeom>
+            <a:avLst/>
+            <a:gdLst>
+              <a:gd name="connsiteX0" fmla="*/ 0 w 9433249"/>
+              <a:gd name="connsiteY0" fmla="*/ 0 h 524408"/>
+              <a:gd name="connsiteX1" fmla="*/ 1101013 w 9433249"/>
+              <a:gd name="connsiteY1" fmla="*/ 485191 h 524408"/>
+              <a:gd name="connsiteX2" fmla="*/ 4646645 w 9433249"/>
+              <a:gd name="connsiteY2" fmla="*/ 494522 h 524408"/>
+              <a:gd name="connsiteX3" fmla="*/ 8192278 w 9433249"/>
+              <a:gd name="connsiteY3" fmla="*/ 494522 h 524408"/>
+              <a:gd name="connsiteX4" fmla="*/ 9433249 w 9433249"/>
+              <a:gd name="connsiteY4" fmla="*/ 494522 h 524408"/>
+              <a:gd name="connsiteX0" fmla="*/ 0 w 9433249"/>
+              <a:gd name="connsiteY0" fmla="*/ 0 h 524408"/>
+              <a:gd name="connsiteX1" fmla="*/ 1101013 w 9433249"/>
+              <a:gd name="connsiteY1" fmla="*/ 485191 h 524408"/>
+              <a:gd name="connsiteX2" fmla="*/ 4646645 w 9433249"/>
+              <a:gd name="connsiteY2" fmla="*/ 494522 h 524408"/>
+              <a:gd name="connsiteX3" fmla="*/ 9433249 w 9433249"/>
+              <a:gd name="connsiteY3" fmla="*/ 494522 h 524408"/>
+              <a:gd name="connsiteX0" fmla="*/ 0 w 9433249"/>
+              <a:gd name="connsiteY0" fmla="*/ 0 h 523927"/>
+              <a:gd name="connsiteX1" fmla="*/ 1101013 w 9433249"/>
+              <a:gd name="connsiteY1" fmla="*/ 485191 h 523927"/>
+              <a:gd name="connsiteX2" fmla="*/ 9433249 w 9433249"/>
+              <a:gd name="connsiteY2" fmla="*/ 494522 h 523927"/>
+              <a:gd name="connsiteX0" fmla="*/ 0 w 2475604"/>
+              <a:gd name="connsiteY0" fmla="*/ 120944 h 607088"/>
+              <a:gd name="connsiteX1" fmla="*/ 1101013 w 2475604"/>
+              <a:gd name="connsiteY1" fmla="*/ 606135 h 607088"/>
+              <a:gd name="connsiteX2" fmla="*/ 2475604 w 2475604"/>
+              <a:gd name="connsiteY2" fmla="*/ 4 h 607088"/>
+              <a:gd name="connsiteX0" fmla="*/ 0 w 2475604"/>
+              <a:gd name="connsiteY0" fmla="*/ 120940 h 607084"/>
+              <a:gd name="connsiteX1" fmla="*/ 1101013 w 2475604"/>
+              <a:gd name="connsiteY1" fmla="*/ 606131 h 607084"/>
+              <a:gd name="connsiteX2" fmla="*/ 2475604 w 2475604"/>
+              <a:gd name="connsiteY2" fmla="*/ 0 h 607084"/>
+              <a:gd name="connsiteX0" fmla="*/ 0 w 2305619"/>
+              <a:gd name="connsiteY0" fmla="*/ 296787 h 786921"/>
+              <a:gd name="connsiteX1" fmla="*/ 1101013 w 2305619"/>
+              <a:gd name="connsiteY1" fmla="*/ 781978 h 786921"/>
+              <a:gd name="connsiteX2" fmla="*/ 2305619 w 2305619"/>
+              <a:gd name="connsiteY2" fmla="*/ 0 h 786921"/>
+              <a:gd name="connsiteX0" fmla="*/ 0 w 2405266"/>
+              <a:gd name="connsiteY0" fmla="*/ 367125 h 790677"/>
+              <a:gd name="connsiteX1" fmla="*/ 1200660 w 2405266"/>
+              <a:gd name="connsiteY1" fmla="*/ 781978 h 790677"/>
+              <a:gd name="connsiteX2" fmla="*/ 2405266 w 2405266"/>
+              <a:gd name="connsiteY2" fmla="*/ 0 h 790677"/>
+              <a:gd name="connsiteX0" fmla="*/ 0 w 2405266"/>
+              <a:gd name="connsiteY0" fmla="*/ 367125 h 678116"/>
+              <a:gd name="connsiteX1" fmla="*/ 1106876 w 2405266"/>
+              <a:gd name="connsiteY1" fmla="*/ 664748 h 678116"/>
+              <a:gd name="connsiteX2" fmla="*/ 2405266 w 2405266"/>
+              <a:gd name="connsiteY2" fmla="*/ 0 h 678116"/>
+              <a:gd name="connsiteX0" fmla="*/ 0 w 1608096"/>
+              <a:gd name="connsiteY0" fmla="*/ 408156 h 721397"/>
+              <a:gd name="connsiteX1" fmla="*/ 1106876 w 1608096"/>
+              <a:gd name="connsiteY1" fmla="*/ 705779 h 721397"/>
+              <a:gd name="connsiteX2" fmla="*/ 1608096 w 1608096"/>
+              <a:gd name="connsiteY2" fmla="*/ 0 h 721397"/>
+              <a:gd name="connsiteX0" fmla="*/ 0 w 1608096"/>
+              <a:gd name="connsiteY0" fmla="*/ 408156 h 721397"/>
+              <a:gd name="connsiteX1" fmla="*/ 1106876 w 1608096"/>
+              <a:gd name="connsiteY1" fmla="*/ 705779 h 721397"/>
+              <a:gd name="connsiteX2" fmla="*/ 1608096 w 1608096"/>
+              <a:gd name="connsiteY2" fmla="*/ 0 h 721397"/>
+              <a:gd name="connsiteX0" fmla="*/ 0 w 1608096"/>
+              <a:gd name="connsiteY0" fmla="*/ 408156 h 721397"/>
+              <a:gd name="connsiteX1" fmla="*/ 1106876 w 1608096"/>
+              <a:gd name="connsiteY1" fmla="*/ 705779 h 721397"/>
+              <a:gd name="connsiteX2" fmla="*/ 1608096 w 1608096"/>
+              <a:gd name="connsiteY2" fmla="*/ 0 h 721397"/>
+              <a:gd name="connsiteX0" fmla="*/ 0 w 1608096"/>
+              <a:gd name="connsiteY0" fmla="*/ 408156 h 683586"/>
+              <a:gd name="connsiteX1" fmla="*/ 960337 w 1608096"/>
+              <a:gd name="connsiteY1" fmla="*/ 664749 h 683586"/>
+              <a:gd name="connsiteX2" fmla="*/ 1608096 w 1608096"/>
+              <a:gd name="connsiteY2" fmla="*/ 0 h 683586"/>
+              <a:gd name="connsiteX0" fmla="*/ 0 w 1608096"/>
+              <a:gd name="connsiteY0" fmla="*/ 408156 h 408156"/>
+              <a:gd name="connsiteX1" fmla="*/ 1608096 w 1608096"/>
+              <a:gd name="connsiteY1" fmla="*/ 0 h 408156"/>
+              <a:gd name="connsiteX0" fmla="*/ 0 w 1461557"/>
+              <a:gd name="connsiteY0" fmla="*/ 683648 h 683648"/>
+              <a:gd name="connsiteX1" fmla="*/ 1461557 w 1461557"/>
+              <a:gd name="connsiteY1" fmla="*/ 0 h 683648"/>
+              <a:gd name="connsiteX0" fmla="*/ 0 w 1520172"/>
+              <a:gd name="connsiteY0" fmla="*/ 736403 h 736403"/>
+              <a:gd name="connsiteX1" fmla="*/ 1520172 w 1520172"/>
+              <a:gd name="connsiteY1" fmla="*/ 0 h 736403"/>
+              <a:gd name="connsiteX0" fmla="*/ 0 w 1479141"/>
+              <a:gd name="connsiteY0" fmla="*/ 818464 h 818464"/>
+              <a:gd name="connsiteX1" fmla="*/ 1479141 w 1479141"/>
+              <a:gd name="connsiteY1" fmla="*/ 0 h 818464"/>
+            </a:gdLst>
+            <a:ahLst/>
+            <a:cxnLst>
+              <a:cxn ang="0">
+                <a:pos x="connsiteX0" y="connsiteY0"/>
+              </a:cxn>
+              <a:cxn ang="0">
+                <a:pos x="connsiteX1" y="connsiteY1"/>
+              </a:cxn>
+            </a:cxnLst>
+            <a:rect l="l" t="t" r="r" b="b"/>
+            <a:pathLst>
+              <a:path w="1479141" h="818464">
+                <a:moveTo>
+                  <a:pt x="0" y="818464"/>
+                </a:moveTo>
+                <a:lnTo>
+                  <a:pt x="1479141" y="0"/>
+                </a:lnTo>
+              </a:path>
+            </a:pathLst>
+          </a:custGeom>
+          <a:noFill/>
+        </p:spPr>
+        <p:style>
+          <a:lnRef idx="2">
+            <a:schemeClr val="accent1">
+              <a:shade val="50000"/>
+            </a:schemeClr>
+          </a:lnRef>
+          <a:fillRef idx="1">
+            <a:schemeClr val="accent1"/>
+          </a:fillRef>
+          <a:effectRef idx="0">
+            <a:schemeClr val="accent1"/>
+          </a:effectRef>
+          <a:fontRef idx="minor">
+            <a:schemeClr val="lt1"/>
+          </a:fontRef>
+        </p:style>
+        <p:txBody>
+          <a:bodyPr rtlCol="0" anchor="ctr"/>
+          <a:lstStyle/>
+          <a:p>
+            <a:pPr algn="ctr"/>
+            <a:endParaRPr lang="en-US" sz="1350"/>
+          </a:p>
+        </p:txBody>
+      </p:sp>
+      <p:sp>
+        <p:nvSpPr>
+          <p:cNvPr id="52" name="Freeform: Shape 51">
+            <a:extLst>
+              <a:ext uri="{FF2B5EF4-FFF2-40B4-BE49-F238E27FC236}">
+                <a16:creationId xmlns:a16="http://schemas.microsoft.com/office/drawing/2014/main" id="{B7984D3C-4980-41BF-9860-9BF1BC882BDB}"/>
+              </a:ext>
+            </a:extLst>
+          </p:cNvPr>
+          <p:cNvSpPr/>
+          <p:nvPr/>
+        </p:nvSpPr>
+        <p:spPr>
+          <a:xfrm>
+            <a:off x="1819999" y="464532"/>
+            <a:ext cx="1122545" cy="741308"/>
+          </a:xfrm>
+          <a:custGeom>
+            <a:avLst/>
+            <a:gdLst>
+              <a:gd name="connsiteX0" fmla="*/ 0 w 9433249"/>
+              <a:gd name="connsiteY0" fmla="*/ 0 h 524408"/>
+              <a:gd name="connsiteX1" fmla="*/ 1101013 w 9433249"/>
+              <a:gd name="connsiteY1" fmla="*/ 485191 h 524408"/>
+              <a:gd name="connsiteX2" fmla="*/ 4646645 w 9433249"/>
+              <a:gd name="connsiteY2" fmla="*/ 494522 h 524408"/>
+              <a:gd name="connsiteX3" fmla="*/ 8192278 w 9433249"/>
+              <a:gd name="connsiteY3" fmla="*/ 494522 h 524408"/>
+              <a:gd name="connsiteX4" fmla="*/ 9433249 w 9433249"/>
+              <a:gd name="connsiteY4" fmla="*/ 494522 h 524408"/>
+              <a:gd name="connsiteX0" fmla="*/ 0 w 9433249"/>
+              <a:gd name="connsiteY0" fmla="*/ 0 h 524408"/>
+              <a:gd name="connsiteX1" fmla="*/ 1101013 w 9433249"/>
+              <a:gd name="connsiteY1" fmla="*/ 485191 h 524408"/>
+              <a:gd name="connsiteX2" fmla="*/ 4646645 w 9433249"/>
+              <a:gd name="connsiteY2" fmla="*/ 494522 h 524408"/>
+              <a:gd name="connsiteX3" fmla="*/ 9433249 w 9433249"/>
+              <a:gd name="connsiteY3" fmla="*/ 494522 h 524408"/>
+              <a:gd name="connsiteX0" fmla="*/ 0 w 9433249"/>
+              <a:gd name="connsiteY0" fmla="*/ 0 h 523927"/>
+              <a:gd name="connsiteX1" fmla="*/ 1101013 w 9433249"/>
+              <a:gd name="connsiteY1" fmla="*/ 485191 h 523927"/>
+              <a:gd name="connsiteX2" fmla="*/ 9433249 w 9433249"/>
+              <a:gd name="connsiteY2" fmla="*/ 494522 h 523927"/>
+              <a:gd name="connsiteX0" fmla="*/ 0 w 2475604"/>
+              <a:gd name="connsiteY0" fmla="*/ 120944 h 607088"/>
+              <a:gd name="connsiteX1" fmla="*/ 1101013 w 2475604"/>
+              <a:gd name="connsiteY1" fmla="*/ 606135 h 607088"/>
+              <a:gd name="connsiteX2" fmla="*/ 2475604 w 2475604"/>
+              <a:gd name="connsiteY2" fmla="*/ 4 h 607088"/>
+              <a:gd name="connsiteX0" fmla="*/ 0 w 2475604"/>
+              <a:gd name="connsiteY0" fmla="*/ 120940 h 607084"/>
+              <a:gd name="connsiteX1" fmla="*/ 1101013 w 2475604"/>
+              <a:gd name="connsiteY1" fmla="*/ 606131 h 607084"/>
+              <a:gd name="connsiteX2" fmla="*/ 2475604 w 2475604"/>
+              <a:gd name="connsiteY2" fmla="*/ 0 h 607084"/>
+              <a:gd name="connsiteX0" fmla="*/ 0 w 2305619"/>
+              <a:gd name="connsiteY0" fmla="*/ 296787 h 786921"/>
+              <a:gd name="connsiteX1" fmla="*/ 1101013 w 2305619"/>
+              <a:gd name="connsiteY1" fmla="*/ 781978 h 786921"/>
+              <a:gd name="connsiteX2" fmla="*/ 2305619 w 2305619"/>
+              <a:gd name="connsiteY2" fmla="*/ 0 h 786921"/>
+              <a:gd name="connsiteX0" fmla="*/ 0 w 2405266"/>
+              <a:gd name="connsiteY0" fmla="*/ 367125 h 790677"/>
+              <a:gd name="connsiteX1" fmla="*/ 1200660 w 2405266"/>
+              <a:gd name="connsiteY1" fmla="*/ 781978 h 790677"/>
+              <a:gd name="connsiteX2" fmla="*/ 2405266 w 2405266"/>
+              <a:gd name="connsiteY2" fmla="*/ 0 h 790677"/>
+              <a:gd name="connsiteX0" fmla="*/ 0 w 2405266"/>
+              <a:gd name="connsiteY0" fmla="*/ 367125 h 678116"/>
+              <a:gd name="connsiteX1" fmla="*/ 1106876 w 2405266"/>
+              <a:gd name="connsiteY1" fmla="*/ 664748 h 678116"/>
+              <a:gd name="connsiteX2" fmla="*/ 2405266 w 2405266"/>
+              <a:gd name="connsiteY2" fmla="*/ 0 h 678116"/>
+              <a:gd name="connsiteX0" fmla="*/ 0 w 1608096"/>
+              <a:gd name="connsiteY0" fmla="*/ 408156 h 721397"/>
+              <a:gd name="connsiteX1" fmla="*/ 1106876 w 1608096"/>
+              <a:gd name="connsiteY1" fmla="*/ 705779 h 721397"/>
+              <a:gd name="connsiteX2" fmla="*/ 1608096 w 1608096"/>
+              <a:gd name="connsiteY2" fmla="*/ 0 h 721397"/>
+              <a:gd name="connsiteX0" fmla="*/ 0 w 1608096"/>
+              <a:gd name="connsiteY0" fmla="*/ 408156 h 721397"/>
+              <a:gd name="connsiteX1" fmla="*/ 1106876 w 1608096"/>
+              <a:gd name="connsiteY1" fmla="*/ 705779 h 721397"/>
+              <a:gd name="connsiteX2" fmla="*/ 1608096 w 1608096"/>
+              <a:gd name="connsiteY2" fmla="*/ 0 h 721397"/>
+              <a:gd name="connsiteX0" fmla="*/ 0 w 1608096"/>
+              <a:gd name="connsiteY0" fmla="*/ 408156 h 721397"/>
+              <a:gd name="connsiteX1" fmla="*/ 1106876 w 1608096"/>
+              <a:gd name="connsiteY1" fmla="*/ 705779 h 721397"/>
+              <a:gd name="connsiteX2" fmla="*/ 1608096 w 1608096"/>
+              <a:gd name="connsiteY2" fmla="*/ 0 h 721397"/>
+              <a:gd name="connsiteX0" fmla="*/ 0 w 1608096"/>
+              <a:gd name="connsiteY0" fmla="*/ 408156 h 683586"/>
+              <a:gd name="connsiteX1" fmla="*/ 960337 w 1608096"/>
+              <a:gd name="connsiteY1" fmla="*/ 664749 h 683586"/>
+              <a:gd name="connsiteX2" fmla="*/ 1608096 w 1608096"/>
+              <a:gd name="connsiteY2" fmla="*/ 0 h 683586"/>
+              <a:gd name="connsiteX0" fmla="*/ 0 w 1608096"/>
+              <a:gd name="connsiteY0" fmla="*/ 837225 h 864760"/>
+              <a:gd name="connsiteX1" fmla="*/ 813799 w 1608096"/>
+              <a:gd name="connsiteY1" fmla="*/ 3572 h 864760"/>
+              <a:gd name="connsiteX2" fmla="*/ 1608096 w 1608096"/>
+              <a:gd name="connsiteY2" fmla="*/ 429069 h 864760"/>
+              <a:gd name="connsiteX0" fmla="*/ 0 w 1608096"/>
+              <a:gd name="connsiteY0" fmla="*/ 837225 h 837225"/>
+              <a:gd name="connsiteX1" fmla="*/ 813799 w 1608096"/>
+              <a:gd name="connsiteY1" fmla="*/ 3572 h 837225"/>
+              <a:gd name="connsiteX2" fmla="*/ 1608096 w 1608096"/>
+              <a:gd name="connsiteY2" fmla="*/ 429069 h 837225"/>
+              <a:gd name="connsiteX0" fmla="*/ 0 w 1608096"/>
+              <a:gd name="connsiteY0" fmla="*/ 847908 h 847908"/>
+              <a:gd name="connsiteX1" fmla="*/ 813799 w 1608096"/>
+              <a:gd name="connsiteY1" fmla="*/ 14255 h 847908"/>
+              <a:gd name="connsiteX2" fmla="*/ 1608096 w 1608096"/>
+              <a:gd name="connsiteY2" fmla="*/ 439752 h 847908"/>
+              <a:gd name="connsiteX0" fmla="*/ 0 w 1496727"/>
+              <a:gd name="connsiteY0" fmla="*/ 1101757 h 1101757"/>
+              <a:gd name="connsiteX1" fmla="*/ 702430 w 1496727"/>
+              <a:gd name="connsiteY1" fmla="*/ 27782 h 1101757"/>
+              <a:gd name="connsiteX2" fmla="*/ 1496727 w 1496727"/>
+              <a:gd name="connsiteY2" fmla="*/ 453279 h 1101757"/>
+              <a:gd name="connsiteX0" fmla="*/ 0 w 1496727"/>
+              <a:gd name="connsiteY0" fmla="*/ 1101757 h 1101757"/>
+              <a:gd name="connsiteX1" fmla="*/ 702430 w 1496727"/>
+              <a:gd name="connsiteY1" fmla="*/ 27782 h 1101757"/>
+              <a:gd name="connsiteX2" fmla="*/ 1496727 w 1496727"/>
+              <a:gd name="connsiteY2" fmla="*/ 453279 h 1101757"/>
+              <a:gd name="connsiteX0" fmla="*/ 0 w 1496727"/>
+              <a:gd name="connsiteY0" fmla="*/ 998154 h 998154"/>
+              <a:gd name="connsiteX1" fmla="*/ 761044 w 1496727"/>
+              <a:gd name="connsiteY1" fmla="*/ 41410 h 998154"/>
+              <a:gd name="connsiteX2" fmla="*/ 1496727 w 1496727"/>
+              <a:gd name="connsiteY2" fmla="*/ 349676 h 998154"/>
+              <a:gd name="connsiteX0" fmla="*/ 0 w 1496727"/>
+              <a:gd name="connsiteY0" fmla="*/ 988409 h 988409"/>
+              <a:gd name="connsiteX1" fmla="*/ 702429 w 1496727"/>
+              <a:gd name="connsiteY1" fmla="*/ 43388 h 988409"/>
+              <a:gd name="connsiteX2" fmla="*/ 1496727 w 1496727"/>
+              <a:gd name="connsiteY2" fmla="*/ 339931 h 988409"/>
+              <a:gd name="connsiteX0" fmla="*/ 0 w 1496727"/>
+              <a:gd name="connsiteY0" fmla="*/ 988409 h 988409"/>
+              <a:gd name="connsiteX1" fmla="*/ 702429 w 1496727"/>
+              <a:gd name="connsiteY1" fmla="*/ 43388 h 988409"/>
+              <a:gd name="connsiteX2" fmla="*/ 1496727 w 1496727"/>
+              <a:gd name="connsiteY2" fmla="*/ 339931 h 988409"/>
+            </a:gdLst>
+            <a:ahLst/>
+            <a:cxnLst>
+              <a:cxn ang="0">
+                <a:pos x="connsiteX0" y="connsiteY0"/>
+              </a:cxn>
+              <a:cxn ang="0">
+                <a:pos x="connsiteX1" y="connsiteY1"/>
+              </a:cxn>
+              <a:cxn ang="0">
+                <a:pos x="connsiteX2" y="connsiteY2"/>
+              </a:cxn>
+            </a:cxnLst>
+            <a:rect l="l" t="t" r="r" b="b"/>
+            <a:pathLst>
+              <a:path w="1496727" h="988409">
+                <a:moveTo>
+                  <a:pt x="0" y="988409"/>
+                </a:moveTo>
+                <a:cubicBezTo>
+                  <a:pt x="28472" y="486410"/>
+                  <a:pt x="452975" y="151468"/>
+                  <a:pt x="702429" y="43388"/>
+                </a:cubicBezTo>
+                <a:cubicBezTo>
+                  <a:pt x="951883" y="-64692"/>
+                  <a:pt x="1355184" y="27328"/>
+                  <a:pt x="1496727" y="339931"/>
+                </a:cubicBezTo>
+              </a:path>
+            </a:pathLst>
+          </a:custGeom>
+          <a:noFill/>
+        </p:spPr>
+        <p:style>
+          <a:lnRef idx="2">
+            <a:schemeClr val="accent1">
+              <a:shade val="50000"/>
+            </a:schemeClr>
+          </a:lnRef>
+          <a:fillRef idx="1">
+            <a:schemeClr val="accent1"/>
+          </a:fillRef>
+          <a:effectRef idx="0">
+            <a:schemeClr val="accent1"/>
+          </a:effectRef>
+          <a:fontRef idx="minor">
+            <a:schemeClr val="lt1"/>
+          </a:fontRef>
+        </p:style>
+        <p:txBody>
+          <a:bodyPr rtlCol="0" anchor="ctr"/>
+          <a:lstStyle/>
+          <a:p>
+            <a:pPr algn="ctr"/>
+            <a:endParaRPr lang="en-US" sz="1350"/>
+          </a:p>
+        </p:txBody>
+      </p:sp>
+      <p:sp>
+        <p:nvSpPr>
+          <p:cNvPr id="54" name="Freeform: Shape 53">
+            <a:extLst>
+              <a:ext uri="{FF2B5EF4-FFF2-40B4-BE49-F238E27FC236}">
+                <a16:creationId xmlns:a16="http://schemas.microsoft.com/office/drawing/2014/main" id="{072FB1D0-699C-4F70-A74A-106DBDCC895C}"/>
+              </a:ext>
+            </a:extLst>
+          </p:cNvPr>
+          <p:cNvSpPr/>
+          <p:nvPr/>
+        </p:nvSpPr>
+        <p:spPr>
+          <a:xfrm>
+            <a:off x="1833188" y="1557505"/>
+            <a:ext cx="1122545" cy="765400"/>
+          </a:xfrm>
+          <a:custGeom>
+            <a:avLst/>
+            <a:gdLst>
+              <a:gd name="connsiteX0" fmla="*/ 0 w 9433249"/>
+              <a:gd name="connsiteY0" fmla="*/ 0 h 524408"/>
+              <a:gd name="connsiteX1" fmla="*/ 1101013 w 9433249"/>
+              <a:gd name="connsiteY1" fmla="*/ 485191 h 524408"/>
+              <a:gd name="connsiteX2" fmla="*/ 4646645 w 9433249"/>
+              <a:gd name="connsiteY2" fmla="*/ 494522 h 524408"/>
+              <a:gd name="connsiteX3" fmla="*/ 8192278 w 9433249"/>
+              <a:gd name="connsiteY3" fmla="*/ 494522 h 524408"/>
+              <a:gd name="connsiteX4" fmla="*/ 9433249 w 9433249"/>
+              <a:gd name="connsiteY4" fmla="*/ 494522 h 524408"/>
+              <a:gd name="connsiteX0" fmla="*/ 0 w 9433249"/>
+              <a:gd name="connsiteY0" fmla="*/ 0 h 524408"/>
+              <a:gd name="connsiteX1" fmla="*/ 1101013 w 9433249"/>
+              <a:gd name="connsiteY1" fmla="*/ 485191 h 524408"/>
+              <a:gd name="connsiteX2" fmla="*/ 4646645 w 9433249"/>
+              <a:gd name="connsiteY2" fmla="*/ 494522 h 524408"/>
+              <a:gd name="connsiteX3" fmla="*/ 9433249 w 9433249"/>
+              <a:gd name="connsiteY3" fmla="*/ 494522 h 524408"/>
+              <a:gd name="connsiteX0" fmla="*/ 0 w 9433249"/>
+              <a:gd name="connsiteY0" fmla="*/ 0 h 523927"/>
+              <a:gd name="connsiteX1" fmla="*/ 1101013 w 9433249"/>
+              <a:gd name="connsiteY1" fmla="*/ 485191 h 523927"/>
+              <a:gd name="connsiteX2" fmla="*/ 9433249 w 9433249"/>
+              <a:gd name="connsiteY2" fmla="*/ 494522 h 523927"/>
+              <a:gd name="connsiteX0" fmla="*/ 0 w 2475604"/>
+              <a:gd name="connsiteY0" fmla="*/ 120944 h 607088"/>
+              <a:gd name="connsiteX1" fmla="*/ 1101013 w 2475604"/>
+              <a:gd name="connsiteY1" fmla="*/ 606135 h 607088"/>
+              <a:gd name="connsiteX2" fmla="*/ 2475604 w 2475604"/>
+              <a:gd name="connsiteY2" fmla="*/ 4 h 607088"/>
+              <a:gd name="connsiteX0" fmla="*/ 0 w 2475604"/>
+              <a:gd name="connsiteY0" fmla="*/ 120940 h 607084"/>
+              <a:gd name="connsiteX1" fmla="*/ 1101013 w 2475604"/>
+              <a:gd name="connsiteY1" fmla="*/ 606131 h 607084"/>
+              <a:gd name="connsiteX2" fmla="*/ 2475604 w 2475604"/>
+              <a:gd name="connsiteY2" fmla="*/ 0 h 607084"/>
+              <a:gd name="connsiteX0" fmla="*/ 0 w 2305619"/>
+              <a:gd name="connsiteY0" fmla="*/ 296787 h 786921"/>
+              <a:gd name="connsiteX1" fmla="*/ 1101013 w 2305619"/>
+              <a:gd name="connsiteY1" fmla="*/ 781978 h 786921"/>
+              <a:gd name="connsiteX2" fmla="*/ 2305619 w 2305619"/>
+              <a:gd name="connsiteY2" fmla="*/ 0 h 786921"/>
+              <a:gd name="connsiteX0" fmla="*/ 0 w 2405266"/>
+              <a:gd name="connsiteY0" fmla="*/ 367125 h 790677"/>
+              <a:gd name="connsiteX1" fmla="*/ 1200660 w 2405266"/>
+              <a:gd name="connsiteY1" fmla="*/ 781978 h 790677"/>
+              <a:gd name="connsiteX2" fmla="*/ 2405266 w 2405266"/>
+              <a:gd name="connsiteY2" fmla="*/ 0 h 790677"/>
+              <a:gd name="connsiteX0" fmla="*/ 0 w 2405266"/>
+              <a:gd name="connsiteY0" fmla="*/ 367125 h 678116"/>
+              <a:gd name="connsiteX1" fmla="*/ 1106876 w 2405266"/>
+              <a:gd name="connsiteY1" fmla="*/ 664748 h 678116"/>
+              <a:gd name="connsiteX2" fmla="*/ 2405266 w 2405266"/>
+              <a:gd name="connsiteY2" fmla="*/ 0 h 678116"/>
+              <a:gd name="connsiteX0" fmla="*/ 0 w 1608096"/>
+              <a:gd name="connsiteY0" fmla="*/ 408156 h 721397"/>
+              <a:gd name="connsiteX1" fmla="*/ 1106876 w 1608096"/>
+              <a:gd name="connsiteY1" fmla="*/ 705779 h 721397"/>
+              <a:gd name="connsiteX2" fmla="*/ 1608096 w 1608096"/>
+              <a:gd name="connsiteY2" fmla="*/ 0 h 721397"/>
+              <a:gd name="connsiteX0" fmla="*/ 0 w 1608096"/>
+              <a:gd name="connsiteY0" fmla="*/ 408156 h 721397"/>
+              <a:gd name="connsiteX1" fmla="*/ 1106876 w 1608096"/>
+              <a:gd name="connsiteY1" fmla="*/ 705779 h 721397"/>
+              <a:gd name="connsiteX2" fmla="*/ 1608096 w 1608096"/>
+              <a:gd name="connsiteY2" fmla="*/ 0 h 721397"/>
+              <a:gd name="connsiteX0" fmla="*/ 0 w 1608096"/>
+              <a:gd name="connsiteY0" fmla="*/ 408156 h 721397"/>
+              <a:gd name="connsiteX1" fmla="*/ 1106876 w 1608096"/>
+              <a:gd name="connsiteY1" fmla="*/ 705779 h 721397"/>
+              <a:gd name="connsiteX2" fmla="*/ 1608096 w 1608096"/>
+              <a:gd name="connsiteY2" fmla="*/ 0 h 721397"/>
+              <a:gd name="connsiteX0" fmla="*/ 0 w 1608096"/>
+              <a:gd name="connsiteY0" fmla="*/ 408156 h 683586"/>
+              <a:gd name="connsiteX1" fmla="*/ 960337 w 1608096"/>
+              <a:gd name="connsiteY1" fmla="*/ 664749 h 683586"/>
+              <a:gd name="connsiteX2" fmla="*/ 1608096 w 1608096"/>
+              <a:gd name="connsiteY2" fmla="*/ 0 h 683586"/>
+              <a:gd name="connsiteX0" fmla="*/ 0 w 1608096"/>
+              <a:gd name="connsiteY0" fmla="*/ 837225 h 864760"/>
+              <a:gd name="connsiteX1" fmla="*/ 813799 w 1608096"/>
+              <a:gd name="connsiteY1" fmla="*/ 3572 h 864760"/>
+              <a:gd name="connsiteX2" fmla="*/ 1608096 w 1608096"/>
+              <a:gd name="connsiteY2" fmla="*/ 429069 h 864760"/>
+              <a:gd name="connsiteX0" fmla="*/ 0 w 1608096"/>
+              <a:gd name="connsiteY0" fmla="*/ 837225 h 837225"/>
+              <a:gd name="connsiteX1" fmla="*/ 813799 w 1608096"/>
+              <a:gd name="connsiteY1" fmla="*/ 3572 h 837225"/>
+              <a:gd name="connsiteX2" fmla="*/ 1608096 w 1608096"/>
+              <a:gd name="connsiteY2" fmla="*/ 429069 h 837225"/>
+              <a:gd name="connsiteX0" fmla="*/ 0 w 1608096"/>
+              <a:gd name="connsiteY0" fmla="*/ 847908 h 847908"/>
+              <a:gd name="connsiteX1" fmla="*/ 813799 w 1608096"/>
+              <a:gd name="connsiteY1" fmla="*/ 14255 h 847908"/>
+              <a:gd name="connsiteX2" fmla="*/ 1608096 w 1608096"/>
+              <a:gd name="connsiteY2" fmla="*/ 439752 h 847908"/>
+              <a:gd name="connsiteX0" fmla="*/ 0 w 1496727"/>
+              <a:gd name="connsiteY0" fmla="*/ 1101757 h 1101757"/>
+              <a:gd name="connsiteX1" fmla="*/ 702430 w 1496727"/>
+              <a:gd name="connsiteY1" fmla="*/ 27782 h 1101757"/>
+              <a:gd name="connsiteX2" fmla="*/ 1496727 w 1496727"/>
+              <a:gd name="connsiteY2" fmla="*/ 453279 h 1101757"/>
+              <a:gd name="connsiteX0" fmla="*/ 0 w 1496727"/>
+              <a:gd name="connsiteY0" fmla="*/ 1101757 h 1101757"/>
+              <a:gd name="connsiteX1" fmla="*/ 702430 w 1496727"/>
+              <a:gd name="connsiteY1" fmla="*/ 27782 h 1101757"/>
+              <a:gd name="connsiteX2" fmla="*/ 1496727 w 1496727"/>
+              <a:gd name="connsiteY2" fmla="*/ 453279 h 1101757"/>
+              <a:gd name="connsiteX0" fmla="*/ 0 w 1496727"/>
+              <a:gd name="connsiteY0" fmla="*/ 998154 h 998154"/>
+              <a:gd name="connsiteX1" fmla="*/ 761044 w 1496727"/>
+              <a:gd name="connsiteY1" fmla="*/ 41410 h 998154"/>
+              <a:gd name="connsiteX2" fmla="*/ 1496727 w 1496727"/>
+              <a:gd name="connsiteY2" fmla="*/ 349676 h 998154"/>
+              <a:gd name="connsiteX0" fmla="*/ 0 w 1496727"/>
+              <a:gd name="connsiteY0" fmla="*/ 988409 h 988409"/>
+              <a:gd name="connsiteX1" fmla="*/ 702429 w 1496727"/>
+              <a:gd name="connsiteY1" fmla="*/ 43388 h 988409"/>
+              <a:gd name="connsiteX2" fmla="*/ 1496727 w 1496727"/>
+              <a:gd name="connsiteY2" fmla="*/ 339931 h 988409"/>
+              <a:gd name="connsiteX0" fmla="*/ 0 w 1496727"/>
+              <a:gd name="connsiteY0" fmla="*/ 988409 h 988409"/>
+              <a:gd name="connsiteX1" fmla="*/ 702429 w 1496727"/>
+              <a:gd name="connsiteY1" fmla="*/ 43388 h 988409"/>
+              <a:gd name="connsiteX2" fmla="*/ 1496727 w 1496727"/>
+              <a:gd name="connsiteY2" fmla="*/ 339931 h 988409"/>
+              <a:gd name="connsiteX0" fmla="*/ 0 w 1496727"/>
+              <a:gd name="connsiteY0" fmla="*/ 700797 h 1042301"/>
+              <a:gd name="connsiteX1" fmla="*/ 784491 w 1496727"/>
+              <a:gd name="connsiteY1" fmla="*/ 1033590 h 1042301"/>
+              <a:gd name="connsiteX2" fmla="*/ 1496727 w 1496727"/>
+              <a:gd name="connsiteY2" fmla="*/ 52319 h 1042301"/>
+              <a:gd name="connsiteX0" fmla="*/ 0 w 1496727"/>
+              <a:gd name="connsiteY0" fmla="*/ 700797 h 1072850"/>
+              <a:gd name="connsiteX1" fmla="*/ 784491 w 1496727"/>
+              <a:gd name="connsiteY1" fmla="*/ 1033590 h 1072850"/>
+              <a:gd name="connsiteX2" fmla="*/ 1496727 w 1496727"/>
+              <a:gd name="connsiteY2" fmla="*/ 52319 h 1072850"/>
+              <a:gd name="connsiteX0" fmla="*/ 0 w 1496727"/>
+              <a:gd name="connsiteY0" fmla="*/ 648478 h 1020531"/>
+              <a:gd name="connsiteX1" fmla="*/ 784491 w 1496727"/>
+              <a:gd name="connsiteY1" fmla="*/ 981271 h 1020531"/>
+              <a:gd name="connsiteX2" fmla="*/ 1496727 w 1496727"/>
+              <a:gd name="connsiteY2" fmla="*/ 0 h 1020531"/>
+            </a:gdLst>
+            <a:ahLst/>
+            <a:cxnLst>
+              <a:cxn ang="0">
+                <a:pos x="connsiteX0" y="connsiteY0"/>
+              </a:cxn>
+              <a:cxn ang="0">
+                <a:pos x="connsiteX1" y="connsiteY1"/>
+              </a:cxn>
+              <a:cxn ang="0">
+                <a:pos x="connsiteX2" y="connsiteY2"/>
+              </a:cxn>
+            </a:cxnLst>
+            <a:rect l="l" t="t" r="r" b="b"/>
+            <a:pathLst>
+              <a:path w="1496727" h="1020531">
+                <a:moveTo>
+                  <a:pt x="0" y="648478"/>
+                </a:moveTo>
+                <a:cubicBezTo>
+                  <a:pt x="104672" y="972955"/>
+                  <a:pt x="535037" y="1089351"/>
+                  <a:pt x="784491" y="981271"/>
+                </a:cubicBezTo>
+                <a:cubicBezTo>
+                  <a:pt x="1033945" y="873191"/>
+                  <a:pt x="1378631" y="431812"/>
+                  <a:pt x="1496727" y="0"/>
+                </a:cubicBezTo>
+              </a:path>
+            </a:pathLst>
+          </a:custGeom>
+          <a:noFill/>
+        </p:spPr>
+        <p:style>
+          <a:lnRef idx="2">
+            <a:schemeClr val="accent1">
+              <a:shade val="50000"/>
+            </a:schemeClr>
+          </a:lnRef>
+          <a:fillRef idx="1">
+            <a:schemeClr val="accent1"/>
+          </a:fillRef>
+          <a:effectRef idx="0">
+            <a:schemeClr val="accent1"/>
+          </a:effectRef>
+          <a:fontRef idx="minor">
+            <a:schemeClr val="lt1"/>
+          </a:fontRef>
+        </p:style>
+        <p:txBody>
+          <a:bodyPr rtlCol="0" anchor="ctr"/>
+          <a:lstStyle/>
+          <a:p>
+            <a:pPr algn="ctr"/>
+            <a:endParaRPr lang="en-US" sz="1350"/>
+          </a:p>
+        </p:txBody>
+      </p:sp>
+      <mc:AlternateContent xmlns:mc="http://schemas.openxmlformats.org/markup-compatibility/2006">
+        <mc:Choice xmlns:a14="http://schemas.microsoft.com/office/drawing/2010/main" Requires="a14">
+          <p:sp>
+            <p:nvSpPr>
+              <p:cNvPr id="55" name="TextBox 54">
+                <a:extLst>
+                  <a:ext uri="{FF2B5EF4-FFF2-40B4-BE49-F238E27FC236}">
+                    <a16:creationId xmlns:a16="http://schemas.microsoft.com/office/drawing/2014/main" id="{6504B67D-3318-4C41-BBE7-49ADC40DD7F8}"/>
+                  </a:ext>
+                </a:extLst>
+              </p:cNvPr>
+              <p:cNvSpPr txBox="1"/>
+              <p:nvPr/>
+            </p:nvSpPr>
+            <p:spPr>
+              <a:xfrm>
+                <a:off x="2006214" y="2662238"/>
+                <a:ext cx="548740" cy="307777"/>
+              </a:xfrm>
+              <a:prstGeom prst="rect">
+                <a:avLst/>
+              </a:prstGeom>
+              <a:noFill/>
+            </p:spPr>
+            <p:txBody>
+              <a:bodyPr wrap="none" rtlCol="0">
+                <a:spAutoFit/>
+              </a:bodyPr>
+              <a:lstStyle/>
+              <a:p>
+                <a:pPr/>
+                <a14:m>
+                  <m:oMathPara xmlns:m="http://schemas.openxmlformats.org/officeDocument/2006/math">
+                    <m:oMathParaPr>
+                      <m:jc m:val="centerGroup"/>
+                    </m:oMathParaPr>
+                    <m:oMath xmlns:m="http://schemas.openxmlformats.org/officeDocument/2006/math">
+                      <m:r>
+                        <a:rPr lang="en-US" sz="1400" b="0" i="1" smtClean="0">
+                          <a:latin typeface="Cambria Math" panose="02040503050406030204" pitchFamily="18" charset="0"/>
+                        </a:rPr>
+                        <m:t>𝑥</m:t>
+                      </m:r>
+                      <m:r>
+                        <a:rPr lang="en-US" sz="1400" b="0" i="1" smtClean="0">
+                          <a:latin typeface="Cambria Math" panose="02040503050406030204" pitchFamily="18" charset="0"/>
+                        </a:rPr>
+                        <m:t>(</m:t>
+                      </m:r>
+                      <m:r>
+                        <a:rPr lang="en-US" sz="1400" i="1">
+                          <a:latin typeface="Cambria Math" panose="02040503050406030204" pitchFamily="18" charset="0"/>
+                        </a:rPr>
+                        <m:t>𝑡</m:t>
+                      </m:r>
+                      <m:r>
+                        <a:rPr lang="en-US" sz="1400" b="0" i="1" smtClean="0">
+                          <a:latin typeface="Cambria Math" panose="02040503050406030204" pitchFamily="18" charset="0"/>
+                        </a:rPr>
+                        <m:t>)</m:t>
+                      </m:r>
+                    </m:oMath>
+                  </m:oMathPara>
+                </a14:m>
+                <a:endParaRPr lang="en-US" sz="1400" dirty="0"/>
+              </a:p>
+            </p:txBody>
+          </p:sp>
+        </mc:Choice>
+        <mc:Fallback>
+          <p:sp>
+            <p:nvSpPr>
+              <p:cNvPr id="55" name="TextBox 54">
+                <a:extLst>
+                  <a:ext uri="{FF2B5EF4-FFF2-40B4-BE49-F238E27FC236}">
+                    <a16:creationId xmlns:a16="http://schemas.microsoft.com/office/drawing/2014/main" id="{6504B67D-3318-4C41-BBE7-49ADC40DD7F8}"/>
+                  </a:ext>
+                </a:extLst>
+              </p:cNvPr>
+              <p:cNvSpPr txBox="1">
+                <a:spLocks noRot="1" noChangeAspect="1" noMove="1" noResize="1" noEditPoints="1" noAdjustHandles="1" noChangeArrowheads="1" noChangeShapeType="1" noTextEdit="1"/>
+              </p:cNvSpPr>
+              <p:nvPr/>
+            </p:nvSpPr>
+            <p:spPr>
+              <a:xfrm>
+                <a:off x="2006214" y="2662238"/>
+                <a:ext cx="548740" cy="307777"/>
+              </a:xfrm>
+              <a:prstGeom prst="rect">
+                <a:avLst/>
+              </a:prstGeom>
+              <a:blipFill>
+                <a:blip r:embed="rId2"/>
+                <a:stretch>
+                  <a:fillRect b="-8000"/>
+                </a:stretch>
+              </a:blipFill>
+            </p:spPr>
+            <p:txBody>
+              <a:bodyPr/>
+              <a:lstStyle/>
+              <a:p>
+                <a:r>
+                  <a:rPr lang="en-US">
+                    <a:noFill/>
+                  </a:rPr>
+                  <a:t> </a:t>
+                </a:r>
+              </a:p>
+            </p:txBody>
+          </p:sp>
+        </mc:Fallback>
+      </mc:AlternateContent>
+      <p:sp>
+        <p:nvSpPr>
+          <p:cNvPr id="56" name="Freeform: Shape 55">
+            <a:extLst>
+              <a:ext uri="{FF2B5EF4-FFF2-40B4-BE49-F238E27FC236}">
+                <a16:creationId xmlns:a16="http://schemas.microsoft.com/office/drawing/2014/main" id="{89CEB82A-241F-4C15-9A95-717F56A6AE67}"/>
+              </a:ext>
+            </a:extLst>
+          </p:cNvPr>
+          <p:cNvSpPr/>
+          <p:nvPr/>
+        </p:nvSpPr>
+        <p:spPr>
+          <a:xfrm>
+            <a:off x="3913984" y="2712426"/>
+            <a:ext cx="548740" cy="572961"/>
+          </a:xfrm>
+          <a:custGeom>
+            <a:avLst/>
+            <a:gdLst>
+              <a:gd name="connsiteX0" fmla="*/ 0 w 9433249"/>
+              <a:gd name="connsiteY0" fmla="*/ 0 h 524408"/>
+              <a:gd name="connsiteX1" fmla="*/ 1101013 w 9433249"/>
+              <a:gd name="connsiteY1" fmla="*/ 485191 h 524408"/>
+              <a:gd name="connsiteX2" fmla="*/ 4646645 w 9433249"/>
+              <a:gd name="connsiteY2" fmla="*/ 494522 h 524408"/>
+              <a:gd name="connsiteX3" fmla="*/ 8192278 w 9433249"/>
+              <a:gd name="connsiteY3" fmla="*/ 494522 h 524408"/>
+              <a:gd name="connsiteX4" fmla="*/ 9433249 w 9433249"/>
+              <a:gd name="connsiteY4" fmla="*/ 494522 h 524408"/>
+              <a:gd name="connsiteX0" fmla="*/ 0 w 9433249"/>
+              <a:gd name="connsiteY0" fmla="*/ 0 h 524408"/>
+              <a:gd name="connsiteX1" fmla="*/ 1101013 w 9433249"/>
+              <a:gd name="connsiteY1" fmla="*/ 485191 h 524408"/>
+              <a:gd name="connsiteX2" fmla="*/ 4646645 w 9433249"/>
+              <a:gd name="connsiteY2" fmla="*/ 494522 h 524408"/>
+              <a:gd name="connsiteX3" fmla="*/ 9433249 w 9433249"/>
+              <a:gd name="connsiteY3" fmla="*/ 494522 h 524408"/>
+              <a:gd name="connsiteX0" fmla="*/ 0 w 9433249"/>
+              <a:gd name="connsiteY0" fmla="*/ 0 h 523927"/>
+              <a:gd name="connsiteX1" fmla="*/ 1101013 w 9433249"/>
+              <a:gd name="connsiteY1" fmla="*/ 485191 h 523927"/>
+              <a:gd name="connsiteX2" fmla="*/ 9433249 w 9433249"/>
+              <a:gd name="connsiteY2" fmla="*/ 494522 h 523927"/>
+              <a:gd name="connsiteX0" fmla="*/ 0 w 2475604"/>
+              <a:gd name="connsiteY0" fmla="*/ 120944 h 607088"/>
+              <a:gd name="connsiteX1" fmla="*/ 1101013 w 2475604"/>
+              <a:gd name="connsiteY1" fmla="*/ 606135 h 607088"/>
+              <a:gd name="connsiteX2" fmla="*/ 2475604 w 2475604"/>
+              <a:gd name="connsiteY2" fmla="*/ 4 h 607088"/>
+              <a:gd name="connsiteX0" fmla="*/ 0 w 2475604"/>
+              <a:gd name="connsiteY0" fmla="*/ 120940 h 607084"/>
+              <a:gd name="connsiteX1" fmla="*/ 1101013 w 2475604"/>
+              <a:gd name="connsiteY1" fmla="*/ 606131 h 607084"/>
+              <a:gd name="connsiteX2" fmla="*/ 2475604 w 2475604"/>
+              <a:gd name="connsiteY2" fmla="*/ 0 h 607084"/>
+              <a:gd name="connsiteX0" fmla="*/ 0 w 2305619"/>
+              <a:gd name="connsiteY0" fmla="*/ 296787 h 786921"/>
+              <a:gd name="connsiteX1" fmla="*/ 1101013 w 2305619"/>
+              <a:gd name="connsiteY1" fmla="*/ 781978 h 786921"/>
+              <a:gd name="connsiteX2" fmla="*/ 2305619 w 2305619"/>
+              <a:gd name="connsiteY2" fmla="*/ 0 h 786921"/>
+              <a:gd name="connsiteX0" fmla="*/ 0 w 2405266"/>
+              <a:gd name="connsiteY0" fmla="*/ 367125 h 790677"/>
+              <a:gd name="connsiteX1" fmla="*/ 1200660 w 2405266"/>
+              <a:gd name="connsiteY1" fmla="*/ 781978 h 790677"/>
+              <a:gd name="connsiteX2" fmla="*/ 2405266 w 2405266"/>
+              <a:gd name="connsiteY2" fmla="*/ 0 h 790677"/>
+              <a:gd name="connsiteX0" fmla="*/ 0 w 2405266"/>
+              <a:gd name="connsiteY0" fmla="*/ 367125 h 678116"/>
+              <a:gd name="connsiteX1" fmla="*/ 1106876 w 2405266"/>
+              <a:gd name="connsiteY1" fmla="*/ 664748 h 678116"/>
+              <a:gd name="connsiteX2" fmla="*/ 2405266 w 2405266"/>
+              <a:gd name="connsiteY2" fmla="*/ 0 h 678116"/>
+              <a:gd name="connsiteX0" fmla="*/ 0 w 1608096"/>
+              <a:gd name="connsiteY0" fmla="*/ 408156 h 721397"/>
+              <a:gd name="connsiteX1" fmla="*/ 1106876 w 1608096"/>
+              <a:gd name="connsiteY1" fmla="*/ 705779 h 721397"/>
+              <a:gd name="connsiteX2" fmla="*/ 1608096 w 1608096"/>
+              <a:gd name="connsiteY2" fmla="*/ 0 h 721397"/>
+              <a:gd name="connsiteX0" fmla="*/ 0 w 1608096"/>
+              <a:gd name="connsiteY0" fmla="*/ 408156 h 721397"/>
+              <a:gd name="connsiteX1" fmla="*/ 1106876 w 1608096"/>
+              <a:gd name="connsiteY1" fmla="*/ 705779 h 721397"/>
+              <a:gd name="connsiteX2" fmla="*/ 1608096 w 1608096"/>
+              <a:gd name="connsiteY2" fmla="*/ 0 h 721397"/>
+              <a:gd name="connsiteX0" fmla="*/ 0 w 1608096"/>
+              <a:gd name="connsiteY0" fmla="*/ 408156 h 721397"/>
+              <a:gd name="connsiteX1" fmla="*/ 1106876 w 1608096"/>
+              <a:gd name="connsiteY1" fmla="*/ 705779 h 721397"/>
+              <a:gd name="connsiteX2" fmla="*/ 1608096 w 1608096"/>
+              <a:gd name="connsiteY2" fmla="*/ 0 h 721397"/>
+              <a:gd name="connsiteX0" fmla="*/ 0 w 1608096"/>
+              <a:gd name="connsiteY0" fmla="*/ 408156 h 683586"/>
+              <a:gd name="connsiteX1" fmla="*/ 960337 w 1608096"/>
+              <a:gd name="connsiteY1" fmla="*/ 664749 h 683586"/>
+              <a:gd name="connsiteX2" fmla="*/ 1608096 w 1608096"/>
+              <a:gd name="connsiteY2" fmla="*/ 0 h 683586"/>
+              <a:gd name="connsiteX0" fmla="*/ 0 w 1608096"/>
+              <a:gd name="connsiteY0" fmla="*/ 408156 h 408156"/>
+              <a:gd name="connsiteX1" fmla="*/ 1608096 w 1608096"/>
+              <a:gd name="connsiteY1" fmla="*/ 0 h 408156"/>
+              <a:gd name="connsiteX0" fmla="*/ 0 w 1461557"/>
+              <a:gd name="connsiteY0" fmla="*/ 683648 h 683648"/>
+              <a:gd name="connsiteX1" fmla="*/ 1461557 w 1461557"/>
+              <a:gd name="connsiteY1" fmla="*/ 0 h 683648"/>
+              <a:gd name="connsiteX0" fmla="*/ 0 w 1520172"/>
+              <a:gd name="connsiteY0" fmla="*/ 736403 h 736403"/>
+              <a:gd name="connsiteX1" fmla="*/ 1520172 w 1520172"/>
+              <a:gd name="connsiteY1" fmla="*/ 0 h 736403"/>
+              <a:gd name="connsiteX0" fmla="*/ 0 w 1479141"/>
+              <a:gd name="connsiteY0" fmla="*/ 818464 h 818464"/>
+              <a:gd name="connsiteX1" fmla="*/ 1479141 w 1479141"/>
+              <a:gd name="connsiteY1" fmla="*/ 0 h 818464"/>
+            </a:gdLst>
+            <a:ahLst/>
+            <a:cxnLst>
+              <a:cxn ang="0">
+                <a:pos x="connsiteX0" y="connsiteY0"/>
+              </a:cxn>
+              <a:cxn ang="0">
+                <a:pos x="connsiteX1" y="connsiteY1"/>
+              </a:cxn>
+            </a:cxnLst>
+            <a:rect l="l" t="t" r="r" b="b"/>
+            <a:pathLst>
+              <a:path w="1479141" h="818464">
+                <a:moveTo>
+                  <a:pt x="0" y="818464"/>
+                </a:moveTo>
+                <a:lnTo>
+                  <a:pt x="1479141" y="0"/>
+                </a:lnTo>
+              </a:path>
+            </a:pathLst>
+          </a:custGeom>
+          <a:noFill/>
+        </p:spPr>
+        <p:style>
+          <a:lnRef idx="2">
+            <a:schemeClr val="accent1">
+              <a:shade val="50000"/>
+            </a:schemeClr>
+          </a:lnRef>
+          <a:fillRef idx="1">
+            <a:schemeClr val="accent1"/>
+          </a:fillRef>
+          <a:effectRef idx="0">
+            <a:schemeClr val="accent1"/>
+          </a:effectRef>
+          <a:fontRef idx="minor">
+            <a:schemeClr val="lt1"/>
+          </a:fontRef>
+        </p:style>
+        <p:txBody>
+          <a:bodyPr rtlCol="0" anchor="ctr"/>
+          <a:lstStyle/>
+          <a:p>
+            <a:pPr algn="ctr"/>
+            <a:endParaRPr lang="en-US" sz="1350"/>
+          </a:p>
+        </p:txBody>
+      </p:sp>
+      <p:sp>
+        <p:nvSpPr>
+          <p:cNvPr id="57" name="Freeform: Shape 56">
+            <a:extLst>
+              <a:ext uri="{FF2B5EF4-FFF2-40B4-BE49-F238E27FC236}">
+                <a16:creationId xmlns:a16="http://schemas.microsoft.com/office/drawing/2014/main" id="{18B63F13-5BBA-4C5F-9512-8FE393A9B6CA}"/>
+              </a:ext>
+            </a:extLst>
+          </p:cNvPr>
+          <p:cNvSpPr/>
+          <p:nvPr/>
+        </p:nvSpPr>
+        <p:spPr>
+          <a:xfrm>
+            <a:off x="4939703" y="2712425"/>
+            <a:ext cx="252155" cy="572961"/>
+          </a:xfrm>
+          <a:custGeom>
+            <a:avLst/>
+            <a:gdLst>
+              <a:gd name="connsiteX0" fmla="*/ 0 w 9433249"/>
+              <a:gd name="connsiteY0" fmla="*/ 0 h 524408"/>
+              <a:gd name="connsiteX1" fmla="*/ 1101013 w 9433249"/>
+              <a:gd name="connsiteY1" fmla="*/ 485191 h 524408"/>
+              <a:gd name="connsiteX2" fmla="*/ 4646645 w 9433249"/>
+              <a:gd name="connsiteY2" fmla="*/ 494522 h 524408"/>
+              <a:gd name="connsiteX3" fmla="*/ 8192278 w 9433249"/>
+              <a:gd name="connsiteY3" fmla="*/ 494522 h 524408"/>
+              <a:gd name="connsiteX4" fmla="*/ 9433249 w 9433249"/>
+              <a:gd name="connsiteY4" fmla="*/ 494522 h 524408"/>
+              <a:gd name="connsiteX0" fmla="*/ 0 w 9433249"/>
+              <a:gd name="connsiteY0" fmla="*/ 0 h 524408"/>
+              <a:gd name="connsiteX1" fmla="*/ 1101013 w 9433249"/>
+              <a:gd name="connsiteY1" fmla="*/ 485191 h 524408"/>
+              <a:gd name="connsiteX2" fmla="*/ 4646645 w 9433249"/>
+              <a:gd name="connsiteY2" fmla="*/ 494522 h 524408"/>
+              <a:gd name="connsiteX3" fmla="*/ 9433249 w 9433249"/>
+              <a:gd name="connsiteY3" fmla="*/ 494522 h 524408"/>
+              <a:gd name="connsiteX0" fmla="*/ 0 w 9433249"/>
+              <a:gd name="connsiteY0" fmla="*/ 0 h 523927"/>
+              <a:gd name="connsiteX1" fmla="*/ 1101013 w 9433249"/>
+              <a:gd name="connsiteY1" fmla="*/ 485191 h 523927"/>
+              <a:gd name="connsiteX2" fmla="*/ 9433249 w 9433249"/>
+              <a:gd name="connsiteY2" fmla="*/ 494522 h 523927"/>
+              <a:gd name="connsiteX0" fmla="*/ 0 w 2475604"/>
+              <a:gd name="connsiteY0" fmla="*/ 120944 h 607088"/>
+              <a:gd name="connsiteX1" fmla="*/ 1101013 w 2475604"/>
+              <a:gd name="connsiteY1" fmla="*/ 606135 h 607088"/>
+              <a:gd name="connsiteX2" fmla="*/ 2475604 w 2475604"/>
+              <a:gd name="connsiteY2" fmla="*/ 4 h 607088"/>
+              <a:gd name="connsiteX0" fmla="*/ 0 w 2475604"/>
+              <a:gd name="connsiteY0" fmla="*/ 120940 h 607084"/>
+              <a:gd name="connsiteX1" fmla="*/ 1101013 w 2475604"/>
+              <a:gd name="connsiteY1" fmla="*/ 606131 h 607084"/>
+              <a:gd name="connsiteX2" fmla="*/ 2475604 w 2475604"/>
+              <a:gd name="connsiteY2" fmla="*/ 0 h 607084"/>
+              <a:gd name="connsiteX0" fmla="*/ 0 w 2305619"/>
+              <a:gd name="connsiteY0" fmla="*/ 296787 h 786921"/>
+              <a:gd name="connsiteX1" fmla="*/ 1101013 w 2305619"/>
+              <a:gd name="connsiteY1" fmla="*/ 781978 h 786921"/>
+              <a:gd name="connsiteX2" fmla="*/ 2305619 w 2305619"/>
+              <a:gd name="connsiteY2" fmla="*/ 0 h 786921"/>
+              <a:gd name="connsiteX0" fmla="*/ 0 w 2405266"/>
+              <a:gd name="connsiteY0" fmla="*/ 367125 h 790677"/>
+              <a:gd name="connsiteX1" fmla="*/ 1200660 w 2405266"/>
+              <a:gd name="connsiteY1" fmla="*/ 781978 h 790677"/>
+              <a:gd name="connsiteX2" fmla="*/ 2405266 w 2405266"/>
+              <a:gd name="connsiteY2" fmla="*/ 0 h 790677"/>
+              <a:gd name="connsiteX0" fmla="*/ 0 w 2405266"/>
+              <a:gd name="connsiteY0" fmla="*/ 367125 h 678116"/>
+              <a:gd name="connsiteX1" fmla="*/ 1106876 w 2405266"/>
+              <a:gd name="connsiteY1" fmla="*/ 664748 h 678116"/>
+              <a:gd name="connsiteX2" fmla="*/ 2405266 w 2405266"/>
+              <a:gd name="connsiteY2" fmla="*/ 0 h 678116"/>
+              <a:gd name="connsiteX0" fmla="*/ 0 w 1608096"/>
+              <a:gd name="connsiteY0" fmla="*/ 408156 h 721397"/>
+              <a:gd name="connsiteX1" fmla="*/ 1106876 w 1608096"/>
+              <a:gd name="connsiteY1" fmla="*/ 705779 h 721397"/>
+              <a:gd name="connsiteX2" fmla="*/ 1608096 w 1608096"/>
+              <a:gd name="connsiteY2" fmla="*/ 0 h 721397"/>
+              <a:gd name="connsiteX0" fmla="*/ 0 w 1608096"/>
+              <a:gd name="connsiteY0" fmla="*/ 408156 h 721397"/>
+              <a:gd name="connsiteX1" fmla="*/ 1106876 w 1608096"/>
+              <a:gd name="connsiteY1" fmla="*/ 705779 h 721397"/>
+              <a:gd name="connsiteX2" fmla="*/ 1608096 w 1608096"/>
+              <a:gd name="connsiteY2" fmla="*/ 0 h 721397"/>
+              <a:gd name="connsiteX0" fmla="*/ 0 w 1608096"/>
+              <a:gd name="connsiteY0" fmla="*/ 408156 h 721397"/>
+              <a:gd name="connsiteX1" fmla="*/ 1106876 w 1608096"/>
+              <a:gd name="connsiteY1" fmla="*/ 705779 h 721397"/>
+              <a:gd name="connsiteX2" fmla="*/ 1608096 w 1608096"/>
+              <a:gd name="connsiteY2" fmla="*/ 0 h 721397"/>
+              <a:gd name="connsiteX0" fmla="*/ 0 w 1608096"/>
+              <a:gd name="connsiteY0" fmla="*/ 408156 h 683586"/>
+              <a:gd name="connsiteX1" fmla="*/ 960337 w 1608096"/>
+              <a:gd name="connsiteY1" fmla="*/ 664749 h 683586"/>
+              <a:gd name="connsiteX2" fmla="*/ 1608096 w 1608096"/>
+              <a:gd name="connsiteY2" fmla="*/ 0 h 683586"/>
+              <a:gd name="connsiteX0" fmla="*/ 0 w 1608096"/>
+              <a:gd name="connsiteY0" fmla="*/ 408156 h 408156"/>
+              <a:gd name="connsiteX1" fmla="*/ 1608096 w 1608096"/>
+              <a:gd name="connsiteY1" fmla="*/ 0 h 408156"/>
+              <a:gd name="connsiteX0" fmla="*/ 0 w 1461557"/>
+              <a:gd name="connsiteY0" fmla="*/ 683648 h 683648"/>
+              <a:gd name="connsiteX1" fmla="*/ 1461557 w 1461557"/>
+              <a:gd name="connsiteY1" fmla="*/ 0 h 683648"/>
+              <a:gd name="connsiteX0" fmla="*/ 0 w 1520172"/>
+              <a:gd name="connsiteY0" fmla="*/ 736403 h 736403"/>
+              <a:gd name="connsiteX1" fmla="*/ 1520172 w 1520172"/>
+              <a:gd name="connsiteY1" fmla="*/ 0 h 736403"/>
+              <a:gd name="connsiteX0" fmla="*/ 0 w 1479141"/>
+              <a:gd name="connsiteY0" fmla="*/ 818464 h 818464"/>
+              <a:gd name="connsiteX1" fmla="*/ 1479141 w 1479141"/>
+              <a:gd name="connsiteY1" fmla="*/ 0 h 818464"/>
+            </a:gdLst>
+            <a:ahLst/>
+            <a:cxnLst>
+              <a:cxn ang="0">
+                <a:pos x="connsiteX0" y="connsiteY0"/>
+              </a:cxn>
+              <a:cxn ang="0">
+                <a:pos x="connsiteX1" y="connsiteY1"/>
+              </a:cxn>
+            </a:cxnLst>
+            <a:rect l="l" t="t" r="r" b="b"/>
+            <a:pathLst>
+              <a:path w="1479141" h="818464">
+                <a:moveTo>
+                  <a:pt x="0" y="818464"/>
+                </a:moveTo>
+                <a:lnTo>
+                  <a:pt x="1479141" y="0"/>
+                </a:lnTo>
+              </a:path>
+            </a:pathLst>
+          </a:custGeom>
+          <a:noFill/>
+        </p:spPr>
+        <p:style>
+          <a:lnRef idx="2">
+            <a:schemeClr val="accent1">
+              <a:shade val="50000"/>
+            </a:schemeClr>
+          </a:lnRef>
+          <a:fillRef idx="1">
+            <a:schemeClr val="accent1"/>
+          </a:fillRef>
+          <a:effectRef idx="0">
+            <a:schemeClr val="accent1"/>
+          </a:effectRef>
+          <a:fontRef idx="minor">
+            <a:schemeClr val="lt1"/>
+          </a:fontRef>
+        </p:style>
+        <p:txBody>
+          <a:bodyPr rtlCol="0" anchor="ctr"/>
+          <a:lstStyle/>
+          <a:p>
+            <a:pPr algn="ctr"/>
+            <a:endParaRPr lang="en-US" sz="1350"/>
+          </a:p>
+        </p:txBody>
+      </p:sp>
+      <p:sp>
+        <p:nvSpPr>
+          <p:cNvPr id="58" name="Freeform: Shape 57">
+            <a:extLst>
+              <a:ext uri="{FF2B5EF4-FFF2-40B4-BE49-F238E27FC236}">
+                <a16:creationId xmlns:a16="http://schemas.microsoft.com/office/drawing/2014/main" id="{DF088B6C-70F3-490E-B28C-B21A2CE305AB}"/>
+              </a:ext>
+            </a:extLst>
+          </p:cNvPr>
+          <p:cNvSpPr/>
+          <p:nvPr/>
+        </p:nvSpPr>
+        <p:spPr>
+          <a:xfrm flipH="1">
+            <a:off x="5713266" y="2712424"/>
+            <a:ext cx="330819" cy="572961"/>
+          </a:xfrm>
+          <a:custGeom>
+            <a:avLst/>
+            <a:gdLst>
+              <a:gd name="connsiteX0" fmla="*/ 0 w 9433249"/>
+              <a:gd name="connsiteY0" fmla="*/ 0 h 524408"/>
+              <a:gd name="connsiteX1" fmla="*/ 1101013 w 9433249"/>
+              <a:gd name="connsiteY1" fmla="*/ 485191 h 524408"/>
+              <a:gd name="connsiteX2" fmla="*/ 4646645 w 9433249"/>
+              <a:gd name="connsiteY2" fmla="*/ 494522 h 524408"/>
+              <a:gd name="connsiteX3" fmla="*/ 8192278 w 9433249"/>
+              <a:gd name="connsiteY3" fmla="*/ 494522 h 524408"/>
+              <a:gd name="connsiteX4" fmla="*/ 9433249 w 9433249"/>
+              <a:gd name="connsiteY4" fmla="*/ 494522 h 524408"/>
+              <a:gd name="connsiteX0" fmla="*/ 0 w 9433249"/>
+              <a:gd name="connsiteY0" fmla="*/ 0 h 524408"/>
+              <a:gd name="connsiteX1" fmla="*/ 1101013 w 9433249"/>
+              <a:gd name="connsiteY1" fmla="*/ 485191 h 524408"/>
+              <a:gd name="connsiteX2" fmla="*/ 4646645 w 9433249"/>
+              <a:gd name="connsiteY2" fmla="*/ 494522 h 524408"/>
+              <a:gd name="connsiteX3" fmla="*/ 9433249 w 9433249"/>
+              <a:gd name="connsiteY3" fmla="*/ 494522 h 524408"/>
+              <a:gd name="connsiteX0" fmla="*/ 0 w 9433249"/>
+              <a:gd name="connsiteY0" fmla="*/ 0 h 523927"/>
+              <a:gd name="connsiteX1" fmla="*/ 1101013 w 9433249"/>
+              <a:gd name="connsiteY1" fmla="*/ 485191 h 523927"/>
+              <a:gd name="connsiteX2" fmla="*/ 9433249 w 9433249"/>
+              <a:gd name="connsiteY2" fmla="*/ 494522 h 523927"/>
+              <a:gd name="connsiteX0" fmla="*/ 0 w 2475604"/>
+              <a:gd name="connsiteY0" fmla="*/ 120944 h 607088"/>
+              <a:gd name="connsiteX1" fmla="*/ 1101013 w 2475604"/>
+              <a:gd name="connsiteY1" fmla="*/ 606135 h 607088"/>
+              <a:gd name="connsiteX2" fmla="*/ 2475604 w 2475604"/>
+              <a:gd name="connsiteY2" fmla="*/ 4 h 607088"/>
+              <a:gd name="connsiteX0" fmla="*/ 0 w 2475604"/>
+              <a:gd name="connsiteY0" fmla="*/ 120940 h 607084"/>
+              <a:gd name="connsiteX1" fmla="*/ 1101013 w 2475604"/>
+              <a:gd name="connsiteY1" fmla="*/ 606131 h 607084"/>
+              <a:gd name="connsiteX2" fmla="*/ 2475604 w 2475604"/>
+              <a:gd name="connsiteY2" fmla="*/ 0 h 607084"/>
+              <a:gd name="connsiteX0" fmla="*/ 0 w 2305619"/>
+              <a:gd name="connsiteY0" fmla="*/ 296787 h 786921"/>
+              <a:gd name="connsiteX1" fmla="*/ 1101013 w 2305619"/>
+              <a:gd name="connsiteY1" fmla="*/ 781978 h 786921"/>
+              <a:gd name="connsiteX2" fmla="*/ 2305619 w 2305619"/>
+              <a:gd name="connsiteY2" fmla="*/ 0 h 786921"/>
+              <a:gd name="connsiteX0" fmla="*/ 0 w 2405266"/>
+              <a:gd name="connsiteY0" fmla="*/ 367125 h 790677"/>
+              <a:gd name="connsiteX1" fmla="*/ 1200660 w 2405266"/>
+              <a:gd name="connsiteY1" fmla="*/ 781978 h 790677"/>
+              <a:gd name="connsiteX2" fmla="*/ 2405266 w 2405266"/>
+              <a:gd name="connsiteY2" fmla="*/ 0 h 790677"/>
+              <a:gd name="connsiteX0" fmla="*/ 0 w 2405266"/>
+              <a:gd name="connsiteY0" fmla="*/ 367125 h 678116"/>
+              <a:gd name="connsiteX1" fmla="*/ 1106876 w 2405266"/>
+              <a:gd name="connsiteY1" fmla="*/ 664748 h 678116"/>
+              <a:gd name="connsiteX2" fmla="*/ 2405266 w 2405266"/>
+              <a:gd name="connsiteY2" fmla="*/ 0 h 678116"/>
+              <a:gd name="connsiteX0" fmla="*/ 0 w 1608096"/>
+              <a:gd name="connsiteY0" fmla="*/ 408156 h 721397"/>
+              <a:gd name="connsiteX1" fmla="*/ 1106876 w 1608096"/>
+              <a:gd name="connsiteY1" fmla="*/ 705779 h 721397"/>
+              <a:gd name="connsiteX2" fmla="*/ 1608096 w 1608096"/>
+              <a:gd name="connsiteY2" fmla="*/ 0 h 721397"/>
+              <a:gd name="connsiteX0" fmla="*/ 0 w 1608096"/>
+              <a:gd name="connsiteY0" fmla="*/ 408156 h 721397"/>
+              <a:gd name="connsiteX1" fmla="*/ 1106876 w 1608096"/>
+              <a:gd name="connsiteY1" fmla="*/ 705779 h 721397"/>
+              <a:gd name="connsiteX2" fmla="*/ 1608096 w 1608096"/>
+              <a:gd name="connsiteY2" fmla="*/ 0 h 721397"/>
+              <a:gd name="connsiteX0" fmla="*/ 0 w 1608096"/>
+              <a:gd name="connsiteY0" fmla="*/ 408156 h 721397"/>
+              <a:gd name="connsiteX1" fmla="*/ 1106876 w 1608096"/>
+              <a:gd name="connsiteY1" fmla="*/ 705779 h 721397"/>
+              <a:gd name="connsiteX2" fmla="*/ 1608096 w 1608096"/>
+              <a:gd name="connsiteY2" fmla="*/ 0 h 721397"/>
+              <a:gd name="connsiteX0" fmla="*/ 0 w 1608096"/>
+              <a:gd name="connsiteY0" fmla="*/ 408156 h 683586"/>
+              <a:gd name="connsiteX1" fmla="*/ 960337 w 1608096"/>
+              <a:gd name="connsiteY1" fmla="*/ 664749 h 683586"/>
+              <a:gd name="connsiteX2" fmla="*/ 1608096 w 1608096"/>
+              <a:gd name="connsiteY2" fmla="*/ 0 h 683586"/>
+              <a:gd name="connsiteX0" fmla="*/ 0 w 1608096"/>
+              <a:gd name="connsiteY0" fmla="*/ 408156 h 408156"/>
+              <a:gd name="connsiteX1" fmla="*/ 1608096 w 1608096"/>
+              <a:gd name="connsiteY1" fmla="*/ 0 h 408156"/>
+              <a:gd name="connsiteX0" fmla="*/ 0 w 1461557"/>
+              <a:gd name="connsiteY0" fmla="*/ 683648 h 683648"/>
+              <a:gd name="connsiteX1" fmla="*/ 1461557 w 1461557"/>
+              <a:gd name="connsiteY1" fmla="*/ 0 h 683648"/>
+              <a:gd name="connsiteX0" fmla="*/ 0 w 1520172"/>
+              <a:gd name="connsiteY0" fmla="*/ 736403 h 736403"/>
+              <a:gd name="connsiteX1" fmla="*/ 1520172 w 1520172"/>
+              <a:gd name="connsiteY1" fmla="*/ 0 h 736403"/>
+              <a:gd name="connsiteX0" fmla="*/ 0 w 1479141"/>
+              <a:gd name="connsiteY0" fmla="*/ 818464 h 818464"/>
+              <a:gd name="connsiteX1" fmla="*/ 1479141 w 1479141"/>
+              <a:gd name="connsiteY1" fmla="*/ 0 h 818464"/>
+            </a:gdLst>
+            <a:ahLst/>
+            <a:cxnLst>
+              <a:cxn ang="0">
+                <a:pos x="connsiteX0" y="connsiteY0"/>
+              </a:cxn>
+              <a:cxn ang="0">
+                <a:pos x="connsiteX1" y="connsiteY1"/>
+              </a:cxn>
+            </a:cxnLst>
+            <a:rect l="l" t="t" r="r" b="b"/>
+            <a:pathLst>
+              <a:path w="1479141" h="818464">
+                <a:moveTo>
+                  <a:pt x="0" y="818464"/>
+                </a:moveTo>
+                <a:lnTo>
+                  <a:pt x="1479141" y="0"/>
+                </a:lnTo>
+              </a:path>
+            </a:pathLst>
+          </a:custGeom>
+          <a:noFill/>
+        </p:spPr>
+        <p:style>
+          <a:lnRef idx="2">
+            <a:schemeClr val="accent1">
+              <a:shade val="50000"/>
+            </a:schemeClr>
+          </a:lnRef>
+          <a:fillRef idx="1">
+            <a:schemeClr val="accent1"/>
+          </a:fillRef>
+          <a:effectRef idx="0">
+            <a:schemeClr val="accent1"/>
+          </a:effectRef>
+          <a:fontRef idx="minor">
+            <a:schemeClr val="lt1"/>
+          </a:fontRef>
+        </p:style>
+        <p:txBody>
+          <a:bodyPr rtlCol="0" anchor="ctr"/>
+          <a:lstStyle/>
+          <a:p>
+            <a:pPr algn="ctr"/>
+            <a:endParaRPr lang="en-US" sz="1350"/>
+          </a:p>
+        </p:txBody>
+      </p:sp>
+      <mc:AlternateContent xmlns:mc="http://schemas.openxmlformats.org/markup-compatibility/2006">
+        <mc:Choice xmlns:a14="http://schemas.microsoft.com/office/drawing/2010/main" Requires="a14">
+          <p:sp>
+            <p:nvSpPr>
+              <p:cNvPr id="59" name="TextBox 58">
+                <a:extLst>
+                  <a:ext uri="{FF2B5EF4-FFF2-40B4-BE49-F238E27FC236}">
+                    <a16:creationId xmlns:a16="http://schemas.microsoft.com/office/drawing/2014/main" id="{57C4A6E6-8167-4EEB-8262-7E2BFEB59320}"/>
+                  </a:ext>
+                </a:extLst>
+              </p:cNvPr>
+              <p:cNvSpPr txBox="1"/>
+              <p:nvPr/>
+            </p:nvSpPr>
+            <p:spPr>
+              <a:xfrm>
+                <a:off x="6396085" y="2895625"/>
+                <a:ext cx="548740" cy="307777"/>
+              </a:xfrm>
+              <a:prstGeom prst="rect">
+                <a:avLst/>
+              </a:prstGeom>
+              <a:noFill/>
+            </p:spPr>
+            <p:txBody>
+              <a:bodyPr wrap="none" rtlCol="0">
+                <a:spAutoFit/>
+              </a:bodyPr>
+              <a:lstStyle/>
+              <a:p>
+                <a:pPr/>
+                <a14:m>
+                  <m:oMathPara xmlns:m="http://schemas.openxmlformats.org/officeDocument/2006/math">
+                    <m:oMathParaPr>
+                      <m:jc m:val="centerGroup"/>
+                    </m:oMathParaPr>
+                    <m:oMath xmlns:m="http://schemas.openxmlformats.org/officeDocument/2006/math">
+                      <m:r>
+                        <a:rPr lang="en-US" sz="1400" b="0" i="1" smtClean="0">
+                          <a:latin typeface="Cambria Math" panose="02040503050406030204" pitchFamily="18" charset="0"/>
+                        </a:rPr>
+                        <m:t>𝑦</m:t>
+                      </m:r>
+                      <m:r>
+                        <a:rPr lang="en-US" sz="1400" b="0" i="1" smtClean="0">
+                          <a:latin typeface="Cambria Math" panose="02040503050406030204" pitchFamily="18" charset="0"/>
+                        </a:rPr>
+                        <m:t>(</m:t>
+                      </m:r>
+                      <m:r>
+                        <a:rPr lang="en-US" sz="1400" i="1">
+                          <a:latin typeface="Cambria Math" panose="02040503050406030204" pitchFamily="18" charset="0"/>
+                        </a:rPr>
+                        <m:t>𝑡</m:t>
+                      </m:r>
+                      <m:r>
+                        <a:rPr lang="en-US" sz="1400" b="0" i="1" smtClean="0">
+                          <a:latin typeface="Cambria Math" panose="02040503050406030204" pitchFamily="18" charset="0"/>
+                        </a:rPr>
+                        <m:t>)</m:t>
+                      </m:r>
+                    </m:oMath>
+                  </m:oMathPara>
+                </a14:m>
+                <a:endParaRPr lang="en-US" sz="1400" dirty="0"/>
+              </a:p>
+            </p:txBody>
+          </p:sp>
+        </mc:Choice>
+        <mc:Fallback>
+          <p:sp>
+            <p:nvSpPr>
+              <p:cNvPr id="59" name="TextBox 58">
+                <a:extLst>
+                  <a:ext uri="{FF2B5EF4-FFF2-40B4-BE49-F238E27FC236}">
+                    <a16:creationId xmlns:a16="http://schemas.microsoft.com/office/drawing/2014/main" id="{57C4A6E6-8167-4EEB-8262-7E2BFEB59320}"/>
+                  </a:ext>
+                </a:extLst>
+              </p:cNvPr>
+              <p:cNvSpPr txBox="1">
+                <a:spLocks noRot="1" noChangeAspect="1" noMove="1" noResize="1" noEditPoints="1" noAdjustHandles="1" noChangeArrowheads="1" noChangeShapeType="1" noTextEdit="1"/>
+              </p:cNvSpPr>
+              <p:nvPr/>
+            </p:nvSpPr>
+            <p:spPr>
+              <a:xfrm>
+                <a:off x="6396085" y="2895625"/>
+                <a:ext cx="548740" cy="307777"/>
+              </a:xfrm>
+              <a:prstGeom prst="rect">
+                <a:avLst/>
+              </a:prstGeom>
+              <a:blipFill>
+                <a:blip r:embed="rId3"/>
+                <a:stretch>
+                  <a:fillRect b="-8000"/>
+                </a:stretch>
+              </a:blipFill>
+            </p:spPr>
+            <p:txBody>
+              <a:bodyPr/>
+              <a:lstStyle/>
+              <a:p>
+                <a:r>
+                  <a:rPr lang="en-US">
+                    <a:noFill/>
+                  </a:rPr>
+                  <a:t> </a:t>
+                </a:r>
+              </a:p>
+            </p:txBody>
+          </p:sp>
+        </mc:Fallback>
+      </mc:AlternateContent>
+      <p:sp>
+        <p:nvSpPr>
+          <p:cNvPr id="60" name="Freeform: Shape 59">
+            <a:extLst>
+              <a:ext uri="{FF2B5EF4-FFF2-40B4-BE49-F238E27FC236}">
+                <a16:creationId xmlns:a16="http://schemas.microsoft.com/office/drawing/2014/main" id="{AD576205-DF54-4B14-B2E2-2E735A2303D1}"/>
+              </a:ext>
+            </a:extLst>
+          </p:cNvPr>
+          <p:cNvSpPr/>
+          <p:nvPr/>
+        </p:nvSpPr>
+        <p:spPr>
+          <a:xfrm>
+            <a:off x="3908046" y="1071197"/>
+            <a:ext cx="580427" cy="613848"/>
+          </a:xfrm>
+          <a:custGeom>
+            <a:avLst/>
+            <a:gdLst>
+              <a:gd name="connsiteX0" fmla="*/ 0 w 9433249"/>
+              <a:gd name="connsiteY0" fmla="*/ 0 h 524408"/>
+              <a:gd name="connsiteX1" fmla="*/ 1101013 w 9433249"/>
+              <a:gd name="connsiteY1" fmla="*/ 485191 h 524408"/>
+              <a:gd name="connsiteX2" fmla="*/ 4646645 w 9433249"/>
+              <a:gd name="connsiteY2" fmla="*/ 494522 h 524408"/>
+              <a:gd name="connsiteX3" fmla="*/ 8192278 w 9433249"/>
+              <a:gd name="connsiteY3" fmla="*/ 494522 h 524408"/>
+              <a:gd name="connsiteX4" fmla="*/ 9433249 w 9433249"/>
+              <a:gd name="connsiteY4" fmla="*/ 494522 h 524408"/>
+              <a:gd name="connsiteX0" fmla="*/ 0 w 9433249"/>
+              <a:gd name="connsiteY0" fmla="*/ 0 h 524408"/>
+              <a:gd name="connsiteX1" fmla="*/ 1101013 w 9433249"/>
+              <a:gd name="connsiteY1" fmla="*/ 485191 h 524408"/>
+              <a:gd name="connsiteX2" fmla="*/ 4646645 w 9433249"/>
+              <a:gd name="connsiteY2" fmla="*/ 494522 h 524408"/>
+              <a:gd name="connsiteX3" fmla="*/ 9433249 w 9433249"/>
+              <a:gd name="connsiteY3" fmla="*/ 494522 h 524408"/>
+              <a:gd name="connsiteX0" fmla="*/ 0 w 9433249"/>
+              <a:gd name="connsiteY0" fmla="*/ 0 h 523927"/>
+              <a:gd name="connsiteX1" fmla="*/ 1101013 w 9433249"/>
+              <a:gd name="connsiteY1" fmla="*/ 485191 h 523927"/>
+              <a:gd name="connsiteX2" fmla="*/ 9433249 w 9433249"/>
+              <a:gd name="connsiteY2" fmla="*/ 494522 h 523927"/>
+              <a:gd name="connsiteX0" fmla="*/ 0 w 2475604"/>
+              <a:gd name="connsiteY0" fmla="*/ 120944 h 607088"/>
+              <a:gd name="connsiteX1" fmla="*/ 1101013 w 2475604"/>
+              <a:gd name="connsiteY1" fmla="*/ 606135 h 607088"/>
+              <a:gd name="connsiteX2" fmla="*/ 2475604 w 2475604"/>
+              <a:gd name="connsiteY2" fmla="*/ 4 h 607088"/>
+              <a:gd name="connsiteX0" fmla="*/ 0 w 2475604"/>
+              <a:gd name="connsiteY0" fmla="*/ 120940 h 607084"/>
+              <a:gd name="connsiteX1" fmla="*/ 1101013 w 2475604"/>
+              <a:gd name="connsiteY1" fmla="*/ 606131 h 607084"/>
+              <a:gd name="connsiteX2" fmla="*/ 2475604 w 2475604"/>
+              <a:gd name="connsiteY2" fmla="*/ 0 h 607084"/>
+              <a:gd name="connsiteX0" fmla="*/ 0 w 2305619"/>
+              <a:gd name="connsiteY0" fmla="*/ 296787 h 786921"/>
+              <a:gd name="connsiteX1" fmla="*/ 1101013 w 2305619"/>
+              <a:gd name="connsiteY1" fmla="*/ 781978 h 786921"/>
+              <a:gd name="connsiteX2" fmla="*/ 2305619 w 2305619"/>
+              <a:gd name="connsiteY2" fmla="*/ 0 h 786921"/>
+              <a:gd name="connsiteX0" fmla="*/ 0 w 2405266"/>
+              <a:gd name="connsiteY0" fmla="*/ 367125 h 790677"/>
+              <a:gd name="connsiteX1" fmla="*/ 1200660 w 2405266"/>
+              <a:gd name="connsiteY1" fmla="*/ 781978 h 790677"/>
+              <a:gd name="connsiteX2" fmla="*/ 2405266 w 2405266"/>
+              <a:gd name="connsiteY2" fmla="*/ 0 h 790677"/>
+              <a:gd name="connsiteX0" fmla="*/ 0 w 2405266"/>
+              <a:gd name="connsiteY0" fmla="*/ 367125 h 678116"/>
+              <a:gd name="connsiteX1" fmla="*/ 1106876 w 2405266"/>
+              <a:gd name="connsiteY1" fmla="*/ 664748 h 678116"/>
+              <a:gd name="connsiteX2" fmla="*/ 2405266 w 2405266"/>
+              <a:gd name="connsiteY2" fmla="*/ 0 h 678116"/>
+              <a:gd name="connsiteX0" fmla="*/ 0 w 1608096"/>
+              <a:gd name="connsiteY0" fmla="*/ 408156 h 721397"/>
+              <a:gd name="connsiteX1" fmla="*/ 1106876 w 1608096"/>
+              <a:gd name="connsiteY1" fmla="*/ 705779 h 721397"/>
+              <a:gd name="connsiteX2" fmla="*/ 1608096 w 1608096"/>
+              <a:gd name="connsiteY2" fmla="*/ 0 h 721397"/>
+              <a:gd name="connsiteX0" fmla="*/ 0 w 1608096"/>
+              <a:gd name="connsiteY0" fmla="*/ 408156 h 721397"/>
+              <a:gd name="connsiteX1" fmla="*/ 1106876 w 1608096"/>
+              <a:gd name="connsiteY1" fmla="*/ 705779 h 721397"/>
+              <a:gd name="connsiteX2" fmla="*/ 1608096 w 1608096"/>
+              <a:gd name="connsiteY2" fmla="*/ 0 h 721397"/>
+              <a:gd name="connsiteX0" fmla="*/ 0 w 1608096"/>
+              <a:gd name="connsiteY0" fmla="*/ 408156 h 721397"/>
+              <a:gd name="connsiteX1" fmla="*/ 1106876 w 1608096"/>
+              <a:gd name="connsiteY1" fmla="*/ 705779 h 721397"/>
+              <a:gd name="connsiteX2" fmla="*/ 1608096 w 1608096"/>
+              <a:gd name="connsiteY2" fmla="*/ 0 h 721397"/>
+              <a:gd name="connsiteX0" fmla="*/ 0 w 1608096"/>
+              <a:gd name="connsiteY0" fmla="*/ 408156 h 683586"/>
+              <a:gd name="connsiteX1" fmla="*/ 960337 w 1608096"/>
+              <a:gd name="connsiteY1" fmla="*/ 664749 h 683586"/>
+              <a:gd name="connsiteX2" fmla="*/ 1608096 w 1608096"/>
+              <a:gd name="connsiteY2" fmla="*/ 0 h 683586"/>
+              <a:gd name="connsiteX0" fmla="*/ 0 w 1608096"/>
+              <a:gd name="connsiteY0" fmla="*/ 408156 h 408156"/>
+              <a:gd name="connsiteX1" fmla="*/ 1608096 w 1608096"/>
+              <a:gd name="connsiteY1" fmla="*/ 0 h 408156"/>
+              <a:gd name="connsiteX0" fmla="*/ 0 w 1461557"/>
+              <a:gd name="connsiteY0" fmla="*/ 683648 h 683648"/>
+              <a:gd name="connsiteX1" fmla="*/ 1461557 w 1461557"/>
+              <a:gd name="connsiteY1" fmla="*/ 0 h 683648"/>
+              <a:gd name="connsiteX0" fmla="*/ 0 w 1520172"/>
+              <a:gd name="connsiteY0" fmla="*/ 736403 h 736403"/>
+              <a:gd name="connsiteX1" fmla="*/ 1520172 w 1520172"/>
+              <a:gd name="connsiteY1" fmla="*/ 0 h 736403"/>
+              <a:gd name="connsiteX0" fmla="*/ 0 w 1479141"/>
+              <a:gd name="connsiteY0" fmla="*/ 818464 h 818464"/>
+              <a:gd name="connsiteX1" fmla="*/ 1479141 w 1479141"/>
+              <a:gd name="connsiteY1" fmla="*/ 0 h 818464"/>
+            </a:gdLst>
+            <a:ahLst/>
+            <a:cxnLst>
+              <a:cxn ang="0">
+                <a:pos x="connsiteX0" y="connsiteY0"/>
+              </a:cxn>
+              <a:cxn ang="0">
+                <a:pos x="connsiteX1" y="connsiteY1"/>
+              </a:cxn>
+            </a:cxnLst>
+            <a:rect l="l" t="t" r="r" b="b"/>
+            <a:pathLst>
+              <a:path w="1479141" h="818464">
+                <a:moveTo>
+                  <a:pt x="0" y="818464"/>
+                </a:moveTo>
+                <a:lnTo>
+                  <a:pt x="1479141" y="0"/>
+                </a:lnTo>
+              </a:path>
+            </a:pathLst>
+          </a:custGeom>
+          <a:noFill/>
+        </p:spPr>
+        <p:style>
+          <a:lnRef idx="2">
+            <a:schemeClr val="accent1">
+              <a:shade val="50000"/>
+            </a:schemeClr>
+          </a:lnRef>
+          <a:fillRef idx="1">
+            <a:schemeClr val="accent1"/>
+          </a:fillRef>
+          <a:effectRef idx="0">
+            <a:schemeClr val="accent1"/>
+          </a:effectRef>
+          <a:fontRef idx="minor">
+            <a:schemeClr val="lt1"/>
+          </a:fontRef>
+        </p:style>
+        <p:txBody>
+          <a:bodyPr rtlCol="0" anchor="ctr"/>
+          <a:lstStyle/>
+          <a:p>
+            <a:pPr algn="ctr"/>
+            <a:endParaRPr lang="en-US" sz="1350"/>
+          </a:p>
+        </p:txBody>
+      </p:sp>
+      <p:sp>
+        <p:nvSpPr>
+          <p:cNvPr id="61" name="Freeform: Shape 60">
+            <a:extLst>
+              <a:ext uri="{FF2B5EF4-FFF2-40B4-BE49-F238E27FC236}">
+                <a16:creationId xmlns:a16="http://schemas.microsoft.com/office/drawing/2014/main" id="{4C0EC9BA-22A4-4C63-8921-A3A5F416ADA8}"/>
+              </a:ext>
+            </a:extLst>
+          </p:cNvPr>
+          <p:cNvSpPr/>
+          <p:nvPr/>
+        </p:nvSpPr>
+        <p:spPr>
+          <a:xfrm>
+            <a:off x="3894858" y="464532"/>
+            <a:ext cx="587328" cy="741308"/>
+          </a:xfrm>
+          <a:custGeom>
+            <a:avLst/>
+            <a:gdLst>
+              <a:gd name="connsiteX0" fmla="*/ 0 w 9433249"/>
+              <a:gd name="connsiteY0" fmla="*/ 0 h 524408"/>
+              <a:gd name="connsiteX1" fmla="*/ 1101013 w 9433249"/>
+              <a:gd name="connsiteY1" fmla="*/ 485191 h 524408"/>
+              <a:gd name="connsiteX2" fmla="*/ 4646645 w 9433249"/>
+              <a:gd name="connsiteY2" fmla="*/ 494522 h 524408"/>
+              <a:gd name="connsiteX3" fmla="*/ 8192278 w 9433249"/>
+              <a:gd name="connsiteY3" fmla="*/ 494522 h 524408"/>
+              <a:gd name="connsiteX4" fmla="*/ 9433249 w 9433249"/>
+              <a:gd name="connsiteY4" fmla="*/ 494522 h 524408"/>
+              <a:gd name="connsiteX0" fmla="*/ 0 w 9433249"/>
+              <a:gd name="connsiteY0" fmla="*/ 0 h 524408"/>
+              <a:gd name="connsiteX1" fmla="*/ 1101013 w 9433249"/>
+              <a:gd name="connsiteY1" fmla="*/ 485191 h 524408"/>
+              <a:gd name="connsiteX2" fmla="*/ 4646645 w 9433249"/>
+              <a:gd name="connsiteY2" fmla="*/ 494522 h 524408"/>
+              <a:gd name="connsiteX3" fmla="*/ 9433249 w 9433249"/>
+              <a:gd name="connsiteY3" fmla="*/ 494522 h 524408"/>
+              <a:gd name="connsiteX0" fmla="*/ 0 w 9433249"/>
+              <a:gd name="connsiteY0" fmla="*/ 0 h 523927"/>
+              <a:gd name="connsiteX1" fmla="*/ 1101013 w 9433249"/>
+              <a:gd name="connsiteY1" fmla="*/ 485191 h 523927"/>
+              <a:gd name="connsiteX2" fmla="*/ 9433249 w 9433249"/>
+              <a:gd name="connsiteY2" fmla="*/ 494522 h 523927"/>
+              <a:gd name="connsiteX0" fmla="*/ 0 w 2475604"/>
+              <a:gd name="connsiteY0" fmla="*/ 120944 h 607088"/>
+              <a:gd name="connsiteX1" fmla="*/ 1101013 w 2475604"/>
+              <a:gd name="connsiteY1" fmla="*/ 606135 h 607088"/>
+              <a:gd name="connsiteX2" fmla="*/ 2475604 w 2475604"/>
+              <a:gd name="connsiteY2" fmla="*/ 4 h 607088"/>
+              <a:gd name="connsiteX0" fmla="*/ 0 w 2475604"/>
+              <a:gd name="connsiteY0" fmla="*/ 120940 h 607084"/>
+              <a:gd name="connsiteX1" fmla="*/ 1101013 w 2475604"/>
+              <a:gd name="connsiteY1" fmla="*/ 606131 h 607084"/>
+              <a:gd name="connsiteX2" fmla="*/ 2475604 w 2475604"/>
+              <a:gd name="connsiteY2" fmla="*/ 0 h 607084"/>
+              <a:gd name="connsiteX0" fmla="*/ 0 w 2305619"/>
+              <a:gd name="connsiteY0" fmla="*/ 296787 h 786921"/>
+              <a:gd name="connsiteX1" fmla="*/ 1101013 w 2305619"/>
+              <a:gd name="connsiteY1" fmla="*/ 781978 h 786921"/>
+              <a:gd name="connsiteX2" fmla="*/ 2305619 w 2305619"/>
+              <a:gd name="connsiteY2" fmla="*/ 0 h 786921"/>
+              <a:gd name="connsiteX0" fmla="*/ 0 w 2405266"/>
+              <a:gd name="connsiteY0" fmla="*/ 367125 h 790677"/>
+              <a:gd name="connsiteX1" fmla="*/ 1200660 w 2405266"/>
+              <a:gd name="connsiteY1" fmla="*/ 781978 h 790677"/>
+              <a:gd name="connsiteX2" fmla="*/ 2405266 w 2405266"/>
+              <a:gd name="connsiteY2" fmla="*/ 0 h 790677"/>
+              <a:gd name="connsiteX0" fmla="*/ 0 w 2405266"/>
+              <a:gd name="connsiteY0" fmla="*/ 367125 h 678116"/>
+              <a:gd name="connsiteX1" fmla="*/ 1106876 w 2405266"/>
+              <a:gd name="connsiteY1" fmla="*/ 664748 h 678116"/>
+              <a:gd name="connsiteX2" fmla="*/ 2405266 w 2405266"/>
+              <a:gd name="connsiteY2" fmla="*/ 0 h 678116"/>
+              <a:gd name="connsiteX0" fmla="*/ 0 w 1608096"/>
+              <a:gd name="connsiteY0" fmla="*/ 408156 h 721397"/>
+              <a:gd name="connsiteX1" fmla="*/ 1106876 w 1608096"/>
+              <a:gd name="connsiteY1" fmla="*/ 705779 h 721397"/>
+              <a:gd name="connsiteX2" fmla="*/ 1608096 w 1608096"/>
+              <a:gd name="connsiteY2" fmla="*/ 0 h 721397"/>
+              <a:gd name="connsiteX0" fmla="*/ 0 w 1608096"/>
+              <a:gd name="connsiteY0" fmla="*/ 408156 h 721397"/>
+              <a:gd name="connsiteX1" fmla="*/ 1106876 w 1608096"/>
+              <a:gd name="connsiteY1" fmla="*/ 705779 h 721397"/>
+              <a:gd name="connsiteX2" fmla="*/ 1608096 w 1608096"/>
+              <a:gd name="connsiteY2" fmla="*/ 0 h 721397"/>
+              <a:gd name="connsiteX0" fmla="*/ 0 w 1608096"/>
+              <a:gd name="connsiteY0" fmla="*/ 408156 h 721397"/>
+              <a:gd name="connsiteX1" fmla="*/ 1106876 w 1608096"/>
+              <a:gd name="connsiteY1" fmla="*/ 705779 h 721397"/>
+              <a:gd name="connsiteX2" fmla="*/ 1608096 w 1608096"/>
+              <a:gd name="connsiteY2" fmla="*/ 0 h 721397"/>
+              <a:gd name="connsiteX0" fmla="*/ 0 w 1608096"/>
+              <a:gd name="connsiteY0" fmla="*/ 408156 h 683586"/>
+              <a:gd name="connsiteX1" fmla="*/ 960337 w 1608096"/>
+              <a:gd name="connsiteY1" fmla="*/ 664749 h 683586"/>
+              <a:gd name="connsiteX2" fmla="*/ 1608096 w 1608096"/>
+              <a:gd name="connsiteY2" fmla="*/ 0 h 683586"/>
+              <a:gd name="connsiteX0" fmla="*/ 0 w 1608096"/>
+              <a:gd name="connsiteY0" fmla="*/ 837225 h 864760"/>
+              <a:gd name="connsiteX1" fmla="*/ 813799 w 1608096"/>
+              <a:gd name="connsiteY1" fmla="*/ 3572 h 864760"/>
+              <a:gd name="connsiteX2" fmla="*/ 1608096 w 1608096"/>
+              <a:gd name="connsiteY2" fmla="*/ 429069 h 864760"/>
+              <a:gd name="connsiteX0" fmla="*/ 0 w 1608096"/>
+              <a:gd name="connsiteY0" fmla="*/ 837225 h 837225"/>
+              <a:gd name="connsiteX1" fmla="*/ 813799 w 1608096"/>
+              <a:gd name="connsiteY1" fmla="*/ 3572 h 837225"/>
+              <a:gd name="connsiteX2" fmla="*/ 1608096 w 1608096"/>
+              <a:gd name="connsiteY2" fmla="*/ 429069 h 837225"/>
+              <a:gd name="connsiteX0" fmla="*/ 0 w 1608096"/>
+              <a:gd name="connsiteY0" fmla="*/ 847908 h 847908"/>
+              <a:gd name="connsiteX1" fmla="*/ 813799 w 1608096"/>
+              <a:gd name="connsiteY1" fmla="*/ 14255 h 847908"/>
+              <a:gd name="connsiteX2" fmla="*/ 1608096 w 1608096"/>
+              <a:gd name="connsiteY2" fmla="*/ 439752 h 847908"/>
+              <a:gd name="connsiteX0" fmla="*/ 0 w 1496727"/>
+              <a:gd name="connsiteY0" fmla="*/ 1101757 h 1101757"/>
+              <a:gd name="connsiteX1" fmla="*/ 702430 w 1496727"/>
+              <a:gd name="connsiteY1" fmla="*/ 27782 h 1101757"/>
+              <a:gd name="connsiteX2" fmla="*/ 1496727 w 1496727"/>
+              <a:gd name="connsiteY2" fmla="*/ 453279 h 1101757"/>
+              <a:gd name="connsiteX0" fmla="*/ 0 w 1496727"/>
+              <a:gd name="connsiteY0" fmla="*/ 1101757 h 1101757"/>
+              <a:gd name="connsiteX1" fmla="*/ 702430 w 1496727"/>
+              <a:gd name="connsiteY1" fmla="*/ 27782 h 1101757"/>
+              <a:gd name="connsiteX2" fmla="*/ 1496727 w 1496727"/>
+              <a:gd name="connsiteY2" fmla="*/ 453279 h 1101757"/>
+              <a:gd name="connsiteX0" fmla="*/ 0 w 1496727"/>
+              <a:gd name="connsiteY0" fmla="*/ 998154 h 998154"/>
+              <a:gd name="connsiteX1" fmla="*/ 761044 w 1496727"/>
+              <a:gd name="connsiteY1" fmla="*/ 41410 h 998154"/>
+              <a:gd name="connsiteX2" fmla="*/ 1496727 w 1496727"/>
+              <a:gd name="connsiteY2" fmla="*/ 349676 h 998154"/>
+              <a:gd name="connsiteX0" fmla="*/ 0 w 1496727"/>
+              <a:gd name="connsiteY0" fmla="*/ 988409 h 988409"/>
+              <a:gd name="connsiteX1" fmla="*/ 702429 w 1496727"/>
+              <a:gd name="connsiteY1" fmla="*/ 43388 h 988409"/>
+              <a:gd name="connsiteX2" fmla="*/ 1496727 w 1496727"/>
+              <a:gd name="connsiteY2" fmla="*/ 339931 h 988409"/>
+              <a:gd name="connsiteX0" fmla="*/ 0 w 1496727"/>
+              <a:gd name="connsiteY0" fmla="*/ 988409 h 988409"/>
+              <a:gd name="connsiteX1" fmla="*/ 702429 w 1496727"/>
+              <a:gd name="connsiteY1" fmla="*/ 43388 h 988409"/>
+              <a:gd name="connsiteX2" fmla="*/ 1496727 w 1496727"/>
+              <a:gd name="connsiteY2" fmla="*/ 339931 h 988409"/>
+            </a:gdLst>
+            <a:ahLst/>
+            <a:cxnLst>
+              <a:cxn ang="0">
+                <a:pos x="connsiteX0" y="connsiteY0"/>
+              </a:cxn>
+              <a:cxn ang="0">
+                <a:pos x="connsiteX1" y="connsiteY1"/>
+              </a:cxn>
+              <a:cxn ang="0">
+                <a:pos x="connsiteX2" y="connsiteY2"/>
+              </a:cxn>
+            </a:cxnLst>
+            <a:rect l="l" t="t" r="r" b="b"/>
+            <a:pathLst>
+              <a:path w="1496727" h="988409">
+                <a:moveTo>
+                  <a:pt x="0" y="988409"/>
+                </a:moveTo>
+                <a:cubicBezTo>
+                  <a:pt x="28472" y="486410"/>
+                  <a:pt x="452975" y="151468"/>
+                  <a:pt x="702429" y="43388"/>
+                </a:cubicBezTo>
+                <a:cubicBezTo>
+                  <a:pt x="951883" y="-64692"/>
+                  <a:pt x="1355184" y="27328"/>
+                  <a:pt x="1496727" y="339931"/>
+                </a:cubicBezTo>
+              </a:path>
+            </a:pathLst>
+          </a:custGeom>
+          <a:noFill/>
+        </p:spPr>
+        <p:style>
+          <a:lnRef idx="2">
+            <a:schemeClr val="accent1">
+              <a:shade val="50000"/>
+            </a:schemeClr>
+          </a:lnRef>
+          <a:fillRef idx="1">
+            <a:schemeClr val="accent1"/>
+          </a:fillRef>
+          <a:effectRef idx="0">
+            <a:schemeClr val="accent1"/>
+          </a:effectRef>
+          <a:fontRef idx="minor">
+            <a:schemeClr val="lt1"/>
+          </a:fontRef>
+        </p:style>
+        <p:txBody>
+          <a:bodyPr rtlCol="0" anchor="ctr"/>
+          <a:lstStyle/>
+          <a:p>
+            <a:pPr algn="ctr"/>
+            <a:endParaRPr lang="en-US" sz="1350"/>
+          </a:p>
+        </p:txBody>
+      </p:sp>
+      <p:sp>
+        <p:nvSpPr>
+          <p:cNvPr id="62" name="Freeform: Shape 61">
+            <a:extLst>
+              <a:ext uri="{FF2B5EF4-FFF2-40B4-BE49-F238E27FC236}">
+                <a16:creationId xmlns:a16="http://schemas.microsoft.com/office/drawing/2014/main" id="{6AC23E08-C502-4ED2-9352-AB89FDD0E764}"/>
+              </a:ext>
+            </a:extLst>
+          </p:cNvPr>
+          <p:cNvSpPr/>
+          <p:nvPr/>
+        </p:nvSpPr>
+        <p:spPr>
+          <a:xfrm>
+            <a:off x="3908047" y="1557505"/>
+            <a:ext cx="587328" cy="765400"/>
+          </a:xfrm>
+          <a:custGeom>
+            <a:avLst/>
+            <a:gdLst>
+              <a:gd name="connsiteX0" fmla="*/ 0 w 9433249"/>
+              <a:gd name="connsiteY0" fmla="*/ 0 h 524408"/>
+              <a:gd name="connsiteX1" fmla="*/ 1101013 w 9433249"/>
+              <a:gd name="connsiteY1" fmla="*/ 485191 h 524408"/>
+              <a:gd name="connsiteX2" fmla="*/ 4646645 w 9433249"/>
+              <a:gd name="connsiteY2" fmla="*/ 494522 h 524408"/>
+              <a:gd name="connsiteX3" fmla="*/ 8192278 w 9433249"/>
+              <a:gd name="connsiteY3" fmla="*/ 494522 h 524408"/>
+              <a:gd name="connsiteX4" fmla="*/ 9433249 w 9433249"/>
+              <a:gd name="connsiteY4" fmla="*/ 494522 h 524408"/>
+              <a:gd name="connsiteX0" fmla="*/ 0 w 9433249"/>
+              <a:gd name="connsiteY0" fmla="*/ 0 h 524408"/>
+              <a:gd name="connsiteX1" fmla="*/ 1101013 w 9433249"/>
+              <a:gd name="connsiteY1" fmla="*/ 485191 h 524408"/>
+              <a:gd name="connsiteX2" fmla="*/ 4646645 w 9433249"/>
+              <a:gd name="connsiteY2" fmla="*/ 494522 h 524408"/>
+              <a:gd name="connsiteX3" fmla="*/ 9433249 w 9433249"/>
+              <a:gd name="connsiteY3" fmla="*/ 494522 h 524408"/>
+              <a:gd name="connsiteX0" fmla="*/ 0 w 9433249"/>
+              <a:gd name="connsiteY0" fmla="*/ 0 h 523927"/>
+              <a:gd name="connsiteX1" fmla="*/ 1101013 w 9433249"/>
+              <a:gd name="connsiteY1" fmla="*/ 485191 h 523927"/>
+              <a:gd name="connsiteX2" fmla="*/ 9433249 w 9433249"/>
+              <a:gd name="connsiteY2" fmla="*/ 494522 h 523927"/>
+              <a:gd name="connsiteX0" fmla="*/ 0 w 2475604"/>
+              <a:gd name="connsiteY0" fmla="*/ 120944 h 607088"/>
+              <a:gd name="connsiteX1" fmla="*/ 1101013 w 2475604"/>
+              <a:gd name="connsiteY1" fmla="*/ 606135 h 607088"/>
+              <a:gd name="connsiteX2" fmla="*/ 2475604 w 2475604"/>
+              <a:gd name="connsiteY2" fmla="*/ 4 h 607088"/>
+              <a:gd name="connsiteX0" fmla="*/ 0 w 2475604"/>
+              <a:gd name="connsiteY0" fmla="*/ 120940 h 607084"/>
+              <a:gd name="connsiteX1" fmla="*/ 1101013 w 2475604"/>
+              <a:gd name="connsiteY1" fmla="*/ 606131 h 607084"/>
+              <a:gd name="connsiteX2" fmla="*/ 2475604 w 2475604"/>
+              <a:gd name="connsiteY2" fmla="*/ 0 h 607084"/>
+              <a:gd name="connsiteX0" fmla="*/ 0 w 2305619"/>
+              <a:gd name="connsiteY0" fmla="*/ 296787 h 786921"/>
+              <a:gd name="connsiteX1" fmla="*/ 1101013 w 2305619"/>
+              <a:gd name="connsiteY1" fmla="*/ 781978 h 786921"/>
+              <a:gd name="connsiteX2" fmla="*/ 2305619 w 2305619"/>
+              <a:gd name="connsiteY2" fmla="*/ 0 h 786921"/>
+              <a:gd name="connsiteX0" fmla="*/ 0 w 2405266"/>
+              <a:gd name="connsiteY0" fmla="*/ 367125 h 790677"/>
+              <a:gd name="connsiteX1" fmla="*/ 1200660 w 2405266"/>
+              <a:gd name="connsiteY1" fmla="*/ 781978 h 790677"/>
+              <a:gd name="connsiteX2" fmla="*/ 2405266 w 2405266"/>
+              <a:gd name="connsiteY2" fmla="*/ 0 h 790677"/>
+              <a:gd name="connsiteX0" fmla="*/ 0 w 2405266"/>
+              <a:gd name="connsiteY0" fmla="*/ 367125 h 678116"/>
+              <a:gd name="connsiteX1" fmla="*/ 1106876 w 2405266"/>
+              <a:gd name="connsiteY1" fmla="*/ 664748 h 678116"/>
+              <a:gd name="connsiteX2" fmla="*/ 2405266 w 2405266"/>
+              <a:gd name="connsiteY2" fmla="*/ 0 h 678116"/>
+              <a:gd name="connsiteX0" fmla="*/ 0 w 1608096"/>
+              <a:gd name="connsiteY0" fmla="*/ 408156 h 721397"/>
+              <a:gd name="connsiteX1" fmla="*/ 1106876 w 1608096"/>
+              <a:gd name="connsiteY1" fmla="*/ 705779 h 721397"/>
+              <a:gd name="connsiteX2" fmla="*/ 1608096 w 1608096"/>
+              <a:gd name="connsiteY2" fmla="*/ 0 h 721397"/>
+              <a:gd name="connsiteX0" fmla="*/ 0 w 1608096"/>
+              <a:gd name="connsiteY0" fmla="*/ 408156 h 721397"/>
+              <a:gd name="connsiteX1" fmla="*/ 1106876 w 1608096"/>
+              <a:gd name="connsiteY1" fmla="*/ 705779 h 721397"/>
+              <a:gd name="connsiteX2" fmla="*/ 1608096 w 1608096"/>
+              <a:gd name="connsiteY2" fmla="*/ 0 h 721397"/>
+              <a:gd name="connsiteX0" fmla="*/ 0 w 1608096"/>
+              <a:gd name="connsiteY0" fmla="*/ 408156 h 721397"/>
+              <a:gd name="connsiteX1" fmla="*/ 1106876 w 1608096"/>
+              <a:gd name="connsiteY1" fmla="*/ 705779 h 721397"/>
+              <a:gd name="connsiteX2" fmla="*/ 1608096 w 1608096"/>
+              <a:gd name="connsiteY2" fmla="*/ 0 h 721397"/>
+              <a:gd name="connsiteX0" fmla="*/ 0 w 1608096"/>
+              <a:gd name="connsiteY0" fmla="*/ 408156 h 683586"/>
+              <a:gd name="connsiteX1" fmla="*/ 960337 w 1608096"/>
+              <a:gd name="connsiteY1" fmla="*/ 664749 h 683586"/>
+              <a:gd name="connsiteX2" fmla="*/ 1608096 w 1608096"/>
+              <a:gd name="connsiteY2" fmla="*/ 0 h 683586"/>
+              <a:gd name="connsiteX0" fmla="*/ 0 w 1608096"/>
+              <a:gd name="connsiteY0" fmla="*/ 837225 h 864760"/>
+              <a:gd name="connsiteX1" fmla="*/ 813799 w 1608096"/>
+              <a:gd name="connsiteY1" fmla="*/ 3572 h 864760"/>
+              <a:gd name="connsiteX2" fmla="*/ 1608096 w 1608096"/>
+              <a:gd name="connsiteY2" fmla="*/ 429069 h 864760"/>
+              <a:gd name="connsiteX0" fmla="*/ 0 w 1608096"/>
+              <a:gd name="connsiteY0" fmla="*/ 837225 h 837225"/>
+              <a:gd name="connsiteX1" fmla="*/ 813799 w 1608096"/>
+              <a:gd name="connsiteY1" fmla="*/ 3572 h 837225"/>
+              <a:gd name="connsiteX2" fmla="*/ 1608096 w 1608096"/>
+              <a:gd name="connsiteY2" fmla="*/ 429069 h 837225"/>
+              <a:gd name="connsiteX0" fmla="*/ 0 w 1608096"/>
+              <a:gd name="connsiteY0" fmla="*/ 847908 h 847908"/>
+              <a:gd name="connsiteX1" fmla="*/ 813799 w 1608096"/>
+              <a:gd name="connsiteY1" fmla="*/ 14255 h 847908"/>
+              <a:gd name="connsiteX2" fmla="*/ 1608096 w 1608096"/>
+              <a:gd name="connsiteY2" fmla="*/ 439752 h 847908"/>
+              <a:gd name="connsiteX0" fmla="*/ 0 w 1496727"/>
+              <a:gd name="connsiteY0" fmla="*/ 1101757 h 1101757"/>
+              <a:gd name="connsiteX1" fmla="*/ 702430 w 1496727"/>
+              <a:gd name="connsiteY1" fmla="*/ 27782 h 1101757"/>
+              <a:gd name="connsiteX2" fmla="*/ 1496727 w 1496727"/>
+              <a:gd name="connsiteY2" fmla="*/ 453279 h 1101757"/>
+              <a:gd name="connsiteX0" fmla="*/ 0 w 1496727"/>
+              <a:gd name="connsiteY0" fmla="*/ 1101757 h 1101757"/>
+              <a:gd name="connsiteX1" fmla="*/ 702430 w 1496727"/>
+              <a:gd name="connsiteY1" fmla="*/ 27782 h 1101757"/>
+              <a:gd name="connsiteX2" fmla="*/ 1496727 w 1496727"/>
+              <a:gd name="connsiteY2" fmla="*/ 453279 h 1101757"/>
+              <a:gd name="connsiteX0" fmla="*/ 0 w 1496727"/>
+              <a:gd name="connsiteY0" fmla="*/ 998154 h 998154"/>
+              <a:gd name="connsiteX1" fmla="*/ 761044 w 1496727"/>
+              <a:gd name="connsiteY1" fmla="*/ 41410 h 998154"/>
+              <a:gd name="connsiteX2" fmla="*/ 1496727 w 1496727"/>
+              <a:gd name="connsiteY2" fmla="*/ 349676 h 998154"/>
+              <a:gd name="connsiteX0" fmla="*/ 0 w 1496727"/>
+              <a:gd name="connsiteY0" fmla="*/ 988409 h 988409"/>
+              <a:gd name="connsiteX1" fmla="*/ 702429 w 1496727"/>
+              <a:gd name="connsiteY1" fmla="*/ 43388 h 988409"/>
+              <a:gd name="connsiteX2" fmla="*/ 1496727 w 1496727"/>
+              <a:gd name="connsiteY2" fmla="*/ 339931 h 988409"/>
+              <a:gd name="connsiteX0" fmla="*/ 0 w 1496727"/>
+              <a:gd name="connsiteY0" fmla="*/ 988409 h 988409"/>
+              <a:gd name="connsiteX1" fmla="*/ 702429 w 1496727"/>
+              <a:gd name="connsiteY1" fmla="*/ 43388 h 988409"/>
+              <a:gd name="connsiteX2" fmla="*/ 1496727 w 1496727"/>
+              <a:gd name="connsiteY2" fmla="*/ 339931 h 988409"/>
+              <a:gd name="connsiteX0" fmla="*/ 0 w 1496727"/>
+              <a:gd name="connsiteY0" fmla="*/ 700797 h 1042301"/>
+              <a:gd name="connsiteX1" fmla="*/ 784491 w 1496727"/>
+              <a:gd name="connsiteY1" fmla="*/ 1033590 h 1042301"/>
+              <a:gd name="connsiteX2" fmla="*/ 1496727 w 1496727"/>
+              <a:gd name="connsiteY2" fmla="*/ 52319 h 1042301"/>
+              <a:gd name="connsiteX0" fmla="*/ 0 w 1496727"/>
+              <a:gd name="connsiteY0" fmla="*/ 700797 h 1072850"/>
+              <a:gd name="connsiteX1" fmla="*/ 784491 w 1496727"/>
+              <a:gd name="connsiteY1" fmla="*/ 1033590 h 1072850"/>
+              <a:gd name="connsiteX2" fmla="*/ 1496727 w 1496727"/>
+              <a:gd name="connsiteY2" fmla="*/ 52319 h 1072850"/>
+              <a:gd name="connsiteX0" fmla="*/ 0 w 1496727"/>
+              <a:gd name="connsiteY0" fmla="*/ 648478 h 1020531"/>
+              <a:gd name="connsiteX1" fmla="*/ 784491 w 1496727"/>
+              <a:gd name="connsiteY1" fmla="*/ 981271 h 1020531"/>
+              <a:gd name="connsiteX2" fmla="*/ 1496727 w 1496727"/>
+              <a:gd name="connsiteY2" fmla="*/ 0 h 1020531"/>
+            </a:gdLst>
+            <a:ahLst/>
+            <a:cxnLst>
+              <a:cxn ang="0">
+                <a:pos x="connsiteX0" y="connsiteY0"/>
+              </a:cxn>
+              <a:cxn ang="0">
+                <a:pos x="connsiteX1" y="connsiteY1"/>
+              </a:cxn>
+              <a:cxn ang="0">
+                <a:pos x="connsiteX2" y="connsiteY2"/>
+              </a:cxn>
+            </a:cxnLst>
+            <a:rect l="l" t="t" r="r" b="b"/>
+            <a:pathLst>
+              <a:path w="1496727" h="1020531">
+                <a:moveTo>
+                  <a:pt x="0" y="648478"/>
+                </a:moveTo>
+                <a:cubicBezTo>
+                  <a:pt x="104672" y="972955"/>
+                  <a:pt x="535037" y="1089351"/>
+                  <a:pt x="784491" y="981271"/>
+                </a:cubicBezTo>
+                <a:cubicBezTo>
+                  <a:pt x="1033945" y="873191"/>
+                  <a:pt x="1378631" y="431812"/>
+                  <a:pt x="1496727" y="0"/>
+                </a:cubicBezTo>
+              </a:path>
+            </a:pathLst>
+          </a:custGeom>
+          <a:noFill/>
+        </p:spPr>
+        <p:style>
+          <a:lnRef idx="2">
+            <a:schemeClr val="accent1">
+              <a:shade val="50000"/>
+            </a:schemeClr>
+          </a:lnRef>
+          <a:fillRef idx="1">
+            <a:schemeClr val="accent1"/>
+          </a:fillRef>
+          <a:effectRef idx="0">
+            <a:schemeClr val="accent1"/>
+          </a:effectRef>
+          <a:fontRef idx="minor">
+            <a:schemeClr val="lt1"/>
+          </a:fontRef>
+        </p:style>
+        <p:txBody>
+          <a:bodyPr rtlCol="0" anchor="ctr"/>
+          <a:lstStyle/>
+          <a:p>
+            <a:pPr algn="ctr"/>
+            <a:endParaRPr lang="en-US" sz="1350"/>
+          </a:p>
+        </p:txBody>
+      </p:sp>
+      <p:sp>
+        <p:nvSpPr>
+          <p:cNvPr id="63" name="Freeform: Shape 62">
+            <a:extLst>
+              <a:ext uri="{FF2B5EF4-FFF2-40B4-BE49-F238E27FC236}">
+                <a16:creationId xmlns:a16="http://schemas.microsoft.com/office/drawing/2014/main" id="{17683909-D664-40F0-A90E-A532BE6BC52A}"/>
+              </a:ext>
+            </a:extLst>
+          </p:cNvPr>
+          <p:cNvSpPr/>
+          <p:nvPr/>
+        </p:nvSpPr>
+        <p:spPr>
+          <a:xfrm>
+            <a:off x="4939703" y="1071197"/>
+            <a:ext cx="252155" cy="613848"/>
+          </a:xfrm>
+          <a:custGeom>
+            <a:avLst/>
+            <a:gdLst>
+              <a:gd name="connsiteX0" fmla="*/ 0 w 9433249"/>
+              <a:gd name="connsiteY0" fmla="*/ 0 h 524408"/>
+              <a:gd name="connsiteX1" fmla="*/ 1101013 w 9433249"/>
+              <a:gd name="connsiteY1" fmla="*/ 485191 h 524408"/>
+              <a:gd name="connsiteX2" fmla="*/ 4646645 w 9433249"/>
+              <a:gd name="connsiteY2" fmla="*/ 494522 h 524408"/>
+              <a:gd name="connsiteX3" fmla="*/ 8192278 w 9433249"/>
+              <a:gd name="connsiteY3" fmla="*/ 494522 h 524408"/>
+              <a:gd name="connsiteX4" fmla="*/ 9433249 w 9433249"/>
+              <a:gd name="connsiteY4" fmla="*/ 494522 h 524408"/>
+              <a:gd name="connsiteX0" fmla="*/ 0 w 9433249"/>
+              <a:gd name="connsiteY0" fmla="*/ 0 h 524408"/>
+              <a:gd name="connsiteX1" fmla="*/ 1101013 w 9433249"/>
+              <a:gd name="connsiteY1" fmla="*/ 485191 h 524408"/>
+              <a:gd name="connsiteX2" fmla="*/ 4646645 w 9433249"/>
+              <a:gd name="connsiteY2" fmla="*/ 494522 h 524408"/>
+              <a:gd name="connsiteX3" fmla="*/ 9433249 w 9433249"/>
+              <a:gd name="connsiteY3" fmla="*/ 494522 h 524408"/>
+              <a:gd name="connsiteX0" fmla="*/ 0 w 9433249"/>
+              <a:gd name="connsiteY0" fmla="*/ 0 h 523927"/>
+              <a:gd name="connsiteX1" fmla="*/ 1101013 w 9433249"/>
+              <a:gd name="connsiteY1" fmla="*/ 485191 h 523927"/>
+              <a:gd name="connsiteX2" fmla="*/ 9433249 w 9433249"/>
+              <a:gd name="connsiteY2" fmla="*/ 494522 h 523927"/>
+              <a:gd name="connsiteX0" fmla="*/ 0 w 2475604"/>
+              <a:gd name="connsiteY0" fmla="*/ 120944 h 607088"/>
+              <a:gd name="connsiteX1" fmla="*/ 1101013 w 2475604"/>
+              <a:gd name="connsiteY1" fmla="*/ 606135 h 607088"/>
+              <a:gd name="connsiteX2" fmla="*/ 2475604 w 2475604"/>
+              <a:gd name="connsiteY2" fmla="*/ 4 h 607088"/>
+              <a:gd name="connsiteX0" fmla="*/ 0 w 2475604"/>
+              <a:gd name="connsiteY0" fmla="*/ 120940 h 607084"/>
+              <a:gd name="connsiteX1" fmla="*/ 1101013 w 2475604"/>
+              <a:gd name="connsiteY1" fmla="*/ 606131 h 607084"/>
+              <a:gd name="connsiteX2" fmla="*/ 2475604 w 2475604"/>
+              <a:gd name="connsiteY2" fmla="*/ 0 h 607084"/>
+              <a:gd name="connsiteX0" fmla="*/ 0 w 2305619"/>
+              <a:gd name="connsiteY0" fmla="*/ 296787 h 786921"/>
+              <a:gd name="connsiteX1" fmla="*/ 1101013 w 2305619"/>
+              <a:gd name="connsiteY1" fmla="*/ 781978 h 786921"/>
+              <a:gd name="connsiteX2" fmla="*/ 2305619 w 2305619"/>
+              <a:gd name="connsiteY2" fmla="*/ 0 h 786921"/>
+              <a:gd name="connsiteX0" fmla="*/ 0 w 2405266"/>
+              <a:gd name="connsiteY0" fmla="*/ 367125 h 790677"/>
+              <a:gd name="connsiteX1" fmla="*/ 1200660 w 2405266"/>
+              <a:gd name="connsiteY1" fmla="*/ 781978 h 790677"/>
+              <a:gd name="connsiteX2" fmla="*/ 2405266 w 2405266"/>
+              <a:gd name="connsiteY2" fmla="*/ 0 h 790677"/>
+              <a:gd name="connsiteX0" fmla="*/ 0 w 2405266"/>
+              <a:gd name="connsiteY0" fmla="*/ 367125 h 678116"/>
+              <a:gd name="connsiteX1" fmla="*/ 1106876 w 2405266"/>
+              <a:gd name="connsiteY1" fmla="*/ 664748 h 678116"/>
+              <a:gd name="connsiteX2" fmla="*/ 2405266 w 2405266"/>
+              <a:gd name="connsiteY2" fmla="*/ 0 h 678116"/>
+              <a:gd name="connsiteX0" fmla="*/ 0 w 1608096"/>
+              <a:gd name="connsiteY0" fmla="*/ 408156 h 721397"/>
+              <a:gd name="connsiteX1" fmla="*/ 1106876 w 1608096"/>
+              <a:gd name="connsiteY1" fmla="*/ 705779 h 721397"/>
+              <a:gd name="connsiteX2" fmla="*/ 1608096 w 1608096"/>
+              <a:gd name="connsiteY2" fmla="*/ 0 h 721397"/>
+              <a:gd name="connsiteX0" fmla="*/ 0 w 1608096"/>
+              <a:gd name="connsiteY0" fmla="*/ 408156 h 721397"/>
+              <a:gd name="connsiteX1" fmla="*/ 1106876 w 1608096"/>
+              <a:gd name="connsiteY1" fmla="*/ 705779 h 721397"/>
+              <a:gd name="connsiteX2" fmla="*/ 1608096 w 1608096"/>
+              <a:gd name="connsiteY2" fmla="*/ 0 h 721397"/>
+              <a:gd name="connsiteX0" fmla="*/ 0 w 1608096"/>
+              <a:gd name="connsiteY0" fmla="*/ 408156 h 721397"/>
+              <a:gd name="connsiteX1" fmla="*/ 1106876 w 1608096"/>
+              <a:gd name="connsiteY1" fmla="*/ 705779 h 721397"/>
+              <a:gd name="connsiteX2" fmla="*/ 1608096 w 1608096"/>
+              <a:gd name="connsiteY2" fmla="*/ 0 h 721397"/>
+              <a:gd name="connsiteX0" fmla="*/ 0 w 1608096"/>
+              <a:gd name="connsiteY0" fmla="*/ 408156 h 683586"/>
+              <a:gd name="connsiteX1" fmla="*/ 960337 w 1608096"/>
+              <a:gd name="connsiteY1" fmla="*/ 664749 h 683586"/>
+              <a:gd name="connsiteX2" fmla="*/ 1608096 w 1608096"/>
+              <a:gd name="connsiteY2" fmla="*/ 0 h 683586"/>
+              <a:gd name="connsiteX0" fmla="*/ 0 w 1608096"/>
+              <a:gd name="connsiteY0" fmla="*/ 408156 h 408156"/>
+              <a:gd name="connsiteX1" fmla="*/ 1608096 w 1608096"/>
+              <a:gd name="connsiteY1" fmla="*/ 0 h 408156"/>
+              <a:gd name="connsiteX0" fmla="*/ 0 w 1461557"/>
+              <a:gd name="connsiteY0" fmla="*/ 683648 h 683648"/>
+              <a:gd name="connsiteX1" fmla="*/ 1461557 w 1461557"/>
+              <a:gd name="connsiteY1" fmla="*/ 0 h 683648"/>
+              <a:gd name="connsiteX0" fmla="*/ 0 w 1520172"/>
+              <a:gd name="connsiteY0" fmla="*/ 736403 h 736403"/>
+              <a:gd name="connsiteX1" fmla="*/ 1520172 w 1520172"/>
+              <a:gd name="connsiteY1" fmla="*/ 0 h 736403"/>
+              <a:gd name="connsiteX0" fmla="*/ 0 w 1479141"/>
+              <a:gd name="connsiteY0" fmla="*/ 818464 h 818464"/>
+              <a:gd name="connsiteX1" fmla="*/ 1479141 w 1479141"/>
+              <a:gd name="connsiteY1" fmla="*/ 0 h 818464"/>
+            </a:gdLst>
+            <a:ahLst/>
+            <a:cxnLst>
+              <a:cxn ang="0">
+                <a:pos x="connsiteX0" y="connsiteY0"/>
+              </a:cxn>
+              <a:cxn ang="0">
+                <a:pos x="connsiteX1" y="connsiteY1"/>
+              </a:cxn>
+            </a:cxnLst>
+            <a:rect l="l" t="t" r="r" b="b"/>
+            <a:pathLst>
+              <a:path w="1479141" h="818464">
+                <a:moveTo>
+                  <a:pt x="0" y="818464"/>
+                </a:moveTo>
+                <a:lnTo>
+                  <a:pt x="1479141" y="0"/>
+                </a:lnTo>
+              </a:path>
+            </a:pathLst>
+          </a:custGeom>
+          <a:noFill/>
+        </p:spPr>
+        <p:style>
+          <a:lnRef idx="2">
+            <a:schemeClr val="accent1">
+              <a:shade val="50000"/>
+            </a:schemeClr>
+          </a:lnRef>
+          <a:fillRef idx="1">
+            <a:schemeClr val="accent1"/>
+          </a:fillRef>
+          <a:effectRef idx="0">
+            <a:schemeClr val="accent1"/>
+          </a:effectRef>
+          <a:fontRef idx="minor">
+            <a:schemeClr val="lt1"/>
+          </a:fontRef>
+        </p:style>
+        <p:txBody>
+          <a:bodyPr rtlCol="0" anchor="ctr"/>
+          <a:lstStyle/>
+          <a:p>
+            <a:pPr algn="ctr"/>
+            <a:endParaRPr lang="en-US" sz="1350"/>
+          </a:p>
+        </p:txBody>
+      </p:sp>
+      <p:sp>
+        <p:nvSpPr>
+          <p:cNvPr id="64" name="Freeform: Shape 63">
+            <a:extLst>
+              <a:ext uri="{FF2B5EF4-FFF2-40B4-BE49-F238E27FC236}">
+                <a16:creationId xmlns:a16="http://schemas.microsoft.com/office/drawing/2014/main" id="{D727E641-43E0-4331-9D44-DAD3694DF756}"/>
+              </a:ext>
+            </a:extLst>
+          </p:cNvPr>
+          <p:cNvSpPr/>
+          <p:nvPr/>
+        </p:nvSpPr>
+        <p:spPr>
+          <a:xfrm>
+            <a:off x="4926515" y="464532"/>
+            <a:ext cx="255153" cy="741308"/>
+          </a:xfrm>
+          <a:custGeom>
+            <a:avLst/>
+            <a:gdLst>
+              <a:gd name="connsiteX0" fmla="*/ 0 w 9433249"/>
+              <a:gd name="connsiteY0" fmla="*/ 0 h 524408"/>
+              <a:gd name="connsiteX1" fmla="*/ 1101013 w 9433249"/>
+              <a:gd name="connsiteY1" fmla="*/ 485191 h 524408"/>
+              <a:gd name="connsiteX2" fmla="*/ 4646645 w 9433249"/>
+              <a:gd name="connsiteY2" fmla="*/ 494522 h 524408"/>
+              <a:gd name="connsiteX3" fmla="*/ 8192278 w 9433249"/>
+              <a:gd name="connsiteY3" fmla="*/ 494522 h 524408"/>
+              <a:gd name="connsiteX4" fmla="*/ 9433249 w 9433249"/>
+              <a:gd name="connsiteY4" fmla="*/ 494522 h 524408"/>
+              <a:gd name="connsiteX0" fmla="*/ 0 w 9433249"/>
+              <a:gd name="connsiteY0" fmla="*/ 0 h 524408"/>
+              <a:gd name="connsiteX1" fmla="*/ 1101013 w 9433249"/>
+              <a:gd name="connsiteY1" fmla="*/ 485191 h 524408"/>
+              <a:gd name="connsiteX2" fmla="*/ 4646645 w 9433249"/>
+              <a:gd name="connsiteY2" fmla="*/ 494522 h 524408"/>
+              <a:gd name="connsiteX3" fmla="*/ 9433249 w 9433249"/>
+              <a:gd name="connsiteY3" fmla="*/ 494522 h 524408"/>
+              <a:gd name="connsiteX0" fmla="*/ 0 w 9433249"/>
+              <a:gd name="connsiteY0" fmla="*/ 0 h 523927"/>
+              <a:gd name="connsiteX1" fmla="*/ 1101013 w 9433249"/>
+              <a:gd name="connsiteY1" fmla="*/ 485191 h 523927"/>
+              <a:gd name="connsiteX2" fmla="*/ 9433249 w 9433249"/>
+              <a:gd name="connsiteY2" fmla="*/ 494522 h 523927"/>
+              <a:gd name="connsiteX0" fmla="*/ 0 w 2475604"/>
+              <a:gd name="connsiteY0" fmla="*/ 120944 h 607088"/>
+              <a:gd name="connsiteX1" fmla="*/ 1101013 w 2475604"/>
+              <a:gd name="connsiteY1" fmla="*/ 606135 h 607088"/>
+              <a:gd name="connsiteX2" fmla="*/ 2475604 w 2475604"/>
+              <a:gd name="connsiteY2" fmla="*/ 4 h 607088"/>
+              <a:gd name="connsiteX0" fmla="*/ 0 w 2475604"/>
+              <a:gd name="connsiteY0" fmla="*/ 120940 h 607084"/>
+              <a:gd name="connsiteX1" fmla="*/ 1101013 w 2475604"/>
+              <a:gd name="connsiteY1" fmla="*/ 606131 h 607084"/>
+              <a:gd name="connsiteX2" fmla="*/ 2475604 w 2475604"/>
+              <a:gd name="connsiteY2" fmla="*/ 0 h 607084"/>
+              <a:gd name="connsiteX0" fmla="*/ 0 w 2305619"/>
+              <a:gd name="connsiteY0" fmla="*/ 296787 h 786921"/>
+              <a:gd name="connsiteX1" fmla="*/ 1101013 w 2305619"/>
+              <a:gd name="connsiteY1" fmla="*/ 781978 h 786921"/>
+              <a:gd name="connsiteX2" fmla="*/ 2305619 w 2305619"/>
+              <a:gd name="connsiteY2" fmla="*/ 0 h 786921"/>
+              <a:gd name="connsiteX0" fmla="*/ 0 w 2405266"/>
+              <a:gd name="connsiteY0" fmla="*/ 367125 h 790677"/>
+              <a:gd name="connsiteX1" fmla="*/ 1200660 w 2405266"/>
+              <a:gd name="connsiteY1" fmla="*/ 781978 h 790677"/>
+              <a:gd name="connsiteX2" fmla="*/ 2405266 w 2405266"/>
+              <a:gd name="connsiteY2" fmla="*/ 0 h 790677"/>
+              <a:gd name="connsiteX0" fmla="*/ 0 w 2405266"/>
+              <a:gd name="connsiteY0" fmla="*/ 367125 h 678116"/>
+              <a:gd name="connsiteX1" fmla="*/ 1106876 w 2405266"/>
+              <a:gd name="connsiteY1" fmla="*/ 664748 h 678116"/>
+              <a:gd name="connsiteX2" fmla="*/ 2405266 w 2405266"/>
+              <a:gd name="connsiteY2" fmla="*/ 0 h 678116"/>
+              <a:gd name="connsiteX0" fmla="*/ 0 w 1608096"/>
+              <a:gd name="connsiteY0" fmla="*/ 408156 h 721397"/>
+              <a:gd name="connsiteX1" fmla="*/ 1106876 w 1608096"/>
+              <a:gd name="connsiteY1" fmla="*/ 705779 h 721397"/>
+              <a:gd name="connsiteX2" fmla="*/ 1608096 w 1608096"/>
+              <a:gd name="connsiteY2" fmla="*/ 0 h 721397"/>
+              <a:gd name="connsiteX0" fmla="*/ 0 w 1608096"/>
+              <a:gd name="connsiteY0" fmla="*/ 408156 h 721397"/>
+              <a:gd name="connsiteX1" fmla="*/ 1106876 w 1608096"/>
+              <a:gd name="connsiteY1" fmla="*/ 705779 h 721397"/>
+              <a:gd name="connsiteX2" fmla="*/ 1608096 w 1608096"/>
+              <a:gd name="connsiteY2" fmla="*/ 0 h 721397"/>
+              <a:gd name="connsiteX0" fmla="*/ 0 w 1608096"/>
+              <a:gd name="connsiteY0" fmla="*/ 408156 h 721397"/>
+              <a:gd name="connsiteX1" fmla="*/ 1106876 w 1608096"/>
+              <a:gd name="connsiteY1" fmla="*/ 705779 h 721397"/>
+              <a:gd name="connsiteX2" fmla="*/ 1608096 w 1608096"/>
+              <a:gd name="connsiteY2" fmla="*/ 0 h 721397"/>
+              <a:gd name="connsiteX0" fmla="*/ 0 w 1608096"/>
+              <a:gd name="connsiteY0" fmla="*/ 408156 h 683586"/>
+              <a:gd name="connsiteX1" fmla="*/ 960337 w 1608096"/>
+              <a:gd name="connsiteY1" fmla="*/ 664749 h 683586"/>
+              <a:gd name="connsiteX2" fmla="*/ 1608096 w 1608096"/>
+              <a:gd name="connsiteY2" fmla="*/ 0 h 683586"/>
+              <a:gd name="connsiteX0" fmla="*/ 0 w 1608096"/>
+              <a:gd name="connsiteY0" fmla="*/ 837225 h 864760"/>
+              <a:gd name="connsiteX1" fmla="*/ 813799 w 1608096"/>
+              <a:gd name="connsiteY1" fmla="*/ 3572 h 864760"/>
+              <a:gd name="connsiteX2" fmla="*/ 1608096 w 1608096"/>
+              <a:gd name="connsiteY2" fmla="*/ 429069 h 864760"/>
+              <a:gd name="connsiteX0" fmla="*/ 0 w 1608096"/>
+              <a:gd name="connsiteY0" fmla="*/ 837225 h 837225"/>
+              <a:gd name="connsiteX1" fmla="*/ 813799 w 1608096"/>
+              <a:gd name="connsiteY1" fmla="*/ 3572 h 837225"/>
+              <a:gd name="connsiteX2" fmla="*/ 1608096 w 1608096"/>
+              <a:gd name="connsiteY2" fmla="*/ 429069 h 837225"/>
+              <a:gd name="connsiteX0" fmla="*/ 0 w 1608096"/>
+              <a:gd name="connsiteY0" fmla="*/ 847908 h 847908"/>
+              <a:gd name="connsiteX1" fmla="*/ 813799 w 1608096"/>
+              <a:gd name="connsiteY1" fmla="*/ 14255 h 847908"/>
+              <a:gd name="connsiteX2" fmla="*/ 1608096 w 1608096"/>
+              <a:gd name="connsiteY2" fmla="*/ 439752 h 847908"/>
+              <a:gd name="connsiteX0" fmla="*/ 0 w 1496727"/>
+              <a:gd name="connsiteY0" fmla="*/ 1101757 h 1101757"/>
+              <a:gd name="connsiteX1" fmla="*/ 702430 w 1496727"/>
+              <a:gd name="connsiteY1" fmla="*/ 27782 h 1101757"/>
+              <a:gd name="connsiteX2" fmla="*/ 1496727 w 1496727"/>
+              <a:gd name="connsiteY2" fmla="*/ 453279 h 1101757"/>
+              <a:gd name="connsiteX0" fmla="*/ 0 w 1496727"/>
+              <a:gd name="connsiteY0" fmla="*/ 1101757 h 1101757"/>
+              <a:gd name="connsiteX1" fmla="*/ 702430 w 1496727"/>
+              <a:gd name="connsiteY1" fmla="*/ 27782 h 1101757"/>
+              <a:gd name="connsiteX2" fmla="*/ 1496727 w 1496727"/>
+              <a:gd name="connsiteY2" fmla="*/ 453279 h 1101757"/>
+              <a:gd name="connsiteX0" fmla="*/ 0 w 1496727"/>
+              <a:gd name="connsiteY0" fmla="*/ 998154 h 998154"/>
+              <a:gd name="connsiteX1" fmla="*/ 761044 w 1496727"/>
+              <a:gd name="connsiteY1" fmla="*/ 41410 h 998154"/>
+              <a:gd name="connsiteX2" fmla="*/ 1496727 w 1496727"/>
+              <a:gd name="connsiteY2" fmla="*/ 349676 h 998154"/>
+              <a:gd name="connsiteX0" fmla="*/ 0 w 1496727"/>
+              <a:gd name="connsiteY0" fmla="*/ 988409 h 988409"/>
+              <a:gd name="connsiteX1" fmla="*/ 702429 w 1496727"/>
+              <a:gd name="connsiteY1" fmla="*/ 43388 h 988409"/>
+              <a:gd name="connsiteX2" fmla="*/ 1496727 w 1496727"/>
+              <a:gd name="connsiteY2" fmla="*/ 339931 h 988409"/>
+              <a:gd name="connsiteX0" fmla="*/ 0 w 1496727"/>
+              <a:gd name="connsiteY0" fmla="*/ 988409 h 988409"/>
+              <a:gd name="connsiteX1" fmla="*/ 702429 w 1496727"/>
+              <a:gd name="connsiteY1" fmla="*/ 43388 h 988409"/>
+              <a:gd name="connsiteX2" fmla="*/ 1496727 w 1496727"/>
+              <a:gd name="connsiteY2" fmla="*/ 339931 h 988409"/>
+            </a:gdLst>
+            <a:ahLst/>
+            <a:cxnLst>
+              <a:cxn ang="0">
+                <a:pos x="connsiteX0" y="connsiteY0"/>
+              </a:cxn>
+              <a:cxn ang="0">
+                <a:pos x="connsiteX1" y="connsiteY1"/>
+              </a:cxn>
+              <a:cxn ang="0">
+                <a:pos x="connsiteX2" y="connsiteY2"/>
+              </a:cxn>
+            </a:cxnLst>
+            <a:rect l="l" t="t" r="r" b="b"/>
+            <a:pathLst>
+              <a:path w="1496727" h="988409">
+                <a:moveTo>
+                  <a:pt x="0" y="988409"/>
+                </a:moveTo>
+                <a:cubicBezTo>
+                  <a:pt x="28472" y="486410"/>
+                  <a:pt x="452975" y="151468"/>
+                  <a:pt x="702429" y="43388"/>
+                </a:cubicBezTo>
+                <a:cubicBezTo>
+                  <a:pt x="951883" y="-64692"/>
+                  <a:pt x="1355184" y="27328"/>
+                  <a:pt x="1496727" y="339931"/>
+                </a:cubicBezTo>
+              </a:path>
+            </a:pathLst>
+          </a:custGeom>
+          <a:noFill/>
+        </p:spPr>
+        <p:style>
+          <a:lnRef idx="2">
+            <a:schemeClr val="accent1">
+              <a:shade val="50000"/>
+            </a:schemeClr>
+          </a:lnRef>
+          <a:fillRef idx="1">
+            <a:schemeClr val="accent1"/>
+          </a:fillRef>
+          <a:effectRef idx="0">
+            <a:schemeClr val="accent1"/>
+          </a:effectRef>
+          <a:fontRef idx="minor">
+            <a:schemeClr val="lt1"/>
+          </a:fontRef>
+        </p:style>
+        <p:txBody>
+          <a:bodyPr rtlCol="0" anchor="ctr"/>
+          <a:lstStyle/>
+          <a:p>
+            <a:pPr algn="ctr"/>
+            <a:endParaRPr lang="en-US" sz="1350"/>
+          </a:p>
+        </p:txBody>
+      </p:sp>
+      <p:sp>
+        <p:nvSpPr>
+          <p:cNvPr id="65" name="Freeform: Shape 64">
+            <a:extLst>
+              <a:ext uri="{FF2B5EF4-FFF2-40B4-BE49-F238E27FC236}">
+                <a16:creationId xmlns:a16="http://schemas.microsoft.com/office/drawing/2014/main" id="{0AD289F8-306A-4D33-A1B9-98E8AFB54029}"/>
+              </a:ext>
+            </a:extLst>
+          </p:cNvPr>
+          <p:cNvSpPr/>
+          <p:nvPr/>
+        </p:nvSpPr>
+        <p:spPr>
+          <a:xfrm>
+            <a:off x="4939704" y="1557505"/>
+            <a:ext cx="255153" cy="765400"/>
+          </a:xfrm>
+          <a:custGeom>
+            <a:avLst/>
+            <a:gdLst>
+              <a:gd name="connsiteX0" fmla="*/ 0 w 9433249"/>
+              <a:gd name="connsiteY0" fmla="*/ 0 h 524408"/>
+              <a:gd name="connsiteX1" fmla="*/ 1101013 w 9433249"/>
+              <a:gd name="connsiteY1" fmla="*/ 485191 h 524408"/>
+              <a:gd name="connsiteX2" fmla="*/ 4646645 w 9433249"/>
+              <a:gd name="connsiteY2" fmla="*/ 494522 h 524408"/>
+              <a:gd name="connsiteX3" fmla="*/ 8192278 w 9433249"/>
+              <a:gd name="connsiteY3" fmla="*/ 494522 h 524408"/>
+              <a:gd name="connsiteX4" fmla="*/ 9433249 w 9433249"/>
+              <a:gd name="connsiteY4" fmla="*/ 494522 h 524408"/>
+              <a:gd name="connsiteX0" fmla="*/ 0 w 9433249"/>
+              <a:gd name="connsiteY0" fmla="*/ 0 h 524408"/>
+              <a:gd name="connsiteX1" fmla="*/ 1101013 w 9433249"/>
+              <a:gd name="connsiteY1" fmla="*/ 485191 h 524408"/>
+              <a:gd name="connsiteX2" fmla="*/ 4646645 w 9433249"/>
+              <a:gd name="connsiteY2" fmla="*/ 494522 h 524408"/>
+              <a:gd name="connsiteX3" fmla="*/ 9433249 w 9433249"/>
+              <a:gd name="connsiteY3" fmla="*/ 494522 h 524408"/>
+              <a:gd name="connsiteX0" fmla="*/ 0 w 9433249"/>
+              <a:gd name="connsiteY0" fmla="*/ 0 h 523927"/>
+              <a:gd name="connsiteX1" fmla="*/ 1101013 w 9433249"/>
+              <a:gd name="connsiteY1" fmla="*/ 485191 h 523927"/>
+              <a:gd name="connsiteX2" fmla="*/ 9433249 w 9433249"/>
+              <a:gd name="connsiteY2" fmla="*/ 494522 h 523927"/>
+              <a:gd name="connsiteX0" fmla="*/ 0 w 2475604"/>
+              <a:gd name="connsiteY0" fmla="*/ 120944 h 607088"/>
+              <a:gd name="connsiteX1" fmla="*/ 1101013 w 2475604"/>
+              <a:gd name="connsiteY1" fmla="*/ 606135 h 607088"/>
+              <a:gd name="connsiteX2" fmla="*/ 2475604 w 2475604"/>
+              <a:gd name="connsiteY2" fmla="*/ 4 h 607088"/>
+              <a:gd name="connsiteX0" fmla="*/ 0 w 2475604"/>
+              <a:gd name="connsiteY0" fmla="*/ 120940 h 607084"/>
+              <a:gd name="connsiteX1" fmla="*/ 1101013 w 2475604"/>
+              <a:gd name="connsiteY1" fmla="*/ 606131 h 607084"/>
+              <a:gd name="connsiteX2" fmla="*/ 2475604 w 2475604"/>
+              <a:gd name="connsiteY2" fmla="*/ 0 h 607084"/>
+              <a:gd name="connsiteX0" fmla="*/ 0 w 2305619"/>
+              <a:gd name="connsiteY0" fmla="*/ 296787 h 786921"/>
+              <a:gd name="connsiteX1" fmla="*/ 1101013 w 2305619"/>
+              <a:gd name="connsiteY1" fmla="*/ 781978 h 786921"/>
+              <a:gd name="connsiteX2" fmla="*/ 2305619 w 2305619"/>
+              <a:gd name="connsiteY2" fmla="*/ 0 h 786921"/>
+              <a:gd name="connsiteX0" fmla="*/ 0 w 2405266"/>
+              <a:gd name="connsiteY0" fmla="*/ 367125 h 790677"/>
+              <a:gd name="connsiteX1" fmla="*/ 1200660 w 2405266"/>
+              <a:gd name="connsiteY1" fmla="*/ 781978 h 790677"/>
+              <a:gd name="connsiteX2" fmla="*/ 2405266 w 2405266"/>
+              <a:gd name="connsiteY2" fmla="*/ 0 h 790677"/>
+              <a:gd name="connsiteX0" fmla="*/ 0 w 2405266"/>
+              <a:gd name="connsiteY0" fmla="*/ 367125 h 678116"/>
+              <a:gd name="connsiteX1" fmla="*/ 1106876 w 2405266"/>
+              <a:gd name="connsiteY1" fmla="*/ 664748 h 678116"/>
+              <a:gd name="connsiteX2" fmla="*/ 2405266 w 2405266"/>
+              <a:gd name="connsiteY2" fmla="*/ 0 h 678116"/>
+              <a:gd name="connsiteX0" fmla="*/ 0 w 1608096"/>
+              <a:gd name="connsiteY0" fmla="*/ 408156 h 721397"/>
+              <a:gd name="connsiteX1" fmla="*/ 1106876 w 1608096"/>
+              <a:gd name="connsiteY1" fmla="*/ 705779 h 721397"/>
+              <a:gd name="connsiteX2" fmla="*/ 1608096 w 1608096"/>
+              <a:gd name="connsiteY2" fmla="*/ 0 h 721397"/>
+              <a:gd name="connsiteX0" fmla="*/ 0 w 1608096"/>
+              <a:gd name="connsiteY0" fmla="*/ 408156 h 721397"/>
+              <a:gd name="connsiteX1" fmla="*/ 1106876 w 1608096"/>
+              <a:gd name="connsiteY1" fmla="*/ 705779 h 721397"/>
+              <a:gd name="connsiteX2" fmla="*/ 1608096 w 1608096"/>
+              <a:gd name="connsiteY2" fmla="*/ 0 h 721397"/>
+              <a:gd name="connsiteX0" fmla="*/ 0 w 1608096"/>
+              <a:gd name="connsiteY0" fmla="*/ 408156 h 721397"/>
+              <a:gd name="connsiteX1" fmla="*/ 1106876 w 1608096"/>
+              <a:gd name="connsiteY1" fmla="*/ 705779 h 721397"/>
+              <a:gd name="connsiteX2" fmla="*/ 1608096 w 1608096"/>
+              <a:gd name="connsiteY2" fmla="*/ 0 h 721397"/>
+              <a:gd name="connsiteX0" fmla="*/ 0 w 1608096"/>
+              <a:gd name="connsiteY0" fmla="*/ 408156 h 683586"/>
+              <a:gd name="connsiteX1" fmla="*/ 960337 w 1608096"/>
+              <a:gd name="connsiteY1" fmla="*/ 664749 h 683586"/>
+              <a:gd name="connsiteX2" fmla="*/ 1608096 w 1608096"/>
+              <a:gd name="connsiteY2" fmla="*/ 0 h 683586"/>
+              <a:gd name="connsiteX0" fmla="*/ 0 w 1608096"/>
+              <a:gd name="connsiteY0" fmla="*/ 837225 h 864760"/>
+              <a:gd name="connsiteX1" fmla="*/ 813799 w 1608096"/>
+              <a:gd name="connsiteY1" fmla="*/ 3572 h 864760"/>
+              <a:gd name="connsiteX2" fmla="*/ 1608096 w 1608096"/>
+              <a:gd name="connsiteY2" fmla="*/ 429069 h 864760"/>
+              <a:gd name="connsiteX0" fmla="*/ 0 w 1608096"/>
+              <a:gd name="connsiteY0" fmla="*/ 837225 h 837225"/>
+              <a:gd name="connsiteX1" fmla="*/ 813799 w 1608096"/>
+              <a:gd name="connsiteY1" fmla="*/ 3572 h 837225"/>
+              <a:gd name="connsiteX2" fmla="*/ 1608096 w 1608096"/>
+              <a:gd name="connsiteY2" fmla="*/ 429069 h 837225"/>
+              <a:gd name="connsiteX0" fmla="*/ 0 w 1608096"/>
+              <a:gd name="connsiteY0" fmla="*/ 847908 h 847908"/>
+              <a:gd name="connsiteX1" fmla="*/ 813799 w 1608096"/>
+              <a:gd name="connsiteY1" fmla="*/ 14255 h 847908"/>
+              <a:gd name="connsiteX2" fmla="*/ 1608096 w 1608096"/>
+              <a:gd name="connsiteY2" fmla="*/ 439752 h 847908"/>
+              <a:gd name="connsiteX0" fmla="*/ 0 w 1496727"/>
+              <a:gd name="connsiteY0" fmla="*/ 1101757 h 1101757"/>
+              <a:gd name="connsiteX1" fmla="*/ 702430 w 1496727"/>
+              <a:gd name="connsiteY1" fmla="*/ 27782 h 1101757"/>
+              <a:gd name="connsiteX2" fmla="*/ 1496727 w 1496727"/>
+              <a:gd name="connsiteY2" fmla="*/ 453279 h 1101757"/>
+              <a:gd name="connsiteX0" fmla="*/ 0 w 1496727"/>
+              <a:gd name="connsiteY0" fmla="*/ 1101757 h 1101757"/>
+              <a:gd name="connsiteX1" fmla="*/ 702430 w 1496727"/>
+              <a:gd name="connsiteY1" fmla="*/ 27782 h 1101757"/>
+              <a:gd name="connsiteX2" fmla="*/ 1496727 w 1496727"/>
+              <a:gd name="connsiteY2" fmla="*/ 453279 h 1101757"/>
+              <a:gd name="connsiteX0" fmla="*/ 0 w 1496727"/>
+              <a:gd name="connsiteY0" fmla="*/ 998154 h 998154"/>
+              <a:gd name="connsiteX1" fmla="*/ 761044 w 1496727"/>
+              <a:gd name="connsiteY1" fmla="*/ 41410 h 998154"/>
+              <a:gd name="connsiteX2" fmla="*/ 1496727 w 1496727"/>
+              <a:gd name="connsiteY2" fmla="*/ 349676 h 998154"/>
+              <a:gd name="connsiteX0" fmla="*/ 0 w 1496727"/>
+              <a:gd name="connsiteY0" fmla="*/ 988409 h 988409"/>
+              <a:gd name="connsiteX1" fmla="*/ 702429 w 1496727"/>
+              <a:gd name="connsiteY1" fmla="*/ 43388 h 988409"/>
+              <a:gd name="connsiteX2" fmla="*/ 1496727 w 1496727"/>
+              <a:gd name="connsiteY2" fmla="*/ 339931 h 988409"/>
+              <a:gd name="connsiteX0" fmla="*/ 0 w 1496727"/>
+              <a:gd name="connsiteY0" fmla="*/ 988409 h 988409"/>
+              <a:gd name="connsiteX1" fmla="*/ 702429 w 1496727"/>
+              <a:gd name="connsiteY1" fmla="*/ 43388 h 988409"/>
+              <a:gd name="connsiteX2" fmla="*/ 1496727 w 1496727"/>
+              <a:gd name="connsiteY2" fmla="*/ 339931 h 988409"/>
+              <a:gd name="connsiteX0" fmla="*/ 0 w 1496727"/>
+              <a:gd name="connsiteY0" fmla="*/ 700797 h 1042301"/>
+              <a:gd name="connsiteX1" fmla="*/ 784491 w 1496727"/>
+              <a:gd name="connsiteY1" fmla="*/ 1033590 h 1042301"/>
+              <a:gd name="connsiteX2" fmla="*/ 1496727 w 1496727"/>
+              <a:gd name="connsiteY2" fmla="*/ 52319 h 1042301"/>
+              <a:gd name="connsiteX0" fmla="*/ 0 w 1496727"/>
+              <a:gd name="connsiteY0" fmla="*/ 700797 h 1072850"/>
+              <a:gd name="connsiteX1" fmla="*/ 784491 w 1496727"/>
+              <a:gd name="connsiteY1" fmla="*/ 1033590 h 1072850"/>
+              <a:gd name="connsiteX2" fmla="*/ 1496727 w 1496727"/>
+              <a:gd name="connsiteY2" fmla="*/ 52319 h 1072850"/>
+              <a:gd name="connsiteX0" fmla="*/ 0 w 1496727"/>
+              <a:gd name="connsiteY0" fmla="*/ 648478 h 1020531"/>
+              <a:gd name="connsiteX1" fmla="*/ 784491 w 1496727"/>
+              <a:gd name="connsiteY1" fmla="*/ 981271 h 1020531"/>
+              <a:gd name="connsiteX2" fmla="*/ 1496727 w 1496727"/>
+              <a:gd name="connsiteY2" fmla="*/ 0 h 1020531"/>
+            </a:gdLst>
+            <a:ahLst/>
+            <a:cxnLst>
+              <a:cxn ang="0">
+                <a:pos x="connsiteX0" y="connsiteY0"/>
+              </a:cxn>
+              <a:cxn ang="0">
+                <a:pos x="connsiteX1" y="connsiteY1"/>
+              </a:cxn>
+              <a:cxn ang="0">
+                <a:pos x="connsiteX2" y="connsiteY2"/>
+              </a:cxn>
+            </a:cxnLst>
+            <a:rect l="l" t="t" r="r" b="b"/>
+            <a:pathLst>
+              <a:path w="1496727" h="1020531">
+                <a:moveTo>
+                  <a:pt x="0" y="648478"/>
+                </a:moveTo>
+                <a:cubicBezTo>
+                  <a:pt x="104672" y="972955"/>
+                  <a:pt x="535037" y="1089351"/>
+                  <a:pt x="784491" y="981271"/>
+                </a:cubicBezTo>
+                <a:cubicBezTo>
+                  <a:pt x="1033945" y="873191"/>
+                  <a:pt x="1378631" y="431812"/>
+                  <a:pt x="1496727" y="0"/>
+                </a:cubicBezTo>
+              </a:path>
+            </a:pathLst>
+          </a:custGeom>
+          <a:noFill/>
+        </p:spPr>
+        <p:style>
+          <a:lnRef idx="2">
+            <a:schemeClr val="accent1">
+              <a:shade val="50000"/>
+            </a:schemeClr>
+          </a:lnRef>
+          <a:fillRef idx="1">
+            <a:schemeClr val="accent1"/>
+          </a:fillRef>
+          <a:effectRef idx="0">
+            <a:schemeClr val="accent1"/>
+          </a:effectRef>
+          <a:fontRef idx="minor">
+            <a:schemeClr val="lt1"/>
+          </a:fontRef>
+        </p:style>
+        <p:txBody>
+          <a:bodyPr rtlCol="0" anchor="ctr"/>
+          <a:lstStyle/>
+          <a:p>
+            <a:pPr algn="ctr"/>
+            <a:endParaRPr lang="en-US" sz="1350"/>
+          </a:p>
+        </p:txBody>
+      </p:sp>
+      <p:sp>
+        <p:nvSpPr>
+          <p:cNvPr id="66" name="Freeform: Shape 65">
+            <a:extLst>
+              <a:ext uri="{FF2B5EF4-FFF2-40B4-BE49-F238E27FC236}">
+                <a16:creationId xmlns:a16="http://schemas.microsoft.com/office/drawing/2014/main" id="{A29DD20E-7F7B-427B-8D33-CCEB76494CC9}"/>
+              </a:ext>
+            </a:extLst>
+          </p:cNvPr>
+          <p:cNvSpPr/>
+          <p:nvPr/>
+        </p:nvSpPr>
+        <p:spPr>
+          <a:xfrm flipH="1">
+            <a:off x="5713266" y="1153259"/>
+            <a:ext cx="349803" cy="613848"/>
+          </a:xfrm>
+          <a:custGeom>
+            <a:avLst/>
+            <a:gdLst>
+              <a:gd name="connsiteX0" fmla="*/ 0 w 9433249"/>
+              <a:gd name="connsiteY0" fmla="*/ 0 h 524408"/>
+              <a:gd name="connsiteX1" fmla="*/ 1101013 w 9433249"/>
+              <a:gd name="connsiteY1" fmla="*/ 485191 h 524408"/>
+              <a:gd name="connsiteX2" fmla="*/ 4646645 w 9433249"/>
+              <a:gd name="connsiteY2" fmla="*/ 494522 h 524408"/>
+              <a:gd name="connsiteX3" fmla="*/ 8192278 w 9433249"/>
+              <a:gd name="connsiteY3" fmla="*/ 494522 h 524408"/>
+              <a:gd name="connsiteX4" fmla="*/ 9433249 w 9433249"/>
+              <a:gd name="connsiteY4" fmla="*/ 494522 h 524408"/>
+              <a:gd name="connsiteX0" fmla="*/ 0 w 9433249"/>
+              <a:gd name="connsiteY0" fmla="*/ 0 h 524408"/>
+              <a:gd name="connsiteX1" fmla="*/ 1101013 w 9433249"/>
+              <a:gd name="connsiteY1" fmla="*/ 485191 h 524408"/>
+              <a:gd name="connsiteX2" fmla="*/ 4646645 w 9433249"/>
+              <a:gd name="connsiteY2" fmla="*/ 494522 h 524408"/>
+              <a:gd name="connsiteX3" fmla="*/ 9433249 w 9433249"/>
+              <a:gd name="connsiteY3" fmla="*/ 494522 h 524408"/>
+              <a:gd name="connsiteX0" fmla="*/ 0 w 9433249"/>
+              <a:gd name="connsiteY0" fmla="*/ 0 h 523927"/>
+              <a:gd name="connsiteX1" fmla="*/ 1101013 w 9433249"/>
+              <a:gd name="connsiteY1" fmla="*/ 485191 h 523927"/>
+              <a:gd name="connsiteX2" fmla="*/ 9433249 w 9433249"/>
+              <a:gd name="connsiteY2" fmla="*/ 494522 h 523927"/>
+              <a:gd name="connsiteX0" fmla="*/ 0 w 2475604"/>
+              <a:gd name="connsiteY0" fmla="*/ 120944 h 607088"/>
+              <a:gd name="connsiteX1" fmla="*/ 1101013 w 2475604"/>
+              <a:gd name="connsiteY1" fmla="*/ 606135 h 607088"/>
+              <a:gd name="connsiteX2" fmla="*/ 2475604 w 2475604"/>
+              <a:gd name="connsiteY2" fmla="*/ 4 h 607088"/>
+              <a:gd name="connsiteX0" fmla="*/ 0 w 2475604"/>
+              <a:gd name="connsiteY0" fmla="*/ 120940 h 607084"/>
+              <a:gd name="connsiteX1" fmla="*/ 1101013 w 2475604"/>
+              <a:gd name="connsiteY1" fmla="*/ 606131 h 607084"/>
+              <a:gd name="connsiteX2" fmla="*/ 2475604 w 2475604"/>
+              <a:gd name="connsiteY2" fmla="*/ 0 h 607084"/>
+              <a:gd name="connsiteX0" fmla="*/ 0 w 2305619"/>
+              <a:gd name="connsiteY0" fmla="*/ 296787 h 786921"/>
+              <a:gd name="connsiteX1" fmla="*/ 1101013 w 2305619"/>
+              <a:gd name="connsiteY1" fmla="*/ 781978 h 786921"/>
+              <a:gd name="connsiteX2" fmla="*/ 2305619 w 2305619"/>
+              <a:gd name="connsiteY2" fmla="*/ 0 h 786921"/>
+              <a:gd name="connsiteX0" fmla="*/ 0 w 2405266"/>
+              <a:gd name="connsiteY0" fmla="*/ 367125 h 790677"/>
+              <a:gd name="connsiteX1" fmla="*/ 1200660 w 2405266"/>
+              <a:gd name="connsiteY1" fmla="*/ 781978 h 790677"/>
+              <a:gd name="connsiteX2" fmla="*/ 2405266 w 2405266"/>
+              <a:gd name="connsiteY2" fmla="*/ 0 h 790677"/>
+              <a:gd name="connsiteX0" fmla="*/ 0 w 2405266"/>
+              <a:gd name="connsiteY0" fmla="*/ 367125 h 678116"/>
+              <a:gd name="connsiteX1" fmla="*/ 1106876 w 2405266"/>
+              <a:gd name="connsiteY1" fmla="*/ 664748 h 678116"/>
+              <a:gd name="connsiteX2" fmla="*/ 2405266 w 2405266"/>
+              <a:gd name="connsiteY2" fmla="*/ 0 h 678116"/>
+              <a:gd name="connsiteX0" fmla="*/ 0 w 1608096"/>
+              <a:gd name="connsiteY0" fmla="*/ 408156 h 721397"/>
+              <a:gd name="connsiteX1" fmla="*/ 1106876 w 1608096"/>
+              <a:gd name="connsiteY1" fmla="*/ 705779 h 721397"/>
+              <a:gd name="connsiteX2" fmla="*/ 1608096 w 1608096"/>
+              <a:gd name="connsiteY2" fmla="*/ 0 h 721397"/>
+              <a:gd name="connsiteX0" fmla="*/ 0 w 1608096"/>
+              <a:gd name="connsiteY0" fmla="*/ 408156 h 721397"/>
+              <a:gd name="connsiteX1" fmla="*/ 1106876 w 1608096"/>
+              <a:gd name="connsiteY1" fmla="*/ 705779 h 721397"/>
+              <a:gd name="connsiteX2" fmla="*/ 1608096 w 1608096"/>
+              <a:gd name="connsiteY2" fmla="*/ 0 h 721397"/>
+              <a:gd name="connsiteX0" fmla="*/ 0 w 1608096"/>
+              <a:gd name="connsiteY0" fmla="*/ 408156 h 721397"/>
+              <a:gd name="connsiteX1" fmla="*/ 1106876 w 1608096"/>
+              <a:gd name="connsiteY1" fmla="*/ 705779 h 721397"/>
+              <a:gd name="connsiteX2" fmla="*/ 1608096 w 1608096"/>
+              <a:gd name="connsiteY2" fmla="*/ 0 h 721397"/>
+              <a:gd name="connsiteX0" fmla="*/ 0 w 1608096"/>
+              <a:gd name="connsiteY0" fmla="*/ 408156 h 683586"/>
+              <a:gd name="connsiteX1" fmla="*/ 960337 w 1608096"/>
+              <a:gd name="connsiteY1" fmla="*/ 664749 h 683586"/>
+              <a:gd name="connsiteX2" fmla="*/ 1608096 w 1608096"/>
+              <a:gd name="connsiteY2" fmla="*/ 0 h 683586"/>
+              <a:gd name="connsiteX0" fmla="*/ 0 w 1608096"/>
+              <a:gd name="connsiteY0" fmla="*/ 408156 h 408156"/>
+              <a:gd name="connsiteX1" fmla="*/ 1608096 w 1608096"/>
+              <a:gd name="connsiteY1" fmla="*/ 0 h 408156"/>
+              <a:gd name="connsiteX0" fmla="*/ 0 w 1461557"/>
+              <a:gd name="connsiteY0" fmla="*/ 683648 h 683648"/>
+              <a:gd name="connsiteX1" fmla="*/ 1461557 w 1461557"/>
+              <a:gd name="connsiteY1" fmla="*/ 0 h 683648"/>
+              <a:gd name="connsiteX0" fmla="*/ 0 w 1520172"/>
+              <a:gd name="connsiteY0" fmla="*/ 736403 h 736403"/>
+              <a:gd name="connsiteX1" fmla="*/ 1520172 w 1520172"/>
+              <a:gd name="connsiteY1" fmla="*/ 0 h 736403"/>
+              <a:gd name="connsiteX0" fmla="*/ 0 w 1479141"/>
+              <a:gd name="connsiteY0" fmla="*/ 818464 h 818464"/>
+              <a:gd name="connsiteX1" fmla="*/ 1479141 w 1479141"/>
+              <a:gd name="connsiteY1" fmla="*/ 0 h 818464"/>
+            </a:gdLst>
+            <a:ahLst/>
+            <a:cxnLst>
+              <a:cxn ang="0">
+                <a:pos x="connsiteX0" y="connsiteY0"/>
+              </a:cxn>
+              <a:cxn ang="0">
+                <a:pos x="connsiteX1" y="connsiteY1"/>
+              </a:cxn>
+            </a:cxnLst>
+            <a:rect l="l" t="t" r="r" b="b"/>
+            <a:pathLst>
+              <a:path w="1479141" h="818464">
+                <a:moveTo>
+                  <a:pt x="0" y="818464"/>
+                </a:moveTo>
+                <a:lnTo>
+                  <a:pt x="1479141" y="0"/>
+                </a:lnTo>
+              </a:path>
+            </a:pathLst>
+          </a:custGeom>
+          <a:noFill/>
+        </p:spPr>
+        <p:style>
+          <a:lnRef idx="2">
+            <a:schemeClr val="accent1">
+              <a:shade val="50000"/>
+            </a:schemeClr>
+          </a:lnRef>
+          <a:fillRef idx="1">
+            <a:schemeClr val="accent1"/>
+          </a:fillRef>
+          <a:effectRef idx="0">
+            <a:schemeClr val="accent1"/>
+          </a:effectRef>
+          <a:fontRef idx="minor">
+            <a:schemeClr val="lt1"/>
+          </a:fontRef>
+        </p:style>
+        <p:txBody>
+          <a:bodyPr rtlCol="0" anchor="ctr"/>
+          <a:lstStyle/>
+          <a:p>
+            <a:pPr algn="ctr"/>
+            <a:endParaRPr lang="en-US" sz="1350"/>
+          </a:p>
+        </p:txBody>
+      </p:sp>
+      <p:sp>
+        <p:nvSpPr>
+          <p:cNvPr id="67" name="Freeform: Shape 66">
+            <a:extLst>
+              <a:ext uri="{FF2B5EF4-FFF2-40B4-BE49-F238E27FC236}">
+                <a16:creationId xmlns:a16="http://schemas.microsoft.com/office/drawing/2014/main" id="{19B9C338-7814-416F-BDC6-CBCD1EEFBA54}"/>
+              </a:ext>
+            </a:extLst>
+          </p:cNvPr>
+          <p:cNvSpPr/>
+          <p:nvPr/>
+        </p:nvSpPr>
+        <p:spPr>
+          <a:xfrm flipH="1">
+            <a:off x="5695920" y="546594"/>
+            <a:ext cx="353962" cy="741308"/>
+          </a:xfrm>
+          <a:custGeom>
+            <a:avLst/>
+            <a:gdLst>
+              <a:gd name="connsiteX0" fmla="*/ 0 w 9433249"/>
+              <a:gd name="connsiteY0" fmla="*/ 0 h 524408"/>
+              <a:gd name="connsiteX1" fmla="*/ 1101013 w 9433249"/>
+              <a:gd name="connsiteY1" fmla="*/ 485191 h 524408"/>
+              <a:gd name="connsiteX2" fmla="*/ 4646645 w 9433249"/>
+              <a:gd name="connsiteY2" fmla="*/ 494522 h 524408"/>
+              <a:gd name="connsiteX3" fmla="*/ 8192278 w 9433249"/>
+              <a:gd name="connsiteY3" fmla="*/ 494522 h 524408"/>
+              <a:gd name="connsiteX4" fmla="*/ 9433249 w 9433249"/>
+              <a:gd name="connsiteY4" fmla="*/ 494522 h 524408"/>
+              <a:gd name="connsiteX0" fmla="*/ 0 w 9433249"/>
+              <a:gd name="connsiteY0" fmla="*/ 0 h 524408"/>
+              <a:gd name="connsiteX1" fmla="*/ 1101013 w 9433249"/>
+              <a:gd name="connsiteY1" fmla="*/ 485191 h 524408"/>
+              <a:gd name="connsiteX2" fmla="*/ 4646645 w 9433249"/>
+              <a:gd name="connsiteY2" fmla="*/ 494522 h 524408"/>
+              <a:gd name="connsiteX3" fmla="*/ 9433249 w 9433249"/>
+              <a:gd name="connsiteY3" fmla="*/ 494522 h 524408"/>
+              <a:gd name="connsiteX0" fmla="*/ 0 w 9433249"/>
+              <a:gd name="connsiteY0" fmla="*/ 0 h 523927"/>
+              <a:gd name="connsiteX1" fmla="*/ 1101013 w 9433249"/>
+              <a:gd name="connsiteY1" fmla="*/ 485191 h 523927"/>
+              <a:gd name="connsiteX2" fmla="*/ 9433249 w 9433249"/>
+              <a:gd name="connsiteY2" fmla="*/ 494522 h 523927"/>
+              <a:gd name="connsiteX0" fmla="*/ 0 w 2475604"/>
+              <a:gd name="connsiteY0" fmla="*/ 120944 h 607088"/>
+              <a:gd name="connsiteX1" fmla="*/ 1101013 w 2475604"/>
+              <a:gd name="connsiteY1" fmla="*/ 606135 h 607088"/>
+              <a:gd name="connsiteX2" fmla="*/ 2475604 w 2475604"/>
+              <a:gd name="connsiteY2" fmla="*/ 4 h 607088"/>
+              <a:gd name="connsiteX0" fmla="*/ 0 w 2475604"/>
+              <a:gd name="connsiteY0" fmla="*/ 120940 h 607084"/>
+              <a:gd name="connsiteX1" fmla="*/ 1101013 w 2475604"/>
+              <a:gd name="connsiteY1" fmla="*/ 606131 h 607084"/>
+              <a:gd name="connsiteX2" fmla="*/ 2475604 w 2475604"/>
+              <a:gd name="connsiteY2" fmla="*/ 0 h 607084"/>
+              <a:gd name="connsiteX0" fmla="*/ 0 w 2305619"/>
+              <a:gd name="connsiteY0" fmla="*/ 296787 h 786921"/>
+              <a:gd name="connsiteX1" fmla="*/ 1101013 w 2305619"/>
+              <a:gd name="connsiteY1" fmla="*/ 781978 h 786921"/>
+              <a:gd name="connsiteX2" fmla="*/ 2305619 w 2305619"/>
+              <a:gd name="connsiteY2" fmla="*/ 0 h 786921"/>
+              <a:gd name="connsiteX0" fmla="*/ 0 w 2405266"/>
+              <a:gd name="connsiteY0" fmla="*/ 367125 h 790677"/>
+              <a:gd name="connsiteX1" fmla="*/ 1200660 w 2405266"/>
+              <a:gd name="connsiteY1" fmla="*/ 781978 h 790677"/>
+              <a:gd name="connsiteX2" fmla="*/ 2405266 w 2405266"/>
+              <a:gd name="connsiteY2" fmla="*/ 0 h 790677"/>
+              <a:gd name="connsiteX0" fmla="*/ 0 w 2405266"/>
+              <a:gd name="connsiteY0" fmla="*/ 367125 h 678116"/>
+              <a:gd name="connsiteX1" fmla="*/ 1106876 w 2405266"/>
+              <a:gd name="connsiteY1" fmla="*/ 664748 h 678116"/>
+              <a:gd name="connsiteX2" fmla="*/ 2405266 w 2405266"/>
+              <a:gd name="connsiteY2" fmla="*/ 0 h 678116"/>
+              <a:gd name="connsiteX0" fmla="*/ 0 w 1608096"/>
+              <a:gd name="connsiteY0" fmla="*/ 408156 h 721397"/>
+              <a:gd name="connsiteX1" fmla="*/ 1106876 w 1608096"/>
+              <a:gd name="connsiteY1" fmla="*/ 705779 h 721397"/>
+              <a:gd name="connsiteX2" fmla="*/ 1608096 w 1608096"/>
+              <a:gd name="connsiteY2" fmla="*/ 0 h 721397"/>
+              <a:gd name="connsiteX0" fmla="*/ 0 w 1608096"/>
+              <a:gd name="connsiteY0" fmla="*/ 408156 h 721397"/>
+              <a:gd name="connsiteX1" fmla="*/ 1106876 w 1608096"/>
+              <a:gd name="connsiteY1" fmla="*/ 705779 h 721397"/>
+              <a:gd name="connsiteX2" fmla="*/ 1608096 w 1608096"/>
+              <a:gd name="connsiteY2" fmla="*/ 0 h 721397"/>
+              <a:gd name="connsiteX0" fmla="*/ 0 w 1608096"/>
+              <a:gd name="connsiteY0" fmla="*/ 408156 h 721397"/>
+              <a:gd name="connsiteX1" fmla="*/ 1106876 w 1608096"/>
+              <a:gd name="connsiteY1" fmla="*/ 705779 h 721397"/>
+              <a:gd name="connsiteX2" fmla="*/ 1608096 w 1608096"/>
+              <a:gd name="connsiteY2" fmla="*/ 0 h 721397"/>
+              <a:gd name="connsiteX0" fmla="*/ 0 w 1608096"/>
+              <a:gd name="connsiteY0" fmla="*/ 408156 h 683586"/>
+              <a:gd name="connsiteX1" fmla="*/ 960337 w 1608096"/>
+              <a:gd name="connsiteY1" fmla="*/ 664749 h 683586"/>
+              <a:gd name="connsiteX2" fmla="*/ 1608096 w 1608096"/>
+              <a:gd name="connsiteY2" fmla="*/ 0 h 683586"/>
+              <a:gd name="connsiteX0" fmla="*/ 0 w 1608096"/>
+              <a:gd name="connsiteY0" fmla="*/ 837225 h 864760"/>
+              <a:gd name="connsiteX1" fmla="*/ 813799 w 1608096"/>
+              <a:gd name="connsiteY1" fmla="*/ 3572 h 864760"/>
+              <a:gd name="connsiteX2" fmla="*/ 1608096 w 1608096"/>
+              <a:gd name="connsiteY2" fmla="*/ 429069 h 864760"/>
+              <a:gd name="connsiteX0" fmla="*/ 0 w 1608096"/>
+              <a:gd name="connsiteY0" fmla="*/ 837225 h 837225"/>
+              <a:gd name="connsiteX1" fmla="*/ 813799 w 1608096"/>
+              <a:gd name="connsiteY1" fmla="*/ 3572 h 837225"/>
+              <a:gd name="connsiteX2" fmla="*/ 1608096 w 1608096"/>
+              <a:gd name="connsiteY2" fmla="*/ 429069 h 837225"/>
+              <a:gd name="connsiteX0" fmla="*/ 0 w 1608096"/>
+              <a:gd name="connsiteY0" fmla="*/ 847908 h 847908"/>
+              <a:gd name="connsiteX1" fmla="*/ 813799 w 1608096"/>
+              <a:gd name="connsiteY1" fmla="*/ 14255 h 847908"/>
+              <a:gd name="connsiteX2" fmla="*/ 1608096 w 1608096"/>
+              <a:gd name="connsiteY2" fmla="*/ 439752 h 847908"/>
+              <a:gd name="connsiteX0" fmla="*/ 0 w 1496727"/>
+              <a:gd name="connsiteY0" fmla="*/ 1101757 h 1101757"/>
+              <a:gd name="connsiteX1" fmla="*/ 702430 w 1496727"/>
+              <a:gd name="connsiteY1" fmla="*/ 27782 h 1101757"/>
+              <a:gd name="connsiteX2" fmla="*/ 1496727 w 1496727"/>
+              <a:gd name="connsiteY2" fmla="*/ 453279 h 1101757"/>
+              <a:gd name="connsiteX0" fmla="*/ 0 w 1496727"/>
+              <a:gd name="connsiteY0" fmla="*/ 1101757 h 1101757"/>
+              <a:gd name="connsiteX1" fmla="*/ 702430 w 1496727"/>
+              <a:gd name="connsiteY1" fmla="*/ 27782 h 1101757"/>
+              <a:gd name="connsiteX2" fmla="*/ 1496727 w 1496727"/>
+              <a:gd name="connsiteY2" fmla="*/ 453279 h 1101757"/>
+              <a:gd name="connsiteX0" fmla="*/ 0 w 1496727"/>
+              <a:gd name="connsiteY0" fmla="*/ 998154 h 998154"/>
+              <a:gd name="connsiteX1" fmla="*/ 761044 w 1496727"/>
+              <a:gd name="connsiteY1" fmla="*/ 41410 h 998154"/>
+              <a:gd name="connsiteX2" fmla="*/ 1496727 w 1496727"/>
+              <a:gd name="connsiteY2" fmla="*/ 349676 h 998154"/>
+              <a:gd name="connsiteX0" fmla="*/ 0 w 1496727"/>
+              <a:gd name="connsiteY0" fmla="*/ 988409 h 988409"/>
+              <a:gd name="connsiteX1" fmla="*/ 702429 w 1496727"/>
+              <a:gd name="connsiteY1" fmla="*/ 43388 h 988409"/>
+              <a:gd name="connsiteX2" fmla="*/ 1496727 w 1496727"/>
+              <a:gd name="connsiteY2" fmla="*/ 339931 h 988409"/>
+              <a:gd name="connsiteX0" fmla="*/ 0 w 1496727"/>
+              <a:gd name="connsiteY0" fmla="*/ 988409 h 988409"/>
+              <a:gd name="connsiteX1" fmla="*/ 702429 w 1496727"/>
+              <a:gd name="connsiteY1" fmla="*/ 43388 h 988409"/>
+              <a:gd name="connsiteX2" fmla="*/ 1496727 w 1496727"/>
+              <a:gd name="connsiteY2" fmla="*/ 339931 h 988409"/>
+            </a:gdLst>
+            <a:ahLst/>
+            <a:cxnLst>
+              <a:cxn ang="0">
+                <a:pos x="connsiteX0" y="connsiteY0"/>
+              </a:cxn>
+              <a:cxn ang="0">
+                <a:pos x="connsiteX1" y="connsiteY1"/>
+              </a:cxn>
+              <a:cxn ang="0">
+                <a:pos x="connsiteX2" y="connsiteY2"/>
+              </a:cxn>
+            </a:cxnLst>
+            <a:rect l="l" t="t" r="r" b="b"/>
+            <a:pathLst>
+              <a:path w="1496727" h="988409">
+                <a:moveTo>
+                  <a:pt x="0" y="988409"/>
+                </a:moveTo>
+                <a:cubicBezTo>
+                  <a:pt x="28472" y="486410"/>
+                  <a:pt x="452975" y="151468"/>
+                  <a:pt x="702429" y="43388"/>
+                </a:cubicBezTo>
+                <a:cubicBezTo>
+                  <a:pt x="951883" y="-64692"/>
+                  <a:pt x="1355184" y="27328"/>
+                  <a:pt x="1496727" y="339931"/>
+                </a:cubicBezTo>
+              </a:path>
+            </a:pathLst>
+          </a:custGeom>
+          <a:noFill/>
+        </p:spPr>
+        <p:style>
+          <a:lnRef idx="2">
+            <a:schemeClr val="accent1">
+              <a:shade val="50000"/>
+            </a:schemeClr>
+          </a:lnRef>
+          <a:fillRef idx="1">
+            <a:schemeClr val="accent1"/>
+          </a:fillRef>
+          <a:effectRef idx="0">
+            <a:schemeClr val="accent1"/>
+          </a:effectRef>
+          <a:fontRef idx="minor">
+            <a:schemeClr val="lt1"/>
+          </a:fontRef>
+        </p:style>
+        <p:txBody>
+          <a:bodyPr rtlCol="0" anchor="ctr"/>
+          <a:lstStyle/>
+          <a:p>
+            <a:pPr algn="ctr"/>
+            <a:endParaRPr lang="en-US" sz="1350"/>
+          </a:p>
+        </p:txBody>
+      </p:sp>
+      <p:sp>
+        <p:nvSpPr>
+          <p:cNvPr id="68" name="Freeform: Shape 67">
+            <a:extLst>
+              <a:ext uri="{FF2B5EF4-FFF2-40B4-BE49-F238E27FC236}">
+                <a16:creationId xmlns:a16="http://schemas.microsoft.com/office/drawing/2014/main" id="{A04DF738-9ED9-4F36-B1C0-B87CC43421D1}"/>
+              </a:ext>
+            </a:extLst>
+          </p:cNvPr>
+          <p:cNvSpPr/>
+          <p:nvPr/>
+        </p:nvSpPr>
+        <p:spPr>
+          <a:xfrm flipH="1">
+            <a:off x="5709109" y="1639567"/>
+            <a:ext cx="353962" cy="765400"/>
+          </a:xfrm>
+          <a:custGeom>
+            <a:avLst/>
+            <a:gdLst>
+              <a:gd name="connsiteX0" fmla="*/ 0 w 9433249"/>
+              <a:gd name="connsiteY0" fmla="*/ 0 h 524408"/>
+              <a:gd name="connsiteX1" fmla="*/ 1101013 w 9433249"/>
+              <a:gd name="connsiteY1" fmla="*/ 485191 h 524408"/>
+              <a:gd name="connsiteX2" fmla="*/ 4646645 w 9433249"/>
+              <a:gd name="connsiteY2" fmla="*/ 494522 h 524408"/>
+              <a:gd name="connsiteX3" fmla="*/ 8192278 w 9433249"/>
+              <a:gd name="connsiteY3" fmla="*/ 494522 h 524408"/>
+              <a:gd name="connsiteX4" fmla="*/ 9433249 w 9433249"/>
+              <a:gd name="connsiteY4" fmla="*/ 494522 h 524408"/>
+              <a:gd name="connsiteX0" fmla="*/ 0 w 9433249"/>
+              <a:gd name="connsiteY0" fmla="*/ 0 h 524408"/>
+              <a:gd name="connsiteX1" fmla="*/ 1101013 w 9433249"/>
+              <a:gd name="connsiteY1" fmla="*/ 485191 h 524408"/>
+              <a:gd name="connsiteX2" fmla="*/ 4646645 w 9433249"/>
+              <a:gd name="connsiteY2" fmla="*/ 494522 h 524408"/>
+              <a:gd name="connsiteX3" fmla="*/ 9433249 w 9433249"/>
+              <a:gd name="connsiteY3" fmla="*/ 494522 h 524408"/>
+              <a:gd name="connsiteX0" fmla="*/ 0 w 9433249"/>
+              <a:gd name="connsiteY0" fmla="*/ 0 h 523927"/>
+              <a:gd name="connsiteX1" fmla="*/ 1101013 w 9433249"/>
+              <a:gd name="connsiteY1" fmla="*/ 485191 h 523927"/>
+              <a:gd name="connsiteX2" fmla="*/ 9433249 w 9433249"/>
+              <a:gd name="connsiteY2" fmla="*/ 494522 h 523927"/>
+              <a:gd name="connsiteX0" fmla="*/ 0 w 2475604"/>
+              <a:gd name="connsiteY0" fmla="*/ 120944 h 607088"/>
+              <a:gd name="connsiteX1" fmla="*/ 1101013 w 2475604"/>
+              <a:gd name="connsiteY1" fmla="*/ 606135 h 607088"/>
+              <a:gd name="connsiteX2" fmla="*/ 2475604 w 2475604"/>
+              <a:gd name="connsiteY2" fmla="*/ 4 h 607088"/>
+              <a:gd name="connsiteX0" fmla="*/ 0 w 2475604"/>
+              <a:gd name="connsiteY0" fmla="*/ 120940 h 607084"/>
+              <a:gd name="connsiteX1" fmla="*/ 1101013 w 2475604"/>
+              <a:gd name="connsiteY1" fmla="*/ 606131 h 607084"/>
+              <a:gd name="connsiteX2" fmla="*/ 2475604 w 2475604"/>
+              <a:gd name="connsiteY2" fmla="*/ 0 h 607084"/>
+              <a:gd name="connsiteX0" fmla="*/ 0 w 2305619"/>
+              <a:gd name="connsiteY0" fmla="*/ 296787 h 786921"/>
+              <a:gd name="connsiteX1" fmla="*/ 1101013 w 2305619"/>
+              <a:gd name="connsiteY1" fmla="*/ 781978 h 786921"/>
+              <a:gd name="connsiteX2" fmla="*/ 2305619 w 2305619"/>
+              <a:gd name="connsiteY2" fmla="*/ 0 h 786921"/>
+              <a:gd name="connsiteX0" fmla="*/ 0 w 2405266"/>
+              <a:gd name="connsiteY0" fmla="*/ 367125 h 790677"/>
+              <a:gd name="connsiteX1" fmla="*/ 1200660 w 2405266"/>
+              <a:gd name="connsiteY1" fmla="*/ 781978 h 790677"/>
+              <a:gd name="connsiteX2" fmla="*/ 2405266 w 2405266"/>
+              <a:gd name="connsiteY2" fmla="*/ 0 h 790677"/>
+              <a:gd name="connsiteX0" fmla="*/ 0 w 2405266"/>
+              <a:gd name="connsiteY0" fmla="*/ 367125 h 678116"/>
+              <a:gd name="connsiteX1" fmla="*/ 1106876 w 2405266"/>
+              <a:gd name="connsiteY1" fmla="*/ 664748 h 678116"/>
+              <a:gd name="connsiteX2" fmla="*/ 2405266 w 2405266"/>
+              <a:gd name="connsiteY2" fmla="*/ 0 h 678116"/>
+              <a:gd name="connsiteX0" fmla="*/ 0 w 1608096"/>
+              <a:gd name="connsiteY0" fmla="*/ 408156 h 721397"/>
+              <a:gd name="connsiteX1" fmla="*/ 1106876 w 1608096"/>
+              <a:gd name="connsiteY1" fmla="*/ 705779 h 721397"/>
+              <a:gd name="connsiteX2" fmla="*/ 1608096 w 1608096"/>
+              <a:gd name="connsiteY2" fmla="*/ 0 h 721397"/>
+              <a:gd name="connsiteX0" fmla="*/ 0 w 1608096"/>
+              <a:gd name="connsiteY0" fmla="*/ 408156 h 721397"/>
+              <a:gd name="connsiteX1" fmla="*/ 1106876 w 1608096"/>
+              <a:gd name="connsiteY1" fmla="*/ 705779 h 721397"/>
+              <a:gd name="connsiteX2" fmla="*/ 1608096 w 1608096"/>
+              <a:gd name="connsiteY2" fmla="*/ 0 h 721397"/>
+              <a:gd name="connsiteX0" fmla="*/ 0 w 1608096"/>
+              <a:gd name="connsiteY0" fmla="*/ 408156 h 721397"/>
+              <a:gd name="connsiteX1" fmla="*/ 1106876 w 1608096"/>
+              <a:gd name="connsiteY1" fmla="*/ 705779 h 721397"/>
+              <a:gd name="connsiteX2" fmla="*/ 1608096 w 1608096"/>
+              <a:gd name="connsiteY2" fmla="*/ 0 h 721397"/>
+              <a:gd name="connsiteX0" fmla="*/ 0 w 1608096"/>
+              <a:gd name="connsiteY0" fmla="*/ 408156 h 683586"/>
+              <a:gd name="connsiteX1" fmla="*/ 960337 w 1608096"/>
+              <a:gd name="connsiteY1" fmla="*/ 664749 h 683586"/>
+              <a:gd name="connsiteX2" fmla="*/ 1608096 w 1608096"/>
+              <a:gd name="connsiteY2" fmla="*/ 0 h 683586"/>
+              <a:gd name="connsiteX0" fmla="*/ 0 w 1608096"/>
+              <a:gd name="connsiteY0" fmla="*/ 837225 h 864760"/>
+              <a:gd name="connsiteX1" fmla="*/ 813799 w 1608096"/>
+              <a:gd name="connsiteY1" fmla="*/ 3572 h 864760"/>
+              <a:gd name="connsiteX2" fmla="*/ 1608096 w 1608096"/>
+              <a:gd name="connsiteY2" fmla="*/ 429069 h 864760"/>
+              <a:gd name="connsiteX0" fmla="*/ 0 w 1608096"/>
+              <a:gd name="connsiteY0" fmla="*/ 837225 h 837225"/>
+              <a:gd name="connsiteX1" fmla="*/ 813799 w 1608096"/>
+              <a:gd name="connsiteY1" fmla="*/ 3572 h 837225"/>
+              <a:gd name="connsiteX2" fmla="*/ 1608096 w 1608096"/>
+              <a:gd name="connsiteY2" fmla="*/ 429069 h 837225"/>
+              <a:gd name="connsiteX0" fmla="*/ 0 w 1608096"/>
+              <a:gd name="connsiteY0" fmla="*/ 847908 h 847908"/>
+              <a:gd name="connsiteX1" fmla="*/ 813799 w 1608096"/>
+              <a:gd name="connsiteY1" fmla="*/ 14255 h 847908"/>
+              <a:gd name="connsiteX2" fmla="*/ 1608096 w 1608096"/>
+              <a:gd name="connsiteY2" fmla="*/ 439752 h 847908"/>
+              <a:gd name="connsiteX0" fmla="*/ 0 w 1496727"/>
+              <a:gd name="connsiteY0" fmla="*/ 1101757 h 1101757"/>
+              <a:gd name="connsiteX1" fmla="*/ 702430 w 1496727"/>
+              <a:gd name="connsiteY1" fmla="*/ 27782 h 1101757"/>
+              <a:gd name="connsiteX2" fmla="*/ 1496727 w 1496727"/>
+              <a:gd name="connsiteY2" fmla="*/ 453279 h 1101757"/>
+              <a:gd name="connsiteX0" fmla="*/ 0 w 1496727"/>
+              <a:gd name="connsiteY0" fmla="*/ 1101757 h 1101757"/>
+              <a:gd name="connsiteX1" fmla="*/ 702430 w 1496727"/>
+              <a:gd name="connsiteY1" fmla="*/ 27782 h 1101757"/>
+              <a:gd name="connsiteX2" fmla="*/ 1496727 w 1496727"/>
+              <a:gd name="connsiteY2" fmla="*/ 453279 h 1101757"/>
+              <a:gd name="connsiteX0" fmla="*/ 0 w 1496727"/>
+              <a:gd name="connsiteY0" fmla="*/ 998154 h 998154"/>
+              <a:gd name="connsiteX1" fmla="*/ 761044 w 1496727"/>
+              <a:gd name="connsiteY1" fmla="*/ 41410 h 998154"/>
+              <a:gd name="connsiteX2" fmla="*/ 1496727 w 1496727"/>
+              <a:gd name="connsiteY2" fmla="*/ 349676 h 998154"/>
+              <a:gd name="connsiteX0" fmla="*/ 0 w 1496727"/>
+              <a:gd name="connsiteY0" fmla="*/ 988409 h 988409"/>
+              <a:gd name="connsiteX1" fmla="*/ 702429 w 1496727"/>
+              <a:gd name="connsiteY1" fmla="*/ 43388 h 988409"/>
+              <a:gd name="connsiteX2" fmla="*/ 1496727 w 1496727"/>
+              <a:gd name="connsiteY2" fmla="*/ 339931 h 988409"/>
+              <a:gd name="connsiteX0" fmla="*/ 0 w 1496727"/>
+              <a:gd name="connsiteY0" fmla="*/ 988409 h 988409"/>
+              <a:gd name="connsiteX1" fmla="*/ 702429 w 1496727"/>
+              <a:gd name="connsiteY1" fmla="*/ 43388 h 988409"/>
+              <a:gd name="connsiteX2" fmla="*/ 1496727 w 1496727"/>
+              <a:gd name="connsiteY2" fmla="*/ 339931 h 988409"/>
+              <a:gd name="connsiteX0" fmla="*/ 0 w 1496727"/>
+              <a:gd name="connsiteY0" fmla="*/ 700797 h 1042301"/>
+              <a:gd name="connsiteX1" fmla="*/ 784491 w 1496727"/>
+              <a:gd name="connsiteY1" fmla="*/ 1033590 h 1042301"/>
+              <a:gd name="connsiteX2" fmla="*/ 1496727 w 1496727"/>
+              <a:gd name="connsiteY2" fmla="*/ 52319 h 1042301"/>
+              <a:gd name="connsiteX0" fmla="*/ 0 w 1496727"/>
+              <a:gd name="connsiteY0" fmla="*/ 700797 h 1072850"/>
+              <a:gd name="connsiteX1" fmla="*/ 784491 w 1496727"/>
+              <a:gd name="connsiteY1" fmla="*/ 1033590 h 1072850"/>
+              <a:gd name="connsiteX2" fmla="*/ 1496727 w 1496727"/>
+              <a:gd name="connsiteY2" fmla="*/ 52319 h 1072850"/>
+              <a:gd name="connsiteX0" fmla="*/ 0 w 1496727"/>
+              <a:gd name="connsiteY0" fmla="*/ 648478 h 1020531"/>
+              <a:gd name="connsiteX1" fmla="*/ 784491 w 1496727"/>
+              <a:gd name="connsiteY1" fmla="*/ 981271 h 1020531"/>
+              <a:gd name="connsiteX2" fmla="*/ 1496727 w 1496727"/>
+              <a:gd name="connsiteY2" fmla="*/ 0 h 1020531"/>
+            </a:gdLst>
+            <a:ahLst/>
+            <a:cxnLst>
+              <a:cxn ang="0">
+                <a:pos x="connsiteX0" y="connsiteY0"/>
+              </a:cxn>
+              <a:cxn ang="0">
+                <a:pos x="connsiteX1" y="connsiteY1"/>
+              </a:cxn>
+              <a:cxn ang="0">
+                <a:pos x="connsiteX2" y="connsiteY2"/>
+              </a:cxn>
+            </a:cxnLst>
+            <a:rect l="l" t="t" r="r" b="b"/>
+            <a:pathLst>
+              <a:path w="1496727" h="1020531">
+                <a:moveTo>
+                  <a:pt x="0" y="648478"/>
+                </a:moveTo>
+                <a:cubicBezTo>
+                  <a:pt x="104672" y="972955"/>
+                  <a:pt x="535037" y="1089351"/>
+                  <a:pt x="784491" y="981271"/>
+                </a:cubicBezTo>
+                <a:cubicBezTo>
+                  <a:pt x="1033945" y="873191"/>
+                  <a:pt x="1378631" y="431812"/>
+                  <a:pt x="1496727" y="0"/>
+                </a:cubicBezTo>
+              </a:path>
+            </a:pathLst>
+          </a:custGeom>
+          <a:noFill/>
+        </p:spPr>
+        <p:style>
+          <a:lnRef idx="2">
+            <a:schemeClr val="accent1">
+              <a:shade val="50000"/>
+            </a:schemeClr>
+          </a:lnRef>
+          <a:fillRef idx="1">
+            <a:schemeClr val="accent1"/>
+          </a:fillRef>
+          <a:effectRef idx="0">
+            <a:schemeClr val="accent1"/>
+          </a:effectRef>
+          <a:fontRef idx="minor">
+            <a:schemeClr val="lt1"/>
+          </a:fontRef>
+        </p:style>
+        <p:txBody>
+          <a:bodyPr rtlCol="0" anchor="ctr"/>
+          <a:lstStyle/>
+          <a:p>
+            <a:pPr algn="ctr"/>
+            <a:endParaRPr lang="en-US" sz="1350"/>
+          </a:p>
+        </p:txBody>
+      </p:sp>
+      <mc:AlternateContent xmlns:mc="http://schemas.openxmlformats.org/markup-compatibility/2006">
+        <mc:Choice xmlns:a14="http://schemas.microsoft.com/office/drawing/2010/main" Requires="a14">
+          <p:sp>
+            <p:nvSpPr>
+              <p:cNvPr id="69" name="TextBox 68">
+                <a:extLst>
+                  <a:ext uri="{FF2B5EF4-FFF2-40B4-BE49-F238E27FC236}">
+                    <a16:creationId xmlns:a16="http://schemas.microsoft.com/office/drawing/2014/main" id="{D353D342-C156-4367-89D1-8925DC9C1D98}"/>
+                  </a:ext>
+                </a:extLst>
+              </p:cNvPr>
+              <p:cNvSpPr txBox="1"/>
+              <p:nvPr/>
+            </p:nvSpPr>
+            <p:spPr>
+              <a:xfrm>
+                <a:off x="6833388" y="1134013"/>
+                <a:ext cx="1082925" cy="307777"/>
+              </a:xfrm>
+              <a:prstGeom prst="rect">
+                <a:avLst/>
+              </a:prstGeom>
+              <a:noFill/>
+            </p:spPr>
+            <p:txBody>
+              <a:bodyPr wrap="none" rtlCol="0">
+                <a:spAutoFit/>
+              </a:bodyPr>
+              <a:lstStyle/>
+              <a:p>
+                <a:pPr/>
+                <a14:m>
+                  <m:oMathPara xmlns:m="http://schemas.openxmlformats.org/officeDocument/2006/math">
+                    <m:oMathParaPr>
+                      <m:jc m:val="centerGroup"/>
+                    </m:oMathParaPr>
+                    <m:oMath xmlns:m="http://schemas.openxmlformats.org/officeDocument/2006/math">
+                      <m:d>
+                        <m:dPr>
+                          <m:begChr m:val="{"/>
+                          <m:endChr m:val="}"/>
+                          <m:ctrlPr>
+                            <a:rPr lang="en-US" sz="1400" b="0" i="1" smtClean="0">
+                              <a:latin typeface="Cambria Math" panose="02040503050406030204" pitchFamily="18" charset="0"/>
+                            </a:rPr>
+                          </m:ctrlPr>
+                        </m:dPr>
+                        <m:e>
+                          <m:r>
+                            <a:rPr lang="en-US" sz="1400" b="0" i="1" smtClean="0">
+                              <a:latin typeface="Cambria Math" panose="02040503050406030204" pitchFamily="18" charset="0"/>
+                            </a:rPr>
+                            <m:t>𝑥</m:t>
+                          </m:r>
+                          <m:d>
+                            <m:dPr>
+                              <m:ctrlPr>
+                                <a:rPr lang="en-US" sz="1400" b="0" i="1" smtClean="0">
+                                  <a:latin typeface="Cambria Math" panose="02040503050406030204" pitchFamily="18" charset="0"/>
+                                </a:rPr>
+                              </m:ctrlPr>
+                            </m:dPr>
+                            <m:e>
+                              <m:r>
+                                <a:rPr lang="en-US" sz="1400" b="0" i="1" smtClean="0">
+                                  <a:latin typeface="Cambria Math" panose="02040503050406030204" pitchFamily="18" charset="0"/>
+                                </a:rPr>
+                                <m:t>𝑡</m:t>
+                              </m:r>
+                            </m:e>
+                          </m:d>
+                          <m:r>
+                            <a:rPr lang="en-US" sz="1400" b="0" i="1" smtClean="0">
+                              <a:latin typeface="Cambria Math" panose="02040503050406030204" pitchFamily="18" charset="0"/>
+                            </a:rPr>
+                            <m:t>,</m:t>
+                          </m:r>
+                          <m:r>
+                            <a:rPr lang="en-US" sz="1400" b="0" i="1" smtClean="0">
+                              <a:latin typeface="Cambria Math" panose="02040503050406030204" pitchFamily="18" charset="0"/>
+                            </a:rPr>
+                            <m:t>𝑦</m:t>
+                          </m:r>
+                          <m:d>
+                            <m:dPr>
+                              <m:ctrlPr>
+                                <a:rPr lang="en-US" sz="1400" b="0" i="1" smtClean="0">
+                                  <a:latin typeface="Cambria Math" panose="02040503050406030204" pitchFamily="18" charset="0"/>
+                                </a:rPr>
+                              </m:ctrlPr>
+                            </m:dPr>
+                            <m:e>
+                              <m:r>
+                                <a:rPr lang="en-US" sz="1400" i="1">
+                                  <a:latin typeface="Cambria Math" panose="02040503050406030204" pitchFamily="18" charset="0"/>
+                                </a:rPr>
+                                <m:t>𝑡</m:t>
+                              </m:r>
+                            </m:e>
+                          </m:d>
+                        </m:e>
+                      </m:d>
+                    </m:oMath>
+                  </m:oMathPara>
+                </a14:m>
+                <a:endParaRPr lang="en-US" sz="1400" dirty="0"/>
+              </a:p>
+            </p:txBody>
+          </p:sp>
+        </mc:Choice>
+        <mc:Fallback>
+          <p:sp>
+            <p:nvSpPr>
+              <p:cNvPr id="69" name="TextBox 68">
+                <a:extLst>
+                  <a:ext uri="{FF2B5EF4-FFF2-40B4-BE49-F238E27FC236}">
+                    <a16:creationId xmlns:a16="http://schemas.microsoft.com/office/drawing/2014/main" id="{D353D342-C156-4367-89D1-8925DC9C1D98}"/>
+                  </a:ext>
+                </a:extLst>
+              </p:cNvPr>
+              <p:cNvSpPr txBox="1">
+                <a:spLocks noRot="1" noChangeAspect="1" noMove="1" noResize="1" noEditPoints="1" noAdjustHandles="1" noChangeArrowheads="1" noChangeShapeType="1" noTextEdit="1"/>
+              </p:cNvSpPr>
+              <p:nvPr/>
+            </p:nvSpPr>
+            <p:spPr>
+              <a:xfrm>
+                <a:off x="6833388" y="1134013"/>
+                <a:ext cx="1082925" cy="307777"/>
+              </a:xfrm>
+              <a:prstGeom prst="rect">
+                <a:avLst/>
+              </a:prstGeom>
+              <a:blipFill>
+                <a:blip r:embed="rId4"/>
+                <a:stretch>
+                  <a:fillRect/>
+                </a:stretch>
+              </a:blipFill>
+            </p:spPr>
+            <p:txBody>
+              <a:bodyPr/>
+              <a:lstStyle/>
+              <a:p>
+                <a:r>
+                  <a:rPr lang="en-US">
+                    <a:noFill/>
+                  </a:rPr>
+                  <a:t> </a:t>
+                </a:r>
+              </a:p>
+            </p:txBody>
+          </p:sp>
+        </mc:Fallback>
+      </mc:AlternateContent>
+      <p:sp>
+        <p:nvSpPr>
+          <p:cNvPr id="3" name="Trapezoid 2">
+            <a:extLst>
+              <a:ext uri="{FF2B5EF4-FFF2-40B4-BE49-F238E27FC236}">
+                <a16:creationId xmlns:a16="http://schemas.microsoft.com/office/drawing/2014/main" id="{D9FDBDA7-DB43-4038-B095-202847C5CA04}"/>
+              </a:ext>
+            </a:extLst>
+          </p:cNvPr>
+          <p:cNvSpPr/>
+          <p:nvPr/>
+        </p:nvSpPr>
+        <p:spPr>
+          <a:xfrm>
+            <a:off x="3349870" y="2576146"/>
+            <a:ext cx="3239966" cy="804496"/>
+          </a:xfrm>
+          <a:prstGeom prst="trapezoid">
+            <a:avLst>
+              <a:gd name="adj" fmla="val 59973"/>
+            </a:avLst>
+          </a:prstGeom>
+          <a:noFill/>
+          <a:ln w="19050">
+            <a:solidFill>
+              <a:schemeClr val="tx1">
+                <a:lumMod val="75000"/>
+                <a:lumOff val="25000"/>
+              </a:schemeClr>
+            </a:solidFill>
+            <a:prstDash val="lgDash"/>
+          </a:ln>
+        </p:spPr>
+        <p:style>
+          <a:lnRef idx="2">
+            <a:schemeClr val="accent1">
+              <a:shade val="50000"/>
+            </a:schemeClr>
+          </a:lnRef>
+          <a:fillRef idx="1">
+            <a:schemeClr val="accent1"/>
+          </a:fillRef>
+          <a:effectRef idx="0">
+            <a:schemeClr val="accent1"/>
+          </a:effectRef>
+          <a:fontRef idx="minor">
+            <a:schemeClr val="lt1"/>
+          </a:fontRef>
+        </p:style>
+        <p:txBody>
+          <a:bodyPr rtlCol="0" anchor="ctr"/>
+          <a:lstStyle/>
+          <a:p>
+            <a:pPr algn="ctr"/>
+            <a:endParaRPr lang="en-US"/>
+          </a:p>
+        </p:txBody>
+      </p:sp>
+      <p:sp>
+        <p:nvSpPr>
+          <p:cNvPr id="70" name="Trapezoid 69">
+            <a:extLst>
+              <a:ext uri="{FF2B5EF4-FFF2-40B4-BE49-F238E27FC236}">
+                <a16:creationId xmlns:a16="http://schemas.microsoft.com/office/drawing/2014/main" id="{D56BCD21-CCE4-4244-AA84-7CFC99DA1B53}"/>
+              </a:ext>
+            </a:extLst>
+          </p:cNvPr>
+          <p:cNvSpPr/>
+          <p:nvPr/>
+        </p:nvSpPr>
+        <p:spPr>
+          <a:xfrm rot="5400000">
+            <a:off x="1084992" y="695569"/>
+            <a:ext cx="2611317" cy="1422394"/>
+          </a:xfrm>
+          <a:prstGeom prst="trapezoid">
+            <a:avLst>
+              <a:gd name="adj" fmla="val 24581"/>
+            </a:avLst>
+          </a:prstGeom>
+          <a:noFill/>
+          <a:ln w="19050">
+            <a:solidFill>
+              <a:schemeClr val="tx1">
+                <a:lumMod val="75000"/>
+                <a:lumOff val="25000"/>
+              </a:schemeClr>
+            </a:solidFill>
+            <a:prstDash val="lgDash"/>
+          </a:ln>
+        </p:spPr>
+        <p:style>
+          <a:lnRef idx="2">
+            <a:schemeClr val="accent1">
+              <a:shade val="50000"/>
+            </a:schemeClr>
+          </a:lnRef>
+          <a:fillRef idx="1">
+            <a:schemeClr val="accent1"/>
+          </a:fillRef>
+          <a:effectRef idx="0">
+            <a:schemeClr val="accent1"/>
+          </a:effectRef>
+          <a:fontRef idx="minor">
+            <a:schemeClr val="lt1"/>
+          </a:fontRef>
+        </p:style>
+        <p:txBody>
+          <a:bodyPr rtlCol="0" anchor="ctr"/>
+          <a:lstStyle/>
+          <a:p>
+            <a:pPr algn="ctr"/>
+            <a:endParaRPr lang="en-US"/>
+          </a:p>
+        </p:txBody>
+      </p:sp>
+      <p:grpSp>
+        <p:nvGrpSpPr>
+          <p:cNvPr id="77" name="Group 76">
+            <a:extLst>
+              <a:ext uri="{FF2B5EF4-FFF2-40B4-BE49-F238E27FC236}">
+                <a16:creationId xmlns:a16="http://schemas.microsoft.com/office/drawing/2014/main" id="{D79EB4DC-0BE8-4270-B09E-74E96C3B0ECE}"/>
+              </a:ext>
+            </a:extLst>
+          </p:cNvPr>
+          <p:cNvGrpSpPr/>
+          <p:nvPr/>
+        </p:nvGrpSpPr>
+        <p:grpSpPr>
+          <a:xfrm>
+            <a:off x="3343049" y="101108"/>
+            <a:ext cx="3246786" cy="2614247"/>
+            <a:chOff x="3343049" y="101108"/>
+            <a:chExt cx="3246786" cy="2614247"/>
+          </a:xfrm>
+        </p:grpSpPr>
+        <p:sp>
+          <p:nvSpPr>
+            <p:cNvPr id="71" name="Trapezoid 70">
+              <a:extLst>
+                <a:ext uri="{FF2B5EF4-FFF2-40B4-BE49-F238E27FC236}">
+                  <a16:creationId xmlns:a16="http://schemas.microsoft.com/office/drawing/2014/main" id="{D0C68C39-C723-4495-97CB-0AD352A4E15F}"/>
+                </a:ext>
+              </a:extLst>
+            </p:cNvPr>
+            <p:cNvSpPr/>
+            <p:nvPr/>
+          </p:nvSpPr>
+          <p:spPr>
+            <a:xfrm rot="5400000" flipV="1">
+              <a:off x="5041386" y="1163976"/>
+              <a:ext cx="2611317" cy="485581"/>
+            </a:xfrm>
+            <a:prstGeom prst="trapezoid">
+              <a:avLst>
+                <a:gd name="adj" fmla="val 68942"/>
+              </a:avLst>
+            </a:prstGeom>
+            <a:noFill/>
+            <a:ln w="19050">
+              <a:solidFill>
+                <a:schemeClr val="tx1">
+                  <a:lumMod val="75000"/>
+                  <a:lumOff val="25000"/>
+                </a:schemeClr>
+              </a:solidFill>
+              <a:prstDash val="lgDash"/>
+            </a:ln>
+          </p:spPr>
+          <p:style>
+            <a:lnRef idx="2">
+              <a:schemeClr val="accent1">
+                <a:shade val="50000"/>
+              </a:schemeClr>
+            </a:lnRef>
+            <a:fillRef idx="1">
+              <a:schemeClr val="accent1"/>
+            </a:fillRef>
+            <a:effectRef idx="0">
+              <a:schemeClr val="accent1"/>
+            </a:effectRef>
+            <a:fontRef idx="minor">
+              <a:schemeClr val="lt1"/>
+            </a:fontRef>
+          </p:style>
+          <p:txBody>
+            <a:bodyPr rtlCol="0" anchor="ctr"/>
+            <a:lstStyle/>
+            <a:p>
+              <a:pPr algn="ctr"/>
+              <a:endParaRPr lang="en-US"/>
+            </a:p>
+          </p:txBody>
+        </p:sp>
+        <p:sp>
+          <p:nvSpPr>
+            <p:cNvPr id="72" name="Trapezoid 71">
+              <a:extLst>
+                <a:ext uri="{FF2B5EF4-FFF2-40B4-BE49-F238E27FC236}">
+                  <a16:creationId xmlns:a16="http://schemas.microsoft.com/office/drawing/2014/main" id="{89D0D522-E75E-4343-B08A-741966F95541}"/>
+                </a:ext>
+              </a:extLst>
+            </p:cNvPr>
+            <p:cNvSpPr/>
+            <p:nvPr/>
+          </p:nvSpPr>
+          <p:spPr>
+            <a:xfrm rot="5400000">
+              <a:off x="2278753" y="1172225"/>
+              <a:ext cx="2611317" cy="469084"/>
+            </a:xfrm>
+            <a:prstGeom prst="trapezoid">
+              <a:avLst>
+                <a:gd name="adj" fmla="val 71440"/>
+              </a:avLst>
+            </a:prstGeom>
+            <a:noFill/>
+            <a:ln w="19050">
+              <a:solidFill>
+                <a:schemeClr val="tx1">
+                  <a:lumMod val="75000"/>
+                  <a:lumOff val="25000"/>
+                </a:schemeClr>
+              </a:solidFill>
+              <a:prstDash val="lgDash"/>
+            </a:ln>
+          </p:spPr>
+          <p:style>
+            <a:lnRef idx="2">
+              <a:schemeClr val="accent1">
+                <a:shade val="50000"/>
+              </a:schemeClr>
+            </a:lnRef>
+            <a:fillRef idx="1">
+              <a:schemeClr val="accent1"/>
+            </a:fillRef>
+            <a:effectRef idx="0">
+              <a:schemeClr val="accent1"/>
+            </a:effectRef>
+            <a:fontRef idx="minor">
+              <a:schemeClr val="lt1"/>
+            </a:fontRef>
+          </p:style>
+          <p:txBody>
+            <a:bodyPr rtlCol="0" anchor="ctr"/>
+            <a:lstStyle/>
+            <a:p>
+              <a:pPr algn="ctr"/>
+              <a:endParaRPr lang="en-US"/>
+            </a:p>
+          </p:txBody>
+        </p:sp>
+        <p:cxnSp>
+          <p:nvCxnSpPr>
+            <p:cNvPr id="39" name="Straight Connector 38">
+              <a:extLst>
+                <a:ext uri="{FF2B5EF4-FFF2-40B4-BE49-F238E27FC236}">
+                  <a16:creationId xmlns:a16="http://schemas.microsoft.com/office/drawing/2014/main" id="{DEA2948F-F838-49B6-948E-D6C0904164C5}"/>
+                </a:ext>
+              </a:extLst>
+            </p:cNvPr>
+            <p:cNvCxnSpPr>
+              <a:cxnSpLocks/>
+            </p:cNvCxnSpPr>
+            <p:nvPr/>
+          </p:nvCxnSpPr>
+          <p:spPr>
+            <a:xfrm>
+              <a:off x="3818954" y="441091"/>
+              <a:ext cx="2285300" cy="0"/>
+            </a:xfrm>
+            <a:prstGeom prst="line">
+              <a:avLst/>
+            </a:prstGeom>
+            <a:noFill/>
+            <a:ln w="19050">
+              <a:solidFill>
+                <a:schemeClr val="tx1">
+                  <a:lumMod val="75000"/>
+                  <a:lumOff val="25000"/>
+                </a:schemeClr>
+              </a:solidFill>
+              <a:prstDash val="lgDash"/>
+            </a:ln>
+          </p:spPr>
+          <p:style>
+            <a:lnRef idx="2">
+              <a:schemeClr val="accent1">
+                <a:shade val="50000"/>
+              </a:schemeClr>
+            </a:lnRef>
+            <a:fillRef idx="1">
+              <a:schemeClr val="accent1"/>
+            </a:fillRef>
+            <a:effectRef idx="0">
+              <a:schemeClr val="accent1"/>
+            </a:effectRef>
+            <a:fontRef idx="minor">
+              <a:schemeClr val="lt1"/>
+            </a:fontRef>
+          </p:style>
+        </p:cxnSp>
+        <p:cxnSp>
+          <p:nvCxnSpPr>
+            <p:cNvPr id="73" name="Straight Connector 72">
+              <a:extLst>
+                <a:ext uri="{FF2B5EF4-FFF2-40B4-BE49-F238E27FC236}">
+                  <a16:creationId xmlns:a16="http://schemas.microsoft.com/office/drawing/2014/main" id="{5BFDAB40-FA78-4EDC-8BF4-A052A94D86CF}"/>
+                </a:ext>
+              </a:extLst>
+            </p:cNvPr>
+            <p:cNvCxnSpPr>
+              <a:cxnSpLocks/>
+            </p:cNvCxnSpPr>
+            <p:nvPr/>
+          </p:nvCxnSpPr>
+          <p:spPr>
+            <a:xfrm>
+              <a:off x="3835073" y="2373934"/>
+              <a:ext cx="2285300" cy="0"/>
+            </a:xfrm>
+            <a:prstGeom prst="line">
+              <a:avLst/>
+            </a:prstGeom>
+            <a:noFill/>
+            <a:ln w="19050">
+              <a:solidFill>
+                <a:schemeClr val="tx1">
+                  <a:lumMod val="75000"/>
+                  <a:lumOff val="25000"/>
+                </a:schemeClr>
+              </a:solidFill>
+              <a:prstDash val="lgDash"/>
+            </a:ln>
+          </p:spPr>
+          <p:style>
+            <a:lnRef idx="2">
+              <a:schemeClr val="accent1">
+                <a:shade val="50000"/>
+              </a:schemeClr>
+            </a:lnRef>
+            <a:fillRef idx="1">
+              <a:schemeClr val="accent1"/>
+            </a:fillRef>
+            <a:effectRef idx="0">
+              <a:schemeClr val="accent1"/>
+            </a:effectRef>
+            <a:fontRef idx="minor">
+              <a:schemeClr val="lt1"/>
+            </a:fontRef>
+          </p:style>
+        </p:cxnSp>
+        <p:cxnSp>
+          <p:nvCxnSpPr>
+            <p:cNvPr id="74" name="Straight Connector 73">
+              <a:extLst>
+                <a:ext uri="{FF2B5EF4-FFF2-40B4-BE49-F238E27FC236}">
+                  <a16:creationId xmlns:a16="http://schemas.microsoft.com/office/drawing/2014/main" id="{9C1E8006-E788-4501-A7FF-FD99C5E3068F}"/>
+                </a:ext>
+              </a:extLst>
+            </p:cNvPr>
+            <p:cNvCxnSpPr>
+              <a:cxnSpLocks/>
+            </p:cNvCxnSpPr>
+            <p:nvPr/>
+          </p:nvCxnSpPr>
+          <p:spPr>
+            <a:xfrm>
+              <a:off x="3352725" y="101117"/>
+              <a:ext cx="3237110" cy="0"/>
+            </a:xfrm>
+            <a:prstGeom prst="line">
+              <a:avLst/>
+            </a:prstGeom>
+            <a:noFill/>
+            <a:ln w="19050">
+              <a:solidFill>
+                <a:schemeClr val="tx1">
+                  <a:lumMod val="75000"/>
+                  <a:lumOff val="25000"/>
+                </a:schemeClr>
+              </a:solidFill>
+              <a:prstDash val="lgDash"/>
+            </a:ln>
+          </p:spPr>
+          <p:style>
+            <a:lnRef idx="2">
+              <a:schemeClr val="accent1">
+                <a:shade val="50000"/>
+              </a:schemeClr>
+            </a:lnRef>
+            <a:fillRef idx="1">
+              <a:schemeClr val="accent1"/>
+            </a:fillRef>
+            <a:effectRef idx="0">
+              <a:schemeClr val="accent1"/>
+            </a:effectRef>
+            <a:fontRef idx="minor">
+              <a:schemeClr val="lt1"/>
+            </a:fontRef>
+          </p:style>
+        </p:cxnSp>
+        <p:cxnSp>
+          <p:nvCxnSpPr>
+            <p:cNvPr id="76" name="Straight Connector 75">
+              <a:extLst>
+                <a:ext uri="{FF2B5EF4-FFF2-40B4-BE49-F238E27FC236}">
+                  <a16:creationId xmlns:a16="http://schemas.microsoft.com/office/drawing/2014/main" id="{474CBEA6-C1B3-4B86-942D-53E960D2C256}"/>
+                </a:ext>
+              </a:extLst>
+            </p:cNvPr>
+            <p:cNvCxnSpPr>
+              <a:cxnSpLocks/>
+            </p:cNvCxnSpPr>
+            <p:nvPr/>
+          </p:nvCxnSpPr>
+          <p:spPr>
+            <a:xfrm>
+              <a:off x="3343049" y="2715355"/>
+              <a:ext cx="3237110" cy="0"/>
+            </a:xfrm>
+            <a:prstGeom prst="line">
+              <a:avLst/>
+            </a:prstGeom>
+            <a:noFill/>
+            <a:ln w="19050">
+              <a:solidFill>
+                <a:schemeClr val="tx1">
+                  <a:lumMod val="75000"/>
+                  <a:lumOff val="25000"/>
+                </a:schemeClr>
+              </a:solidFill>
+              <a:prstDash val="lgDash"/>
+            </a:ln>
+          </p:spPr>
+          <p:style>
+            <a:lnRef idx="2">
+              <a:schemeClr val="accent1">
+                <a:shade val="50000"/>
+              </a:schemeClr>
+            </a:lnRef>
+            <a:fillRef idx="1">
+              <a:schemeClr val="accent1"/>
+            </a:fillRef>
+            <a:effectRef idx="0">
+              <a:schemeClr val="accent1"/>
+            </a:effectRef>
+            <a:fontRef idx="minor">
+              <a:schemeClr val="lt1"/>
+            </a:fontRef>
+          </p:style>
+        </p:cxnSp>
+      </p:grpSp>
+    </p:spTree>
+    <p:extLst>
+      <p:ext uri="{BB962C8B-B14F-4D97-AF65-F5344CB8AC3E}">
+        <p14:creationId xmlns:p14="http://schemas.microsoft.com/office/powerpoint/2010/main" val="3128350840"/>
+      </p:ext>
+    </p:extLst>
+  </p:cSld>
+  <p:clrMapOvr>
+    <a:masterClrMapping/>
+  </p:clrMapOvr>
+</p:sld>
+</file>
+
 <file path=ppt/theme/theme1.xml><?xml version="1.0" encoding="utf-8"?>
 <a:theme xmlns:a="http://schemas.openxmlformats.org/drawingml/2006/main" name="Office Theme">
   <a:themeElements>

</xml_diff>